<commit_message>
Uzupełniono prezentację o grafice
</commit_message>
<xml_diff>
--- a/Grafika/Grafika rastrowa i wektorowa.pptx
+++ b/Grafika/Grafika rastrowa i wektorowa.pptx
@@ -5,12 +5,16 @@
     <p:sldMasterId id="2147483661" r:id="rId1"/>
   </p:sldMasterIdLst>
   <p:notesMasterIdLst>
-    <p:notesMasterId r:id="rId5"/>
+    <p:notesMasterId r:id="rId9"/>
   </p:notesMasterIdLst>
   <p:sldIdLst>
     <p:sldId id="256" r:id="rId2"/>
     <p:sldId id="257" r:id="rId3"/>
     <p:sldId id="258" r:id="rId4"/>
+    <p:sldId id="260" r:id="rId5"/>
+    <p:sldId id="261" r:id="rId6"/>
+    <p:sldId id="262" r:id="rId7"/>
+    <p:sldId id="259" r:id="rId8"/>
   </p:sldIdLst>
   <p:sldSz cx="13004800" cy="9753600"/>
   <p:notesSz cx="6858000" cy="9144000"/>
@@ -320,6 +324,3748 @@
 </p:presentation>
 </file>
 
+<file path=ppt/diagrams/colors1.xml><?xml version="1.0" encoding="utf-8"?>
+<dgm:colorsDef xmlns:dgm="http://schemas.openxmlformats.org/drawingml/2006/diagram" xmlns:a="http://schemas.openxmlformats.org/drawingml/2006/main" uniqueId="urn:microsoft.com/office/officeart/2005/8/colors/accent1_2">
+  <dgm:title val=""/>
+  <dgm:desc val=""/>
+  <dgm:catLst>
+    <dgm:cat type="accent1" pri="11200"/>
+  </dgm:catLst>
+  <dgm:styleLbl name="node0">
+    <dgm:fillClrLst meth="repeat">
+      <a:schemeClr val="accent1"/>
+    </dgm:fillClrLst>
+    <dgm:linClrLst meth="repeat">
+      <a:schemeClr val="lt1"/>
+    </dgm:linClrLst>
+    <dgm:effectClrLst/>
+    <dgm:txLinClrLst/>
+    <dgm:txFillClrLst/>
+    <dgm:txEffectClrLst/>
+  </dgm:styleLbl>
+  <dgm:styleLbl name="alignNode1">
+    <dgm:fillClrLst meth="repeat">
+      <a:schemeClr val="accent1"/>
+    </dgm:fillClrLst>
+    <dgm:linClrLst meth="repeat">
+      <a:schemeClr val="accent1"/>
+    </dgm:linClrLst>
+    <dgm:effectClrLst/>
+    <dgm:txLinClrLst/>
+    <dgm:txFillClrLst/>
+    <dgm:txEffectClrLst/>
+  </dgm:styleLbl>
+  <dgm:styleLbl name="node1">
+    <dgm:fillClrLst meth="repeat">
+      <a:schemeClr val="accent1"/>
+    </dgm:fillClrLst>
+    <dgm:linClrLst meth="repeat">
+      <a:schemeClr val="lt1"/>
+    </dgm:linClrLst>
+    <dgm:effectClrLst/>
+    <dgm:txLinClrLst/>
+    <dgm:txFillClrLst/>
+    <dgm:txEffectClrLst/>
+  </dgm:styleLbl>
+  <dgm:styleLbl name="lnNode1">
+    <dgm:fillClrLst meth="repeat">
+      <a:schemeClr val="accent1"/>
+    </dgm:fillClrLst>
+    <dgm:linClrLst meth="repeat">
+      <a:schemeClr val="lt1"/>
+    </dgm:linClrLst>
+    <dgm:effectClrLst/>
+    <dgm:txLinClrLst/>
+    <dgm:txFillClrLst/>
+    <dgm:txEffectClrLst/>
+  </dgm:styleLbl>
+  <dgm:styleLbl name="vennNode1">
+    <dgm:fillClrLst meth="repeat">
+      <a:schemeClr val="accent1">
+        <a:alpha val="50000"/>
+      </a:schemeClr>
+    </dgm:fillClrLst>
+    <dgm:linClrLst meth="repeat">
+      <a:schemeClr val="lt1"/>
+    </dgm:linClrLst>
+    <dgm:effectClrLst/>
+    <dgm:txLinClrLst/>
+    <dgm:txFillClrLst/>
+    <dgm:txEffectClrLst/>
+  </dgm:styleLbl>
+  <dgm:styleLbl name="node2">
+    <dgm:fillClrLst meth="repeat">
+      <a:schemeClr val="accent1"/>
+    </dgm:fillClrLst>
+    <dgm:linClrLst meth="repeat">
+      <a:schemeClr val="lt1"/>
+    </dgm:linClrLst>
+    <dgm:effectClrLst/>
+    <dgm:txLinClrLst/>
+    <dgm:txFillClrLst/>
+    <dgm:txEffectClrLst/>
+  </dgm:styleLbl>
+  <dgm:styleLbl name="node3">
+    <dgm:fillClrLst meth="repeat">
+      <a:schemeClr val="accent1"/>
+    </dgm:fillClrLst>
+    <dgm:linClrLst meth="repeat">
+      <a:schemeClr val="lt1"/>
+    </dgm:linClrLst>
+    <dgm:effectClrLst/>
+    <dgm:txLinClrLst/>
+    <dgm:txFillClrLst/>
+    <dgm:txEffectClrLst/>
+  </dgm:styleLbl>
+  <dgm:styleLbl name="node4">
+    <dgm:fillClrLst meth="repeat">
+      <a:schemeClr val="accent1"/>
+    </dgm:fillClrLst>
+    <dgm:linClrLst meth="repeat">
+      <a:schemeClr val="lt1"/>
+    </dgm:linClrLst>
+    <dgm:effectClrLst/>
+    <dgm:txLinClrLst/>
+    <dgm:txFillClrLst/>
+    <dgm:txEffectClrLst/>
+  </dgm:styleLbl>
+  <dgm:styleLbl name="fgImgPlace1">
+    <dgm:fillClrLst meth="repeat">
+      <a:schemeClr val="accent1">
+        <a:tint val="50000"/>
+      </a:schemeClr>
+    </dgm:fillClrLst>
+    <dgm:linClrLst meth="repeat">
+      <a:schemeClr val="lt1"/>
+    </dgm:linClrLst>
+    <dgm:effectClrLst/>
+    <dgm:txLinClrLst/>
+    <dgm:txFillClrLst meth="repeat">
+      <a:schemeClr val="lt1"/>
+    </dgm:txFillClrLst>
+    <dgm:txEffectClrLst/>
+  </dgm:styleLbl>
+  <dgm:styleLbl name="alignImgPlace1">
+    <dgm:fillClrLst meth="repeat">
+      <a:schemeClr val="accent1">
+        <a:tint val="50000"/>
+      </a:schemeClr>
+    </dgm:fillClrLst>
+    <dgm:linClrLst meth="repeat">
+      <a:schemeClr val="lt1"/>
+    </dgm:linClrLst>
+    <dgm:effectClrLst/>
+    <dgm:txLinClrLst/>
+    <dgm:txFillClrLst meth="repeat">
+      <a:schemeClr val="lt1"/>
+    </dgm:txFillClrLst>
+    <dgm:txEffectClrLst/>
+  </dgm:styleLbl>
+  <dgm:styleLbl name="bgImgPlace1">
+    <dgm:fillClrLst meth="repeat">
+      <a:schemeClr val="accent1">
+        <a:tint val="50000"/>
+      </a:schemeClr>
+    </dgm:fillClrLst>
+    <dgm:linClrLst meth="repeat">
+      <a:schemeClr val="lt1"/>
+    </dgm:linClrLst>
+    <dgm:effectClrLst/>
+    <dgm:txLinClrLst/>
+    <dgm:txFillClrLst meth="repeat">
+      <a:schemeClr val="lt1"/>
+    </dgm:txFillClrLst>
+    <dgm:txEffectClrLst/>
+  </dgm:styleLbl>
+  <dgm:styleLbl name="sibTrans2D1">
+    <dgm:fillClrLst meth="repeat">
+      <a:schemeClr val="accent1">
+        <a:tint val="60000"/>
+      </a:schemeClr>
+    </dgm:fillClrLst>
+    <dgm:linClrLst meth="repeat">
+      <a:schemeClr val="accent1">
+        <a:tint val="60000"/>
+      </a:schemeClr>
+    </dgm:linClrLst>
+    <dgm:effectClrLst/>
+    <dgm:txLinClrLst/>
+    <dgm:txFillClrLst/>
+    <dgm:txEffectClrLst/>
+  </dgm:styleLbl>
+  <dgm:styleLbl name="fgSibTrans2D1">
+    <dgm:fillClrLst meth="repeat">
+      <a:schemeClr val="accent1">
+        <a:tint val="60000"/>
+      </a:schemeClr>
+    </dgm:fillClrLst>
+    <dgm:linClrLst meth="repeat">
+      <a:schemeClr val="accent1">
+        <a:tint val="60000"/>
+      </a:schemeClr>
+    </dgm:linClrLst>
+    <dgm:effectClrLst/>
+    <dgm:txLinClrLst/>
+    <dgm:txFillClrLst/>
+    <dgm:txEffectClrLst/>
+  </dgm:styleLbl>
+  <dgm:styleLbl name="bgSibTrans2D1">
+    <dgm:fillClrLst meth="repeat">
+      <a:schemeClr val="accent1">
+        <a:tint val="60000"/>
+      </a:schemeClr>
+    </dgm:fillClrLst>
+    <dgm:linClrLst meth="repeat">
+      <a:schemeClr val="accent1">
+        <a:tint val="60000"/>
+      </a:schemeClr>
+    </dgm:linClrLst>
+    <dgm:effectClrLst/>
+    <dgm:txLinClrLst/>
+    <dgm:txFillClrLst/>
+    <dgm:txEffectClrLst/>
+  </dgm:styleLbl>
+  <dgm:styleLbl name="sibTrans1D1">
+    <dgm:fillClrLst meth="repeat">
+      <a:schemeClr val="accent1"/>
+    </dgm:fillClrLst>
+    <dgm:linClrLst meth="repeat">
+      <a:schemeClr val="accent1"/>
+    </dgm:linClrLst>
+    <dgm:effectClrLst/>
+    <dgm:txLinClrLst/>
+    <dgm:txFillClrLst meth="repeat">
+      <a:schemeClr val="tx1"/>
+    </dgm:txFillClrLst>
+    <dgm:txEffectClrLst/>
+  </dgm:styleLbl>
+  <dgm:styleLbl name="callout">
+    <dgm:fillClrLst meth="repeat">
+      <a:schemeClr val="accent1"/>
+    </dgm:fillClrLst>
+    <dgm:linClrLst meth="repeat">
+      <a:schemeClr val="accent1">
+        <a:tint val="50000"/>
+      </a:schemeClr>
+    </dgm:linClrLst>
+    <dgm:effectClrLst/>
+    <dgm:txLinClrLst/>
+    <dgm:txFillClrLst meth="repeat">
+      <a:schemeClr val="tx1"/>
+    </dgm:txFillClrLst>
+    <dgm:txEffectClrLst/>
+  </dgm:styleLbl>
+  <dgm:styleLbl name="asst0">
+    <dgm:fillClrLst meth="repeat">
+      <a:schemeClr val="accent1"/>
+    </dgm:fillClrLst>
+    <dgm:linClrLst meth="repeat">
+      <a:schemeClr val="lt1"/>
+    </dgm:linClrLst>
+    <dgm:effectClrLst/>
+    <dgm:txLinClrLst/>
+    <dgm:txFillClrLst/>
+    <dgm:txEffectClrLst/>
+  </dgm:styleLbl>
+  <dgm:styleLbl name="asst1">
+    <dgm:fillClrLst meth="repeat">
+      <a:schemeClr val="accent1"/>
+    </dgm:fillClrLst>
+    <dgm:linClrLst meth="repeat">
+      <a:schemeClr val="lt1"/>
+    </dgm:linClrLst>
+    <dgm:effectClrLst/>
+    <dgm:txLinClrLst/>
+    <dgm:txFillClrLst/>
+    <dgm:txEffectClrLst/>
+  </dgm:styleLbl>
+  <dgm:styleLbl name="asst2">
+    <dgm:fillClrLst meth="repeat">
+      <a:schemeClr val="accent1"/>
+    </dgm:fillClrLst>
+    <dgm:linClrLst meth="repeat">
+      <a:schemeClr val="lt1"/>
+    </dgm:linClrLst>
+    <dgm:effectClrLst/>
+    <dgm:txLinClrLst/>
+    <dgm:txFillClrLst/>
+    <dgm:txEffectClrLst/>
+  </dgm:styleLbl>
+  <dgm:styleLbl name="asst3">
+    <dgm:fillClrLst meth="repeat">
+      <a:schemeClr val="accent1"/>
+    </dgm:fillClrLst>
+    <dgm:linClrLst meth="repeat">
+      <a:schemeClr val="lt1"/>
+    </dgm:linClrLst>
+    <dgm:effectClrLst/>
+    <dgm:txLinClrLst/>
+    <dgm:txFillClrLst/>
+    <dgm:txEffectClrLst/>
+  </dgm:styleLbl>
+  <dgm:styleLbl name="asst4">
+    <dgm:fillClrLst meth="repeat">
+      <a:schemeClr val="accent1"/>
+    </dgm:fillClrLst>
+    <dgm:linClrLst meth="repeat">
+      <a:schemeClr val="lt1"/>
+    </dgm:linClrLst>
+    <dgm:effectClrLst/>
+    <dgm:txLinClrLst/>
+    <dgm:txFillClrLst/>
+    <dgm:txEffectClrLst/>
+  </dgm:styleLbl>
+  <dgm:styleLbl name="parChTrans2D1">
+    <dgm:fillClrLst meth="repeat">
+      <a:schemeClr val="accent1">
+        <a:tint val="60000"/>
+      </a:schemeClr>
+    </dgm:fillClrLst>
+    <dgm:linClrLst meth="repeat">
+      <a:schemeClr val="accent1">
+        <a:tint val="60000"/>
+      </a:schemeClr>
+    </dgm:linClrLst>
+    <dgm:effectClrLst/>
+    <dgm:txLinClrLst/>
+    <dgm:txFillClrLst meth="repeat">
+      <a:schemeClr val="lt1"/>
+    </dgm:txFillClrLst>
+    <dgm:txEffectClrLst/>
+  </dgm:styleLbl>
+  <dgm:styleLbl name="parChTrans2D2">
+    <dgm:fillClrLst meth="repeat">
+      <a:schemeClr val="accent1"/>
+    </dgm:fillClrLst>
+    <dgm:linClrLst meth="repeat">
+      <a:schemeClr val="accent1"/>
+    </dgm:linClrLst>
+    <dgm:effectClrLst/>
+    <dgm:txLinClrLst/>
+    <dgm:txFillClrLst meth="repeat">
+      <a:schemeClr val="lt1"/>
+    </dgm:txFillClrLst>
+    <dgm:txEffectClrLst/>
+  </dgm:styleLbl>
+  <dgm:styleLbl name="parChTrans2D3">
+    <dgm:fillClrLst meth="repeat">
+      <a:schemeClr val="accent1"/>
+    </dgm:fillClrLst>
+    <dgm:linClrLst meth="repeat">
+      <a:schemeClr val="accent1"/>
+    </dgm:linClrLst>
+    <dgm:effectClrLst/>
+    <dgm:txLinClrLst/>
+    <dgm:txFillClrLst meth="repeat">
+      <a:schemeClr val="lt1"/>
+    </dgm:txFillClrLst>
+    <dgm:txEffectClrLst/>
+  </dgm:styleLbl>
+  <dgm:styleLbl name="parChTrans2D4">
+    <dgm:fillClrLst meth="repeat">
+      <a:schemeClr val="accent1"/>
+    </dgm:fillClrLst>
+    <dgm:linClrLst meth="repeat">
+      <a:schemeClr val="accent1"/>
+    </dgm:linClrLst>
+    <dgm:effectClrLst/>
+    <dgm:txLinClrLst/>
+    <dgm:txFillClrLst meth="repeat">
+      <a:schemeClr val="lt1"/>
+    </dgm:txFillClrLst>
+    <dgm:txEffectClrLst/>
+  </dgm:styleLbl>
+  <dgm:styleLbl name="parChTrans1D1">
+    <dgm:fillClrLst meth="repeat">
+      <a:schemeClr val="accent1"/>
+    </dgm:fillClrLst>
+    <dgm:linClrLst meth="repeat">
+      <a:schemeClr val="accent1">
+        <a:shade val="60000"/>
+      </a:schemeClr>
+    </dgm:linClrLst>
+    <dgm:effectClrLst/>
+    <dgm:txLinClrLst/>
+    <dgm:txFillClrLst meth="repeat">
+      <a:schemeClr val="tx1"/>
+    </dgm:txFillClrLst>
+    <dgm:txEffectClrLst/>
+  </dgm:styleLbl>
+  <dgm:styleLbl name="parChTrans1D2">
+    <dgm:fillClrLst meth="repeat">
+      <a:schemeClr val="accent1"/>
+    </dgm:fillClrLst>
+    <dgm:linClrLst meth="repeat">
+      <a:schemeClr val="accent1">
+        <a:shade val="60000"/>
+      </a:schemeClr>
+    </dgm:linClrLst>
+    <dgm:effectClrLst/>
+    <dgm:txLinClrLst/>
+    <dgm:txFillClrLst meth="repeat">
+      <a:schemeClr val="tx1"/>
+    </dgm:txFillClrLst>
+    <dgm:txEffectClrLst/>
+  </dgm:styleLbl>
+  <dgm:styleLbl name="parChTrans1D3">
+    <dgm:fillClrLst meth="repeat">
+      <a:schemeClr val="accent1"/>
+    </dgm:fillClrLst>
+    <dgm:linClrLst meth="repeat">
+      <a:schemeClr val="accent1">
+        <a:shade val="80000"/>
+      </a:schemeClr>
+    </dgm:linClrLst>
+    <dgm:effectClrLst/>
+    <dgm:txLinClrLst/>
+    <dgm:txFillClrLst meth="repeat">
+      <a:schemeClr val="tx1"/>
+    </dgm:txFillClrLst>
+    <dgm:txEffectClrLst/>
+  </dgm:styleLbl>
+  <dgm:styleLbl name="parChTrans1D4">
+    <dgm:fillClrLst meth="repeat">
+      <a:schemeClr val="accent1"/>
+    </dgm:fillClrLst>
+    <dgm:linClrLst meth="repeat">
+      <a:schemeClr val="accent1">
+        <a:shade val="80000"/>
+      </a:schemeClr>
+    </dgm:linClrLst>
+    <dgm:effectClrLst/>
+    <dgm:txLinClrLst/>
+    <dgm:txFillClrLst meth="repeat">
+      <a:schemeClr val="tx1"/>
+    </dgm:txFillClrLst>
+    <dgm:txEffectClrLst/>
+  </dgm:styleLbl>
+  <dgm:styleLbl name="fgAcc1">
+    <dgm:fillClrLst meth="repeat">
+      <a:schemeClr val="lt1">
+        <a:alpha val="90000"/>
+      </a:schemeClr>
+    </dgm:fillClrLst>
+    <dgm:linClrLst meth="repeat">
+      <a:schemeClr val="accent1"/>
+    </dgm:linClrLst>
+    <dgm:effectClrLst/>
+    <dgm:txLinClrLst/>
+    <dgm:txFillClrLst meth="repeat">
+      <a:schemeClr val="dk1"/>
+    </dgm:txFillClrLst>
+    <dgm:txEffectClrLst/>
+  </dgm:styleLbl>
+  <dgm:styleLbl name="conFgAcc1">
+    <dgm:fillClrLst meth="repeat">
+      <a:schemeClr val="lt1">
+        <a:alpha val="90000"/>
+      </a:schemeClr>
+    </dgm:fillClrLst>
+    <dgm:linClrLst meth="repeat">
+      <a:schemeClr val="accent1"/>
+    </dgm:linClrLst>
+    <dgm:effectClrLst/>
+    <dgm:txLinClrLst/>
+    <dgm:txFillClrLst meth="repeat">
+      <a:schemeClr val="dk1"/>
+    </dgm:txFillClrLst>
+    <dgm:txEffectClrLst/>
+  </dgm:styleLbl>
+  <dgm:styleLbl name="alignAcc1">
+    <dgm:fillClrLst meth="repeat">
+      <a:schemeClr val="lt1">
+        <a:alpha val="90000"/>
+      </a:schemeClr>
+    </dgm:fillClrLst>
+    <dgm:linClrLst meth="repeat">
+      <a:schemeClr val="accent1"/>
+    </dgm:linClrLst>
+    <dgm:effectClrLst/>
+    <dgm:txLinClrLst/>
+    <dgm:txFillClrLst meth="repeat">
+      <a:schemeClr val="dk1"/>
+    </dgm:txFillClrLst>
+    <dgm:txEffectClrLst/>
+  </dgm:styleLbl>
+  <dgm:styleLbl name="trAlignAcc1">
+    <dgm:fillClrLst meth="repeat">
+      <a:schemeClr val="lt1">
+        <a:alpha val="40000"/>
+      </a:schemeClr>
+    </dgm:fillClrLst>
+    <dgm:linClrLst meth="repeat">
+      <a:schemeClr val="accent1"/>
+    </dgm:linClrLst>
+    <dgm:effectClrLst/>
+    <dgm:txLinClrLst/>
+    <dgm:txFillClrLst meth="repeat">
+      <a:schemeClr val="dk1"/>
+    </dgm:txFillClrLst>
+    <dgm:txEffectClrLst/>
+  </dgm:styleLbl>
+  <dgm:styleLbl name="bgAcc1">
+    <dgm:fillClrLst meth="repeat">
+      <a:schemeClr val="lt1">
+        <a:alpha val="90000"/>
+      </a:schemeClr>
+    </dgm:fillClrLst>
+    <dgm:linClrLst meth="repeat">
+      <a:schemeClr val="accent1"/>
+    </dgm:linClrLst>
+    <dgm:effectClrLst/>
+    <dgm:txLinClrLst/>
+    <dgm:txFillClrLst meth="repeat">
+      <a:schemeClr val="dk1"/>
+    </dgm:txFillClrLst>
+    <dgm:txEffectClrLst/>
+  </dgm:styleLbl>
+  <dgm:styleLbl name="solidFgAcc1">
+    <dgm:fillClrLst meth="repeat">
+      <a:schemeClr val="lt1"/>
+    </dgm:fillClrLst>
+    <dgm:linClrLst meth="repeat">
+      <a:schemeClr val="accent1"/>
+    </dgm:linClrLst>
+    <dgm:effectClrLst/>
+    <dgm:txLinClrLst/>
+    <dgm:txFillClrLst meth="repeat">
+      <a:schemeClr val="dk1"/>
+    </dgm:txFillClrLst>
+    <dgm:txEffectClrLst/>
+  </dgm:styleLbl>
+  <dgm:styleLbl name="solidAlignAcc1">
+    <dgm:fillClrLst meth="repeat">
+      <a:schemeClr val="lt1"/>
+    </dgm:fillClrLst>
+    <dgm:linClrLst meth="repeat">
+      <a:schemeClr val="accent1"/>
+    </dgm:linClrLst>
+    <dgm:effectClrLst/>
+    <dgm:txLinClrLst/>
+    <dgm:txFillClrLst meth="repeat">
+      <a:schemeClr val="dk1"/>
+    </dgm:txFillClrLst>
+    <dgm:txEffectClrLst/>
+  </dgm:styleLbl>
+  <dgm:styleLbl name="solidBgAcc1">
+    <dgm:fillClrLst meth="repeat">
+      <a:schemeClr val="lt1"/>
+    </dgm:fillClrLst>
+    <dgm:linClrLst meth="repeat">
+      <a:schemeClr val="accent1"/>
+    </dgm:linClrLst>
+    <dgm:effectClrLst/>
+    <dgm:txLinClrLst/>
+    <dgm:txFillClrLst meth="repeat">
+      <a:schemeClr val="dk1"/>
+    </dgm:txFillClrLst>
+    <dgm:txEffectClrLst/>
+  </dgm:styleLbl>
+  <dgm:styleLbl name="fgAccFollowNode1">
+    <dgm:fillClrLst meth="repeat">
+      <a:schemeClr val="accent1">
+        <a:alpha val="90000"/>
+        <a:tint val="40000"/>
+      </a:schemeClr>
+    </dgm:fillClrLst>
+    <dgm:linClrLst meth="repeat">
+      <a:schemeClr val="accent1">
+        <a:alpha val="90000"/>
+        <a:tint val="40000"/>
+      </a:schemeClr>
+    </dgm:linClrLst>
+    <dgm:effectClrLst/>
+    <dgm:txLinClrLst/>
+    <dgm:txFillClrLst meth="repeat">
+      <a:schemeClr val="dk1"/>
+    </dgm:txFillClrLst>
+    <dgm:txEffectClrLst/>
+  </dgm:styleLbl>
+  <dgm:styleLbl name="alignAccFollowNode1">
+    <dgm:fillClrLst meth="repeat">
+      <a:schemeClr val="accent1">
+        <a:alpha val="90000"/>
+        <a:tint val="40000"/>
+      </a:schemeClr>
+    </dgm:fillClrLst>
+    <dgm:linClrLst meth="repeat">
+      <a:schemeClr val="accent1">
+        <a:alpha val="90000"/>
+        <a:tint val="40000"/>
+      </a:schemeClr>
+    </dgm:linClrLst>
+    <dgm:effectClrLst/>
+    <dgm:txLinClrLst/>
+    <dgm:txFillClrLst meth="repeat">
+      <a:schemeClr val="dk1"/>
+    </dgm:txFillClrLst>
+    <dgm:txEffectClrLst/>
+  </dgm:styleLbl>
+  <dgm:styleLbl name="bgAccFollowNode1">
+    <dgm:fillClrLst meth="repeat">
+      <a:schemeClr val="accent1">
+        <a:alpha val="90000"/>
+        <a:tint val="40000"/>
+      </a:schemeClr>
+    </dgm:fillClrLst>
+    <dgm:linClrLst meth="repeat">
+      <a:schemeClr val="accent1">
+        <a:alpha val="90000"/>
+        <a:tint val="40000"/>
+      </a:schemeClr>
+    </dgm:linClrLst>
+    <dgm:effectClrLst/>
+    <dgm:txLinClrLst/>
+    <dgm:txFillClrLst meth="repeat">
+      <a:schemeClr val="dk1"/>
+    </dgm:txFillClrLst>
+    <dgm:txEffectClrLst/>
+  </dgm:styleLbl>
+  <dgm:styleLbl name="fgAcc0">
+    <dgm:fillClrLst meth="repeat">
+      <a:schemeClr val="lt1">
+        <a:alpha val="90000"/>
+      </a:schemeClr>
+    </dgm:fillClrLst>
+    <dgm:linClrLst meth="repeat">
+      <a:schemeClr val="accent1"/>
+    </dgm:linClrLst>
+    <dgm:effectClrLst/>
+    <dgm:txLinClrLst/>
+    <dgm:txFillClrLst meth="repeat">
+      <a:schemeClr val="dk1"/>
+    </dgm:txFillClrLst>
+    <dgm:txEffectClrLst/>
+  </dgm:styleLbl>
+  <dgm:styleLbl name="fgAcc2">
+    <dgm:fillClrLst meth="repeat">
+      <a:schemeClr val="lt1">
+        <a:alpha val="90000"/>
+      </a:schemeClr>
+    </dgm:fillClrLst>
+    <dgm:linClrLst meth="repeat">
+      <a:schemeClr val="accent1"/>
+    </dgm:linClrLst>
+    <dgm:effectClrLst/>
+    <dgm:txLinClrLst/>
+    <dgm:txFillClrLst meth="repeat">
+      <a:schemeClr val="dk1"/>
+    </dgm:txFillClrLst>
+    <dgm:txEffectClrLst/>
+  </dgm:styleLbl>
+  <dgm:styleLbl name="fgAcc3">
+    <dgm:fillClrLst meth="repeat">
+      <a:schemeClr val="lt1">
+        <a:alpha val="90000"/>
+      </a:schemeClr>
+    </dgm:fillClrLst>
+    <dgm:linClrLst meth="repeat">
+      <a:schemeClr val="accent1"/>
+    </dgm:linClrLst>
+    <dgm:effectClrLst/>
+    <dgm:txLinClrLst/>
+    <dgm:txFillClrLst meth="repeat">
+      <a:schemeClr val="dk1"/>
+    </dgm:txFillClrLst>
+    <dgm:txEffectClrLst/>
+  </dgm:styleLbl>
+  <dgm:styleLbl name="fgAcc4">
+    <dgm:fillClrLst meth="repeat">
+      <a:schemeClr val="lt1">
+        <a:alpha val="90000"/>
+      </a:schemeClr>
+    </dgm:fillClrLst>
+    <dgm:linClrLst meth="repeat">
+      <a:schemeClr val="accent1"/>
+    </dgm:linClrLst>
+    <dgm:effectClrLst/>
+    <dgm:txLinClrLst/>
+    <dgm:txFillClrLst meth="repeat">
+      <a:schemeClr val="dk1"/>
+    </dgm:txFillClrLst>
+    <dgm:txEffectClrLst/>
+  </dgm:styleLbl>
+  <dgm:styleLbl name="bgShp">
+    <dgm:fillClrLst meth="repeat">
+      <a:schemeClr val="accent1">
+        <a:tint val="40000"/>
+      </a:schemeClr>
+    </dgm:fillClrLst>
+    <dgm:linClrLst meth="repeat">
+      <a:schemeClr val="accent1"/>
+    </dgm:linClrLst>
+    <dgm:effectClrLst/>
+    <dgm:txLinClrLst/>
+    <dgm:txFillClrLst meth="repeat">
+      <a:schemeClr val="dk1"/>
+    </dgm:txFillClrLst>
+    <dgm:txEffectClrLst/>
+  </dgm:styleLbl>
+  <dgm:styleLbl name="dkBgShp">
+    <dgm:fillClrLst meth="repeat">
+      <a:schemeClr val="accent1">
+        <a:shade val="80000"/>
+      </a:schemeClr>
+    </dgm:fillClrLst>
+    <dgm:linClrLst meth="repeat">
+      <a:schemeClr val="accent1"/>
+    </dgm:linClrLst>
+    <dgm:effectClrLst/>
+    <dgm:txLinClrLst/>
+    <dgm:txFillClrLst meth="repeat">
+      <a:schemeClr val="lt1"/>
+    </dgm:txFillClrLst>
+    <dgm:txEffectClrLst/>
+  </dgm:styleLbl>
+  <dgm:styleLbl name="trBgShp">
+    <dgm:fillClrLst meth="repeat">
+      <a:schemeClr val="accent1">
+        <a:tint val="50000"/>
+        <a:alpha val="40000"/>
+      </a:schemeClr>
+    </dgm:fillClrLst>
+    <dgm:linClrLst meth="repeat">
+      <a:schemeClr val="accent1"/>
+    </dgm:linClrLst>
+    <dgm:effectClrLst/>
+    <dgm:txLinClrLst/>
+    <dgm:txFillClrLst meth="repeat">
+      <a:schemeClr val="lt1"/>
+    </dgm:txFillClrLst>
+    <dgm:txEffectClrLst/>
+  </dgm:styleLbl>
+  <dgm:styleLbl name="fgShp">
+    <dgm:fillClrLst meth="repeat">
+      <a:schemeClr val="accent1">
+        <a:tint val="60000"/>
+      </a:schemeClr>
+    </dgm:fillClrLst>
+    <dgm:linClrLst meth="repeat">
+      <a:schemeClr val="lt1"/>
+    </dgm:linClrLst>
+    <dgm:effectClrLst/>
+    <dgm:txLinClrLst/>
+    <dgm:txFillClrLst meth="repeat">
+      <a:schemeClr val="dk1"/>
+    </dgm:txFillClrLst>
+    <dgm:txEffectClrLst/>
+  </dgm:styleLbl>
+  <dgm:styleLbl name="revTx">
+    <dgm:fillClrLst meth="repeat">
+      <a:schemeClr val="lt1">
+        <a:alpha val="0"/>
+      </a:schemeClr>
+    </dgm:fillClrLst>
+    <dgm:linClrLst meth="repeat">
+      <a:schemeClr val="dk1">
+        <a:alpha val="0"/>
+      </a:schemeClr>
+    </dgm:linClrLst>
+    <dgm:effectClrLst/>
+    <dgm:txLinClrLst/>
+    <dgm:txFillClrLst meth="repeat">
+      <a:schemeClr val="tx1"/>
+    </dgm:txFillClrLst>
+    <dgm:txEffectClrLst/>
+  </dgm:styleLbl>
+</dgm:colorsDef>
+</file>
+
+<file path=ppt/diagrams/data1.xml><?xml version="1.0" encoding="utf-8"?>
+<dgm:dataModel xmlns:dgm="http://schemas.openxmlformats.org/drawingml/2006/diagram" xmlns:a="http://schemas.openxmlformats.org/drawingml/2006/main">
+  <dgm:ptLst>
+    <dgm:pt modelId="{A4C6754E-AB39-0A4E-B72E-0FA94EA19E93}" type="doc">
+      <dgm:prSet loTypeId="urn:microsoft.com/office/officeart/2008/layout/SquareAccentList" loCatId="" qsTypeId="urn:microsoft.com/office/officeart/2005/8/quickstyle/simple1" qsCatId="simple" csTypeId="urn:microsoft.com/office/officeart/2005/8/colors/accent1_2" csCatId="accent1" phldr="1"/>
+      <dgm:spPr/>
+      <dgm:t>
+        <a:bodyPr/>
+        <a:lstStyle/>
+        <a:p>
+          <a:endParaRPr lang="pl-PL"/>
+        </a:p>
+      </dgm:t>
+    </dgm:pt>
+    <dgm:pt modelId="{510A3989-00C8-184A-AD3C-28E507DEDB19}">
+      <dgm:prSet phldrT="[Tekst]"/>
+      <dgm:spPr/>
+      <dgm:t>
+        <a:bodyPr/>
+        <a:lstStyle/>
+        <a:p>
+          <a:r>
+            <a:rPr lang="pl-PL" dirty="0"/>
+            <a:t>Rastrowa</a:t>
+          </a:r>
+        </a:p>
+      </dgm:t>
+    </dgm:pt>
+    <dgm:pt modelId="{70143E6D-876C-5544-9B0B-39DE40AB8B6A}" type="parTrans" cxnId="{E9D41F50-E676-7E4A-BA83-99F08F4E4D0C}">
+      <dgm:prSet/>
+      <dgm:spPr/>
+      <dgm:t>
+        <a:bodyPr/>
+        <a:lstStyle/>
+        <a:p>
+          <a:endParaRPr lang="pl-PL"/>
+        </a:p>
+      </dgm:t>
+    </dgm:pt>
+    <dgm:pt modelId="{5D530942-E40E-524D-8C84-8008BE6D9E29}" type="sibTrans" cxnId="{E9D41F50-E676-7E4A-BA83-99F08F4E4D0C}">
+      <dgm:prSet/>
+      <dgm:spPr/>
+      <dgm:t>
+        <a:bodyPr/>
+        <a:lstStyle/>
+        <a:p>
+          <a:endParaRPr lang="pl-PL"/>
+        </a:p>
+      </dgm:t>
+    </dgm:pt>
+    <dgm:pt modelId="{43068B60-398E-A745-9360-FA7C0AEC09A3}">
+      <dgm:prSet phldrT="[Tekst]"/>
+      <dgm:spPr/>
+      <dgm:t>
+        <a:bodyPr/>
+        <a:lstStyle/>
+        <a:p>
+          <a:r>
+            <a:rPr lang="pl-PL" dirty="0"/>
+            <a:t>Opisuje piksele</a:t>
+          </a:r>
+        </a:p>
+      </dgm:t>
+    </dgm:pt>
+    <dgm:pt modelId="{9C25A524-98F2-0049-928D-9A8ACFD84F82}" type="parTrans" cxnId="{4425D87D-3316-3940-A523-CC008EE25874}">
+      <dgm:prSet/>
+      <dgm:spPr/>
+      <dgm:t>
+        <a:bodyPr/>
+        <a:lstStyle/>
+        <a:p>
+          <a:endParaRPr lang="pl-PL"/>
+        </a:p>
+      </dgm:t>
+    </dgm:pt>
+    <dgm:pt modelId="{095DC03D-EEED-F34B-8346-B178ECD1146D}" type="sibTrans" cxnId="{4425D87D-3316-3940-A523-CC008EE25874}">
+      <dgm:prSet/>
+      <dgm:spPr/>
+      <dgm:t>
+        <a:bodyPr/>
+        <a:lstStyle/>
+        <a:p>
+          <a:endParaRPr lang="pl-PL"/>
+        </a:p>
+      </dgm:t>
+    </dgm:pt>
+    <dgm:pt modelId="{316D7C09-8E36-EA46-86E7-DD036EB95373}">
+      <dgm:prSet phldrT="[Tekst]"/>
+      <dgm:spPr/>
+      <dgm:t>
+        <a:bodyPr/>
+        <a:lstStyle/>
+        <a:p>
+          <a:r>
+            <a:rPr lang="pl-PL" dirty="0"/>
+            <a:t>Stratne skalowanie</a:t>
+          </a:r>
+        </a:p>
+      </dgm:t>
+    </dgm:pt>
+    <dgm:pt modelId="{CA656BFC-00B5-9C4B-83BF-F9E2D096B252}" type="parTrans" cxnId="{321C8805-6D74-8E43-AABE-A2FCFE30BB2A}">
+      <dgm:prSet/>
+      <dgm:spPr/>
+      <dgm:t>
+        <a:bodyPr/>
+        <a:lstStyle/>
+        <a:p>
+          <a:endParaRPr lang="pl-PL"/>
+        </a:p>
+      </dgm:t>
+    </dgm:pt>
+    <dgm:pt modelId="{B8890970-81B7-7844-A3CE-F19768476B54}" type="sibTrans" cxnId="{321C8805-6D74-8E43-AABE-A2FCFE30BB2A}">
+      <dgm:prSet/>
+      <dgm:spPr/>
+      <dgm:t>
+        <a:bodyPr/>
+        <a:lstStyle/>
+        <a:p>
+          <a:endParaRPr lang="pl-PL"/>
+        </a:p>
+      </dgm:t>
+    </dgm:pt>
+    <dgm:pt modelId="{14519270-808C-9640-A54F-D5A8FB07D939}">
+      <dgm:prSet phldrT="[Tekst]"/>
+      <dgm:spPr/>
+      <dgm:t>
+        <a:bodyPr/>
+        <a:lstStyle/>
+        <a:p>
+          <a:r>
+            <a:rPr lang="pl-PL" dirty="0"/>
+            <a:t>Aparat cyfrowy, skaner…</a:t>
+          </a:r>
+        </a:p>
+      </dgm:t>
+    </dgm:pt>
+    <dgm:pt modelId="{48533EB0-EDD3-8B4A-BF29-9347D74408B2}" type="parTrans" cxnId="{4F435991-AF45-A741-A673-838358CE0939}">
+      <dgm:prSet/>
+      <dgm:spPr/>
+      <dgm:t>
+        <a:bodyPr/>
+        <a:lstStyle/>
+        <a:p>
+          <a:endParaRPr lang="pl-PL"/>
+        </a:p>
+      </dgm:t>
+    </dgm:pt>
+    <dgm:pt modelId="{D6546C33-FED5-484F-9946-751801AA0554}" type="sibTrans" cxnId="{4F435991-AF45-A741-A673-838358CE0939}">
+      <dgm:prSet/>
+      <dgm:spPr/>
+      <dgm:t>
+        <a:bodyPr/>
+        <a:lstStyle/>
+        <a:p>
+          <a:endParaRPr lang="pl-PL"/>
+        </a:p>
+      </dgm:t>
+    </dgm:pt>
+    <dgm:pt modelId="{CE10DC6B-90E6-DF42-A65E-D601BEA53C99}">
+      <dgm:prSet phldrT="[Tekst]"/>
+      <dgm:spPr/>
+      <dgm:t>
+        <a:bodyPr/>
+        <a:lstStyle/>
+        <a:p>
+          <a:r>
+            <a:rPr lang="pl-PL" dirty="0"/>
+            <a:t>Wektorowa</a:t>
+          </a:r>
+        </a:p>
+      </dgm:t>
+    </dgm:pt>
+    <dgm:pt modelId="{9E8A3488-2EBE-DB48-B91B-6B4F1965E679}" type="parTrans" cxnId="{26481DB4-0BA7-AF4A-B784-024C80EA94E4}">
+      <dgm:prSet/>
+      <dgm:spPr/>
+      <dgm:t>
+        <a:bodyPr/>
+        <a:lstStyle/>
+        <a:p>
+          <a:endParaRPr lang="pl-PL"/>
+        </a:p>
+      </dgm:t>
+    </dgm:pt>
+    <dgm:pt modelId="{B97F59BB-3062-9A47-A6E7-608081EC71DA}" type="sibTrans" cxnId="{26481DB4-0BA7-AF4A-B784-024C80EA94E4}">
+      <dgm:prSet/>
+      <dgm:spPr/>
+      <dgm:t>
+        <a:bodyPr/>
+        <a:lstStyle/>
+        <a:p>
+          <a:endParaRPr lang="pl-PL"/>
+        </a:p>
+      </dgm:t>
+    </dgm:pt>
+    <dgm:pt modelId="{C350379A-A828-AA48-92AE-63B9A3AC8B38}">
+      <dgm:prSet phldrT="[Tekst]"/>
+      <dgm:spPr/>
+      <dgm:t>
+        <a:bodyPr/>
+        <a:lstStyle/>
+        <a:p>
+          <a:r>
+            <a:rPr lang="pl-PL" dirty="0"/>
+            <a:t>Opisuje kształty</a:t>
+          </a:r>
+        </a:p>
+      </dgm:t>
+    </dgm:pt>
+    <dgm:pt modelId="{F4053042-337A-F14A-A720-6AD35DF85E00}" type="parTrans" cxnId="{D614E926-2C8B-C940-8F51-D8BCCB032468}">
+      <dgm:prSet/>
+      <dgm:spPr/>
+      <dgm:t>
+        <a:bodyPr/>
+        <a:lstStyle/>
+        <a:p>
+          <a:endParaRPr lang="pl-PL"/>
+        </a:p>
+      </dgm:t>
+    </dgm:pt>
+    <dgm:pt modelId="{DCAF816A-9241-9541-9867-11977337800A}" type="sibTrans" cxnId="{D614E926-2C8B-C940-8F51-D8BCCB032468}">
+      <dgm:prSet/>
+      <dgm:spPr/>
+      <dgm:t>
+        <a:bodyPr/>
+        <a:lstStyle/>
+        <a:p>
+          <a:endParaRPr lang="pl-PL"/>
+        </a:p>
+      </dgm:t>
+    </dgm:pt>
+    <dgm:pt modelId="{910F05F5-DC15-0045-A642-5DB1E359FAF8}">
+      <dgm:prSet phldrT="[Tekst]"/>
+      <dgm:spPr/>
+      <dgm:t>
+        <a:bodyPr/>
+        <a:lstStyle/>
+        <a:p>
+          <a:r>
+            <a:rPr lang="pl-PL" dirty="0"/>
+            <a:t>Bezstratne skalowanie</a:t>
+          </a:r>
+        </a:p>
+      </dgm:t>
+    </dgm:pt>
+    <dgm:pt modelId="{A4AE0D61-7110-8D41-88E5-33D853E0CF06}" type="parTrans" cxnId="{9377FB0C-A126-CA41-BFB7-1ECBB52F9FD4}">
+      <dgm:prSet/>
+      <dgm:spPr/>
+      <dgm:t>
+        <a:bodyPr/>
+        <a:lstStyle/>
+        <a:p>
+          <a:endParaRPr lang="pl-PL"/>
+        </a:p>
+      </dgm:t>
+    </dgm:pt>
+    <dgm:pt modelId="{82F1352E-AACC-8640-A39F-A976CC42F0B1}" type="sibTrans" cxnId="{9377FB0C-A126-CA41-BFB7-1ECBB52F9FD4}">
+      <dgm:prSet/>
+      <dgm:spPr/>
+      <dgm:t>
+        <a:bodyPr/>
+        <a:lstStyle/>
+        <a:p>
+          <a:endParaRPr lang="pl-PL"/>
+        </a:p>
+      </dgm:t>
+    </dgm:pt>
+    <dgm:pt modelId="{4A2C0D62-5D6D-0C42-85AD-5370F6DAF456}">
+      <dgm:prSet phldrT="[Tekst]"/>
+      <dgm:spPr/>
+      <dgm:t>
+        <a:bodyPr/>
+        <a:lstStyle/>
+        <a:p>
+          <a:r>
+            <a:rPr lang="pl-PL" dirty="0"/>
+            <a:t>Programy graficzne</a:t>
+          </a:r>
+        </a:p>
+      </dgm:t>
+    </dgm:pt>
+    <dgm:pt modelId="{D478C434-99E0-7C4C-8DF4-F75F2C7CDBD3}" type="parTrans" cxnId="{D6A6E740-5D2C-3B42-9879-0ABAC53AB566}">
+      <dgm:prSet/>
+      <dgm:spPr/>
+      <dgm:t>
+        <a:bodyPr/>
+        <a:lstStyle/>
+        <a:p>
+          <a:endParaRPr lang="pl-PL"/>
+        </a:p>
+      </dgm:t>
+    </dgm:pt>
+    <dgm:pt modelId="{2EAA6963-323E-2C4E-9348-061A3EA401DB}" type="sibTrans" cxnId="{D6A6E740-5D2C-3B42-9879-0ABAC53AB566}">
+      <dgm:prSet/>
+      <dgm:spPr/>
+      <dgm:t>
+        <a:bodyPr/>
+        <a:lstStyle/>
+        <a:p>
+          <a:endParaRPr lang="pl-PL"/>
+        </a:p>
+      </dgm:t>
+    </dgm:pt>
+    <dgm:pt modelId="{13A14065-11F3-BB4C-867A-AD0BB2EE193B}" type="pres">
+      <dgm:prSet presAssocID="{A4C6754E-AB39-0A4E-B72E-0FA94EA19E93}" presName="layout" presStyleCnt="0">
+        <dgm:presLayoutVars>
+          <dgm:chMax/>
+          <dgm:chPref/>
+          <dgm:dir/>
+          <dgm:resizeHandles/>
+        </dgm:presLayoutVars>
+      </dgm:prSet>
+      <dgm:spPr/>
+    </dgm:pt>
+    <dgm:pt modelId="{EC5DBAC8-58CC-744C-8F98-9DDF51F52D22}" type="pres">
+      <dgm:prSet presAssocID="{510A3989-00C8-184A-AD3C-28E507DEDB19}" presName="root" presStyleCnt="0">
+        <dgm:presLayoutVars>
+          <dgm:chMax/>
+          <dgm:chPref/>
+        </dgm:presLayoutVars>
+      </dgm:prSet>
+      <dgm:spPr/>
+    </dgm:pt>
+    <dgm:pt modelId="{FCF764EA-0721-EE45-ACF0-956859588B4A}" type="pres">
+      <dgm:prSet presAssocID="{510A3989-00C8-184A-AD3C-28E507DEDB19}" presName="rootComposite" presStyleCnt="0">
+        <dgm:presLayoutVars/>
+      </dgm:prSet>
+      <dgm:spPr/>
+    </dgm:pt>
+    <dgm:pt modelId="{0DD3ADC9-4176-7542-A1A2-7C2609B87A8B}" type="pres">
+      <dgm:prSet presAssocID="{510A3989-00C8-184A-AD3C-28E507DEDB19}" presName="ParentAccent" presStyleLbl="alignNode1" presStyleIdx="0" presStyleCnt="2"/>
+      <dgm:spPr/>
+    </dgm:pt>
+    <dgm:pt modelId="{ABDD2A06-52CF-B14D-8699-8262F38928C4}" type="pres">
+      <dgm:prSet presAssocID="{510A3989-00C8-184A-AD3C-28E507DEDB19}" presName="ParentSmallAccent" presStyleLbl="fgAcc1" presStyleIdx="0" presStyleCnt="2"/>
+      <dgm:spPr/>
+    </dgm:pt>
+    <dgm:pt modelId="{903AB7C0-D32E-6242-AEFA-499D44F56768}" type="pres">
+      <dgm:prSet presAssocID="{510A3989-00C8-184A-AD3C-28E507DEDB19}" presName="Parent" presStyleLbl="revTx" presStyleIdx="0" presStyleCnt="8">
+        <dgm:presLayoutVars>
+          <dgm:chMax/>
+          <dgm:chPref val="4"/>
+          <dgm:bulletEnabled val="1"/>
+        </dgm:presLayoutVars>
+      </dgm:prSet>
+      <dgm:spPr/>
+    </dgm:pt>
+    <dgm:pt modelId="{E41876C7-180C-DA4B-881C-3729DC960384}" type="pres">
+      <dgm:prSet presAssocID="{510A3989-00C8-184A-AD3C-28E507DEDB19}" presName="childShape" presStyleCnt="0">
+        <dgm:presLayoutVars>
+          <dgm:chMax val="0"/>
+          <dgm:chPref val="0"/>
+        </dgm:presLayoutVars>
+      </dgm:prSet>
+      <dgm:spPr/>
+    </dgm:pt>
+    <dgm:pt modelId="{52A806CB-81D7-634C-BCA7-B4E0A51D6090}" type="pres">
+      <dgm:prSet presAssocID="{43068B60-398E-A745-9360-FA7C0AEC09A3}" presName="childComposite" presStyleCnt="0">
+        <dgm:presLayoutVars>
+          <dgm:chMax val="0"/>
+          <dgm:chPref val="0"/>
+        </dgm:presLayoutVars>
+      </dgm:prSet>
+      <dgm:spPr/>
+    </dgm:pt>
+    <dgm:pt modelId="{95572EE3-EC41-BB47-80DC-0C29B4A7D495}" type="pres">
+      <dgm:prSet presAssocID="{43068B60-398E-A745-9360-FA7C0AEC09A3}" presName="ChildAccent" presStyleLbl="solidFgAcc1" presStyleIdx="0" presStyleCnt="6"/>
+      <dgm:spPr/>
+    </dgm:pt>
+    <dgm:pt modelId="{AD3013C4-83AD-8441-B664-0C73CD8D801E}" type="pres">
+      <dgm:prSet presAssocID="{43068B60-398E-A745-9360-FA7C0AEC09A3}" presName="Child" presStyleLbl="revTx" presStyleIdx="1" presStyleCnt="8">
+        <dgm:presLayoutVars>
+          <dgm:chMax val="0"/>
+          <dgm:chPref val="0"/>
+          <dgm:bulletEnabled val="1"/>
+        </dgm:presLayoutVars>
+      </dgm:prSet>
+      <dgm:spPr/>
+    </dgm:pt>
+    <dgm:pt modelId="{5697C8CE-C86F-4F46-935D-527B961918DF}" type="pres">
+      <dgm:prSet presAssocID="{316D7C09-8E36-EA46-86E7-DD036EB95373}" presName="childComposite" presStyleCnt="0">
+        <dgm:presLayoutVars>
+          <dgm:chMax val="0"/>
+          <dgm:chPref val="0"/>
+        </dgm:presLayoutVars>
+      </dgm:prSet>
+      <dgm:spPr/>
+    </dgm:pt>
+    <dgm:pt modelId="{F3B89C7B-26C6-A241-A2DF-E19A6A4D0793}" type="pres">
+      <dgm:prSet presAssocID="{316D7C09-8E36-EA46-86E7-DD036EB95373}" presName="ChildAccent" presStyleLbl="solidFgAcc1" presStyleIdx="1" presStyleCnt="6"/>
+      <dgm:spPr/>
+    </dgm:pt>
+    <dgm:pt modelId="{51645EC2-E61A-BA41-8595-D42ADBB4FCF7}" type="pres">
+      <dgm:prSet presAssocID="{316D7C09-8E36-EA46-86E7-DD036EB95373}" presName="Child" presStyleLbl="revTx" presStyleIdx="2" presStyleCnt="8">
+        <dgm:presLayoutVars>
+          <dgm:chMax val="0"/>
+          <dgm:chPref val="0"/>
+          <dgm:bulletEnabled val="1"/>
+        </dgm:presLayoutVars>
+      </dgm:prSet>
+      <dgm:spPr/>
+    </dgm:pt>
+    <dgm:pt modelId="{92D32EC4-4789-8441-B267-A744F3BB91B9}" type="pres">
+      <dgm:prSet presAssocID="{14519270-808C-9640-A54F-D5A8FB07D939}" presName="childComposite" presStyleCnt="0">
+        <dgm:presLayoutVars>
+          <dgm:chMax val="0"/>
+          <dgm:chPref val="0"/>
+        </dgm:presLayoutVars>
+      </dgm:prSet>
+      <dgm:spPr/>
+    </dgm:pt>
+    <dgm:pt modelId="{14BA295F-5277-6841-8E2F-D41D20978828}" type="pres">
+      <dgm:prSet presAssocID="{14519270-808C-9640-A54F-D5A8FB07D939}" presName="ChildAccent" presStyleLbl="solidFgAcc1" presStyleIdx="2" presStyleCnt="6"/>
+      <dgm:spPr/>
+    </dgm:pt>
+    <dgm:pt modelId="{342BDED5-B9DB-9F4B-8F98-70673DC6B30A}" type="pres">
+      <dgm:prSet presAssocID="{14519270-808C-9640-A54F-D5A8FB07D939}" presName="Child" presStyleLbl="revTx" presStyleIdx="3" presStyleCnt="8">
+        <dgm:presLayoutVars>
+          <dgm:chMax val="0"/>
+          <dgm:chPref val="0"/>
+          <dgm:bulletEnabled val="1"/>
+        </dgm:presLayoutVars>
+      </dgm:prSet>
+      <dgm:spPr/>
+    </dgm:pt>
+    <dgm:pt modelId="{FBCBDED4-359D-DE44-86CC-3D5179B15E99}" type="pres">
+      <dgm:prSet presAssocID="{CE10DC6B-90E6-DF42-A65E-D601BEA53C99}" presName="root" presStyleCnt="0">
+        <dgm:presLayoutVars>
+          <dgm:chMax/>
+          <dgm:chPref/>
+        </dgm:presLayoutVars>
+      </dgm:prSet>
+      <dgm:spPr/>
+    </dgm:pt>
+    <dgm:pt modelId="{227BE092-F211-1C4D-BD84-C55B35D7451B}" type="pres">
+      <dgm:prSet presAssocID="{CE10DC6B-90E6-DF42-A65E-D601BEA53C99}" presName="rootComposite" presStyleCnt="0">
+        <dgm:presLayoutVars/>
+      </dgm:prSet>
+      <dgm:spPr/>
+    </dgm:pt>
+    <dgm:pt modelId="{9798419D-0137-C048-9106-812761FD8CB7}" type="pres">
+      <dgm:prSet presAssocID="{CE10DC6B-90E6-DF42-A65E-D601BEA53C99}" presName="ParentAccent" presStyleLbl="alignNode1" presStyleIdx="1" presStyleCnt="2"/>
+      <dgm:spPr/>
+    </dgm:pt>
+    <dgm:pt modelId="{80FEB888-F431-0740-A1DE-620E8EC9D0F1}" type="pres">
+      <dgm:prSet presAssocID="{CE10DC6B-90E6-DF42-A65E-D601BEA53C99}" presName="ParentSmallAccent" presStyleLbl="fgAcc1" presStyleIdx="1" presStyleCnt="2"/>
+      <dgm:spPr/>
+    </dgm:pt>
+    <dgm:pt modelId="{5778DE17-C2A6-2542-8FC6-3D5C8E81AEA0}" type="pres">
+      <dgm:prSet presAssocID="{CE10DC6B-90E6-DF42-A65E-D601BEA53C99}" presName="Parent" presStyleLbl="revTx" presStyleIdx="4" presStyleCnt="8">
+        <dgm:presLayoutVars>
+          <dgm:chMax/>
+          <dgm:chPref val="4"/>
+          <dgm:bulletEnabled val="1"/>
+        </dgm:presLayoutVars>
+      </dgm:prSet>
+      <dgm:spPr/>
+    </dgm:pt>
+    <dgm:pt modelId="{99158B37-5B43-4840-A016-D54DFD0EDEC5}" type="pres">
+      <dgm:prSet presAssocID="{CE10DC6B-90E6-DF42-A65E-D601BEA53C99}" presName="childShape" presStyleCnt="0">
+        <dgm:presLayoutVars>
+          <dgm:chMax val="0"/>
+          <dgm:chPref val="0"/>
+        </dgm:presLayoutVars>
+      </dgm:prSet>
+      <dgm:spPr/>
+    </dgm:pt>
+    <dgm:pt modelId="{802454E6-578E-9A42-AC5C-01034E7CEDA4}" type="pres">
+      <dgm:prSet presAssocID="{C350379A-A828-AA48-92AE-63B9A3AC8B38}" presName="childComposite" presStyleCnt="0">
+        <dgm:presLayoutVars>
+          <dgm:chMax val="0"/>
+          <dgm:chPref val="0"/>
+        </dgm:presLayoutVars>
+      </dgm:prSet>
+      <dgm:spPr/>
+    </dgm:pt>
+    <dgm:pt modelId="{7DE27504-6B35-1C4C-8555-1675A4D4E0F4}" type="pres">
+      <dgm:prSet presAssocID="{C350379A-A828-AA48-92AE-63B9A3AC8B38}" presName="ChildAccent" presStyleLbl="solidFgAcc1" presStyleIdx="3" presStyleCnt="6"/>
+      <dgm:spPr/>
+    </dgm:pt>
+    <dgm:pt modelId="{1E80D503-12F3-3B4A-ACBB-652C2DFE75F3}" type="pres">
+      <dgm:prSet presAssocID="{C350379A-A828-AA48-92AE-63B9A3AC8B38}" presName="Child" presStyleLbl="revTx" presStyleIdx="5" presStyleCnt="8">
+        <dgm:presLayoutVars>
+          <dgm:chMax val="0"/>
+          <dgm:chPref val="0"/>
+          <dgm:bulletEnabled val="1"/>
+        </dgm:presLayoutVars>
+      </dgm:prSet>
+      <dgm:spPr/>
+    </dgm:pt>
+    <dgm:pt modelId="{0190D1AF-F7AC-6A45-BAA5-CB5EF5E5B3B0}" type="pres">
+      <dgm:prSet presAssocID="{910F05F5-DC15-0045-A642-5DB1E359FAF8}" presName="childComposite" presStyleCnt="0">
+        <dgm:presLayoutVars>
+          <dgm:chMax val="0"/>
+          <dgm:chPref val="0"/>
+        </dgm:presLayoutVars>
+      </dgm:prSet>
+      <dgm:spPr/>
+    </dgm:pt>
+    <dgm:pt modelId="{7E69614A-B6D8-4D46-A2FD-AB2D97465549}" type="pres">
+      <dgm:prSet presAssocID="{910F05F5-DC15-0045-A642-5DB1E359FAF8}" presName="ChildAccent" presStyleLbl="solidFgAcc1" presStyleIdx="4" presStyleCnt="6"/>
+      <dgm:spPr/>
+    </dgm:pt>
+    <dgm:pt modelId="{0D4D51A7-8C4B-4A47-A34F-67EDA071FF85}" type="pres">
+      <dgm:prSet presAssocID="{910F05F5-DC15-0045-A642-5DB1E359FAF8}" presName="Child" presStyleLbl="revTx" presStyleIdx="6" presStyleCnt="8">
+        <dgm:presLayoutVars>
+          <dgm:chMax val="0"/>
+          <dgm:chPref val="0"/>
+          <dgm:bulletEnabled val="1"/>
+        </dgm:presLayoutVars>
+      </dgm:prSet>
+      <dgm:spPr/>
+    </dgm:pt>
+    <dgm:pt modelId="{B4820E4F-2B11-0E41-9FF5-8414EFDAF8FA}" type="pres">
+      <dgm:prSet presAssocID="{4A2C0D62-5D6D-0C42-85AD-5370F6DAF456}" presName="childComposite" presStyleCnt="0">
+        <dgm:presLayoutVars>
+          <dgm:chMax val="0"/>
+          <dgm:chPref val="0"/>
+        </dgm:presLayoutVars>
+      </dgm:prSet>
+      <dgm:spPr/>
+    </dgm:pt>
+    <dgm:pt modelId="{BEC48CC0-AA37-1746-8756-A1110E632311}" type="pres">
+      <dgm:prSet presAssocID="{4A2C0D62-5D6D-0C42-85AD-5370F6DAF456}" presName="ChildAccent" presStyleLbl="solidFgAcc1" presStyleIdx="5" presStyleCnt="6"/>
+      <dgm:spPr/>
+    </dgm:pt>
+    <dgm:pt modelId="{FE3539F2-352E-2647-AADF-F4CB600BD9BC}" type="pres">
+      <dgm:prSet presAssocID="{4A2C0D62-5D6D-0C42-85AD-5370F6DAF456}" presName="Child" presStyleLbl="revTx" presStyleIdx="7" presStyleCnt="8">
+        <dgm:presLayoutVars>
+          <dgm:chMax val="0"/>
+          <dgm:chPref val="0"/>
+          <dgm:bulletEnabled val="1"/>
+        </dgm:presLayoutVars>
+      </dgm:prSet>
+      <dgm:spPr/>
+    </dgm:pt>
+  </dgm:ptLst>
+  <dgm:cxnLst>
+    <dgm:cxn modelId="{321C8805-6D74-8E43-AABE-A2FCFE30BB2A}" srcId="{510A3989-00C8-184A-AD3C-28E507DEDB19}" destId="{316D7C09-8E36-EA46-86E7-DD036EB95373}" srcOrd="1" destOrd="0" parTransId="{CA656BFC-00B5-9C4B-83BF-F9E2D096B252}" sibTransId="{B8890970-81B7-7844-A3CE-F19768476B54}"/>
+    <dgm:cxn modelId="{9377FB0C-A126-CA41-BFB7-1ECBB52F9FD4}" srcId="{CE10DC6B-90E6-DF42-A65E-D601BEA53C99}" destId="{910F05F5-DC15-0045-A642-5DB1E359FAF8}" srcOrd="1" destOrd="0" parTransId="{A4AE0D61-7110-8D41-88E5-33D853E0CF06}" sibTransId="{82F1352E-AACC-8640-A39F-A976CC42F0B1}"/>
+    <dgm:cxn modelId="{D614E926-2C8B-C940-8F51-D8BCCB032468}" srcId="{CE10DC6B-90E6-DF42-A65E-D601BEA53C99}" destId="{C350379A-A828-AA48-92AE-63B9A3AC8B38}" srcOrd="0" destOrd="0" parTransId="{F4053042-337A-F14A-A720-6AD35DF85E00}" sibTransId="{DCAF816A-9241-9541-9867-11977337800A}"/>
+    <dgm:cxn modelId="{BBEF4830-8328-B24A-9525-02453ABDD637}" type="presOf" srcId="{316D7C09-8E36-EA46-86E7-DD036EB95373}" destId="{51645EC2-E61A-BA41-8595-D42ADBB4FCF7}" srcOrd="0" destOrd="0" presId="urn:microsoft.com/office/officeart/2008/layout/SquareAccentList"/>
+    <dgm:cxn modelId="{DF98593B-1775-7042-891B-560215D31B71}" type="presOf" srcId="{4A2C0D62-5D6D-0C42-85AD-5370F6DAF456}" destId="{FE3539F2-352E-2647-AADF-F4CB600BD9BC}" srcOrd="0" destOrd="0" presId="urn:microsoft.com/office/officeart/2008/layout/SquareAccentList"/>
+    <dgm:cxn modelId="{D6A6E740-5D2C-3B42-9879-0ABAC53AB566}" srcId="{CE10DC6B-90E6-DF42-A65E-D601BEA53C99}" destId="{4A2C0D62-5D6D-0C42-85AD-5370F6DAF456}" srcOrd="2" destOrd="0" parTransId="{D478C434-99E0-7C4C-8DF4-F75F2C7CDBD3}" sibTransId="{2EAA6963-323E-2C4E-9348-061A3EA401DB}"/>
+    <dgm:cxn modelId="{E9D41F50-E676-7E4A-BA83-99F08F4E4D0C}" srcId="{A4C6754E-AB39-0A4E-B72E-0FA94EA19E93}" destId="{510A3989-00C8-184A-AD3C-28E507DEDB19}" srcOrd="0" destOrd="0" parTransId="{70143E6D-876C-5544-9B0B-39DE40AB8B6A}" sibTransId="{5D530942-E40E-524D-8C84-8008BE6D9E29}"/>
+    <dgm:cxn modelId="{33C1F160-45E8-7640-93DB-10633E0C8FC5}" type="presOf" srcId="{910F05F5-DC15-0045-A642-5DB1E359FAF8}" destId="{0D4D51A7-8C4B-4A47-A34F-67EDA071FF85}" srcOrd="0" destOrd="0" presId="urn:microsoft.com/office/officeart/2008/layout/SquareAccentList"/>
+    <dgm:cxn modelId="{61E3F560-709D-2743-B90E-ED9427E024EA}" type="presOf" srcId="{43068B60-398E-A745-9360-FA7C0AEC09A3}" destId="{AD3013C4-83AD-8441-B664-0C73CD8D801E}" srcOrd="0" destOrd="0" presId="urn:microsoft.com/office/officeart/2008/layout/SquareAccentList"/>
+    <dgm:cxn modelId="{4425D87D-3316-3940-A523-CC008EE25874}" srcId="{510A3989-00C8-184A-AD3C-28E507DEDB19}" destId="{43068B60-398E-A745-9360-FA7C0AEC09A3}" srcOrd="0" destOrd="0" parTransId="{9C25A524-98F2-0049-928D-9A8ACFD84F82}" sibTransId="{095DC03D-EEED-F34B-8346-B178ECD1146D}"/>
+    <dgm:cxn modelId="{DFB1458E-244C-AC42-BF24-5B56894E85D3}" type="presOf" srcId="{A4C6754E-AB39-0A4E-B72E-0FA94EA19E93}" destId="{13A14065-11F3-BB4C-867A-AD0BB2EE193B}" srcOrd="0" destOrd="0" presId="urn:microsoft.com/office/officeart/2008/layout/SquareAccentList"/>
+    <dgm:cxn modelId="{4F435991-AF45-A741-A673-838358CE0939}" srcId="{510A3989-00C8-184A-AD3C-28E507DEDB19}" destId="{14519270-808C-9640-A54F-D5A8FB07D939}" srcOrd="2" destOrd="0" parTransId="{48533EB0-EDD3-8B4A-BF29-9347D74408B2}" sibTransId="{D6546C33-FED5-484F-9946-751801AA0554}"/>
+    <dgm:cxn modelId="{4E5D86B0-4CDE-BA4B-AA50-EA4985F07118}" type="presOf" srcId="{C350379A-A828-AA48-92AE-63B9A3AC8B38}" destId="{1E80D503-12F3-3B4A-ACBB-652C2DFE75F3}" srcOrd="0" destOrd="0" presId="urn:microsoft.com/office/officeart/2008/layout/SquareAccentList"/>
+    <dgm:cxn modelId="{26481DB4-0BA7-AF4A-B784-024C80EA94E4}" srcId="{A4C6754E-AB39-0A4E-B72E-0FA94EA19E93}" destId="{CE10DC6B-90E6-DF42-A65E-D601BEA53C99}" srcOrd="1" destOrd="0" parTransId="{9E8A3488-2EBE-DB48-B91B-6B4F1965E679}" sibTransId="{B97F59BB-3062-9A47-A6E7-608081EC71DA}"/>
+    <dgm:cxn modelId="{1DEE2AC5-BBC4-F44E-9F56-DB1DA4D150C1}" type="presOf" srcId="{510A3989-00C8-184A-AD3C-28E507DEDB19}" destId="{903AB7C0-D32E-6242-AEFA-499D44F56768}" srcOrd="0" destOrd="0" presId="urn:microsoft.com/office/officeart/2008/layout/SquareAccentList"/>
+    <dgm:cxn modelId="{A7B486CF-1C98-EE4C-8E9D-AF0243A1766A}" type="presOf" srcId="{14519270-808C-9640-A54F-D5A8FB07D939}" destId="{342BDED5-B9DB-9F4B-8F98-70673DC6B30A}" srcOrd="0" destOrd="0" presId="urn:microsoft.com/office/officeart/2008/layout/SquareAccentList"/>
+    <dgm:cxn modelId="{D05AC7EA-0184-5040-A7CC-81899976BCC6}" type="presOf" srcId="{CE10DC6B-90E6-DF42-A65E-D601BEA53C99}" destId="{5778DE17-C2A6-2542-8FC6-3D5C8E81AEA0}" srcOrd="0" destOrd="0" presId="urn:microsoft.com/office/officeart/2008/layout/SquareAccentList"/>
+    <dgm:cxn modelId="{FB78434A-98F3-DB45-82EE-C3A1F02A5D95}" type="presParOf" srcId="{13A14065-11F3-BB4C-867A-AD0BB2EE193B}" destId="{EC5DBAC8-58CC-744C-8F98-9DDF51F52D22}" srcOrd="0" destOrd="0" presId="urn:microsoft.com/office/officeart/2008/layout/SquareAccentList"/>
+    <dgm:cxn modelId="{E1E29833-7C61-2B4D-B439-FDB8372A6E9A}" type="presParOf" srcId="{EC5DBAC8-58CC-744C-8F98-9DDF51F52D22}" destId="{FCF764EA-0721-EE45-ACF0-956859588B4A}" srcOrd="0" destOrd="0" presId="urn:microsoft.com/office/officeart/2008/layout/SquareAccentList"/>
+    <dgm:cxn modelId="{7DEA1BE5-A098-ED46-AFEF-832D917A3915}" type="presParOf" srcId="{FCF764EA-0721-EE45-ACF0-956859588B4A}" destId="{0DD3ADC9-4176-7542-A1A2-7C2609B87A8B}" srcOrd="0" destOrd="0" presId="urn:microsoft.com/office/officeart/2008/layout/SquareAccentList"/>
+    <dgm:cxn modelId="{997B0BC8-5DD9-A549-A2CD-04741C782C10}" type="presParOf" srcId="{FCF764EA-0721-EE45-ACF0-956859588B4A}" destId="{ABDD2A06-52CF-B14D-8699-8262F38928C4}" srcOrd="1" destOrd="0" presId="urn:microsoft.com/office/officeart/2008/layout/SquareAccentList"/>
+    <dgm:cxn modelId="{1D00BA37-3713-1D46-BE3A-CD958E33E8D8}" type="presParOf" srcId="{FCF764EA-0721-EE45-ACF0-956859588B4A}" destId="{903AB7C0-D32E-6242-AEFA-499D44F56768}" srcOrd="2" destOrd="0" presId="urn:microsoft.com/office/officeart/2008/layout/SquareAccentList"/>
+    <dgm:cxn modelId="{2C979385-6FF6-A34E-9FE4-B28A5B80173A}" type="presParOf" srcId="{EC5DBAC8-58CC-744C-8F98-9DDF51F52D22}" destId="{E41876C7-180C-DA4B-881C-3729DC960384}" srcOrd="1" destOrd="0" presId="urn:microsoft.com/office/officeart/2008/layout/SquareAccentList"/>
+    <dgm:cxn modelId="{A113B6A8-2C2E-2148-A494-6377DBBE2458}" type="presParOf" srcId="{E41876C7-180C-DA4B-881C-3729DC960384}" destId="{52A806CB-81D7-634C-BCA7-B4E0A51D6090}" srcOrd="0" destOrd="0" presId="urn:microsoft.com/office/officeart/2008/layout/SquareAccentList"/>
+    <dgm:cxn modelId="{48FEC54B-5160-8E4D-8609-156BCE36A399}" type="presParOf" srcId="{52A806CB-81D7-634C-BCA7-B4E0A51D6090}" destId="{95572EE3-EC41-BB47-80DC-0C29B4A7D495}" srcOrd="0" destOrd="0" presId="urn:microsoft.com/office/officeart/2008/layout/SquareAccentList"/>
+    <dgm:cxn modelId="{6FBC31C9-AE05-5E48-A3EC-3DA1D4FD1262}" type="presParOf" srcId="{52A806CB-81D7-634C-BCA7-B4E0A51D6090}" destId="{AD3013C4-83AD-8441-B664-0C73CD8D801E}" srcOrd="1" destOrd="0" presId="urn:microsoft.com/office/officeart/2008/layout/SquareAccentList"/>
+    <dgm:cxn modelId="{8BC1AF4D-8ADA-9E4B-B20D-F9EE8884DE07}" type="presParOf" srcId="{E41876C7-180C-DA4B-881C-3729DC960384}" destId="{5697C8CE-C86F-4F46-935D-527B961918DF}" srcOrd="1" destOrd="0" presId="urn:microsoft.com/office/officeart/2008/layout/SquareAccentList"/>
+    <dgm:cxn modelId="{086C5BDB-3786-0A4C-BB72-FB2EFCFC4D65}" type="presParOf" srcId="{5697C8CE-C86F-4F46-935D-527B961918DF}" destId="{F3B89C7B-26C6-A241-A2DF-E19A6A4D0793}" srcOrd="0" destOrd="0" presId="urn:microsoft.com/office/officeart/2008/layout/SquareAccentList"/>
+    <dgm:cxn modelId="{7961B961-42BE-0742-B552-4A4E84D2C6A0}" type="presParOf" srcId="{5697C8CE-C86F-4F46-935D-527B961918DF}" destId="{51645EC2-E61A-BA41-8595-D42ADBB4FCF7}" srcOrd="1" destOrd="0" presId="urn:microsoft.com/office/officeart/2008/layout/SquareAccentList"/>
+    <dgm:cxn modelId="{42FE5AE7-896C-764A-9F9D-C4820999469B}" type="presParOf" srcId="{E41876C7-180C-DA4B-881C-3729DC960384}" destId="{92D32EC4-4789-8441-B267-A744F3BB91B9}" srcOrd="2" destOrd="0" presId="urn:microsoft.com/office/officeart/2008/layout/SquareAccentList"/>
+    <dgm:cxn modelId="{FAC35A47-3915-5049-9002-B0B7256905D2}" type="presParOf" srcId="{92D32EC4-4789-8441-B267-A744F3BB91B9}" destId="{14BA295F-5277-6841-8E2F-D41D20978828}" srcOrd="0" destOrd="0" presId="urn:microsoft.com/office/officeart/2008/layout/SquareAccentList"/>
+    <dgm:cxn modelId="{BBC9B2F2-01C5-1947-8B8F-393CE60B8816}" type="presParOf" srcId="{92D32EC4-4789-8441-B267-A744F3BB91B9}" destId="{342BDED5-B9DB-9F4B-8F98-70673DC6B30A}" srcOrd="1" destOrd="0" presId="urn:microsoft.com/office/officeart/2008/layout/SquareAccentList"/>
+    <dgm:cxn modelId="{7362B883-E479-994E-BA98-CF8D56730D85}" type="presParOf" srcId="{13A14065-11F3-BB4C-867A-AD0BB2EE193B}" destId="{FBCBDED4-359D-DE44-86CC-3D5179B15E99}" srcOrd="1" destOrd="0" presId="urn:microsoft.com/office/officeart/2008/layout/SquareAccentList"/>
+    <dgm:cxn modelId="{505A3217-3EB5-4449-8988-38CCCD421621}" type="presParOf" srcId="{FBCBDED4-359D-DE44-86CC-3D5179B15E99}" destId="{227BE092-F211-1C4D-BD84-C55B35D7451B}" srcOrd="0" destOrd="0" presId="urn:microsoft.com/office/officeart/2008/layout/SquareAccentList"/>
+    <dgm:cxn modelId="{9636A21E-1D18-BD4A-8E14-7A5E8B919ED1}" type="presParOf" srcId="{227BE092-F211-1C4D-BD84-C55B35D7451B}" destId="{9798419D-0137-C048-9106-812761FD8CB7}" srcOrd="0" destOrd="0" presId="urn:microsoft.com/office/officeart/2008/layout/SquareAccentList"/>
+    <dgm:cxn modelId="{2AC3F722-FEBB-1C4C-97E4-A5CE44040BDC}" type="presParOf" srcId="{227BE092-F211-1C4D-BD84-C55B35D7451B}" destId="{80FEB888-F431-0740-A1DE-620E8EC9D0F1}" srcOrd="1" destOrd="0" presId="urn:microsoft.com/office/officeart/2008/layout/SquareAccentList"/>
+    <dgm:cxn modelId="{417D4351-4FBD-DB47-B7B8-B5F9291B0036}" type="presParOf" srcId="{227BE092-F211-1C4D-BD84-C55B35D7451B}" destId="{5778DE17-C2A6-2542-8FC6-3D5C8E81AEA0}" srcOrd="2" destOrd="0" presId="urn:microsoft.com/office/officeart/2008/layout/SquareAccentList"/>
+    <dgm:cxn modelId="{94D15C08-5841-EA40-920E-6CD180EC5454}" type="presParOf" srcId="{FBCBDED4-359D-DE44-86CC-3D5179B15E99}" destId="{99158B37-5B43-4840-A016-D54DFD0EDEC5}" srcOrd="1" destOrd="0" presId="urn:microsoft.com/office/officeart/2008/layout/SquareAccentList"/>
+    <dgm:cxn modelId="{3A65C8AD-2BDA-034C-9BCE-0683AD834C05}" type="presParOf" srcId="{99158B37-5B43-4840-A016-D54DFD0EDEC5}" destId="{802454E6-578E-9A42-AC5C-01034E7CEDA4}" srcOrd="0" destOrd="0" presId="urn:microsoft.com/office/officeart/2008/layout/SquareAccentList"/>
+    <dgm:cxn modelId="{12D364EF-E158-BB4E-8B67-AA4C1409FC3F}" type="presParOf" srcId="{802454E6-578E-9A42-AC5C-01034E7CEDA4}" destId="{7DE27504-6B35-1C4C-8555-1675A4D4E0F4}" srcOrd="0" destOrd="0" presId="urn:microsoft.com/office/officeart/2008/layout/SquareAccentList"/>
+    <dgm:cxn modelId="{58DAFF7F-12BA-AD40-9489-8078E33AB223}" type="presParOf" srcId="{802454E6-578E-9A42-AC5C-01034E7CEDA4}" destId="{1E80D503-12F3-3B4A-ACBB-652C2DFE75F3}" srcOrd="1" destOrd="0" presId="urn:microsoft.com/office/officeart/2008/layout/SquareAccentList"/>
+    <dgm:cxn modelId="{64748506-9A91-124D-8881-ADE1F382BA12}" type="presParOf" srcId="{99158B37-5B43-4840-A016-D54DFD0EDEC5}" destId="{0190D1AF-F7AC-6A45-BAA5-CB5EF5E5B3B0}" srcOrd="1" destOrd="0" presId="urn:microsoft.com/office/officeart/2008/layout/SquareAccentList"/>
+    <dgm:cxn modelId="{8802CE21-680D-AB4D-92F1-6E7C6DD54697}" type="presParOf" srcId="{0190D1AF-F7AC-6A45-BAA5-CB5EF5E5B3B0}" destId="{7E69614A-B6D8-4D46-A2FD-AB2D97465549}" srcOrd="0" destOrd="0" presId="urn:microsoft.com/office/officeart/2008/layout/SquareAccentList"/>
+    <dgm:cxn modelId="{7A73D255-516E-3B42-BF8C-B53EB8D21EF6}" type="presParOf" srcId="{0190D1AF-F7AC-6A45-BAA5-CB5EF5E5B3B0}" destId="{0D4D51A7-8C4B-4A47-A34F-67EDA071FF85}" srcOrd="1" destOrd="0" presId="urn:microsoft.com/office/officeart/2008/layout/SquareAccentList"/>
+    <dgm:cxn modelId="{8D58A78A-7B5B-5645-8FDF-D369F1426CBE}" type="presParOf" srcId="{99158B37-5B43-4840-A016-D54DFD0EDEC5}" destId="{B4820E4F-2B11-0E41-9FF5-8414EFDAF8FA}" srcOrd="2" destOrd="0" presId="urn:microsoft.com/office/officeart/2008/layout/SquareAccentList"/>
+    <dgm:cxn modelId="{0638CCD2-F862-DE42-8D0A-08FAAD7FCB94}" type="presParOf" srcId="{B4820E4F-2B11-0E41-9FF5-8414EFDAF8FA}" destId="{BEC48CC0-AA37-1746-8756-A1110E632311}" srcOrd="0" destOrd="0" presId="urn:microsoft.com/office/officeart/2008/layout/SquareAccentList"/>
+    <dgm:cxn modelId="{5588AA63-8CDB-B648-B39B-B0C10D785DEC}" type="presParOf" srcId="{B4820E4F-2B11-0E41-9FF5-8414EFDAF8FA}" destId="{FE3539F2-352E-2647-AADF-F4CB600BD9BC}" srcOrd="1" destOrd="0" presId="urn:microsoft.com/office/officeart/2008/layout/SquareAccentList"/>
+  </dgm:cxnLst>
+  <dgm:bg/>
+  <dgm:whole/>
+  <dgm:extLst>
+    <a:ext uri="http://schemas.microsoft.com/office/drawing/2008/diagram">
+      <dsp:dataModelExt xmlns:dsp="http://schemas.microsoft.com/office/drawing/2008/diagram" relId="rId6" minVer="http://schemas.openxmlformats.org/drawingml/2006/diagram"/>
+    </a:ext>
+  </dgm:extLst>
+</dgm:dataModel>
+</file>
+
+<file path=ppt/diagrams/drawing1.xml><?xml version="1.0" encoding="utf-8"?>
+<dsp:drawing xmlns:dgm="http://schemas.openxmlformats.org/drawingml/2006/diagram" xmlns:dsp="http://schemas.microsoft.com/office/drawing/2008/diagram" xmlns:a="http://schemas.openxmlformats.org/drawingml/2006/main">
+  <dsp:spTree>
+    <dsp:nvGrpSpPr>
+      <dsp:cNvPr id="0" name=""/>
+      <dsp:cNvGrpSpPr/>
+    </dsp:nvGrpSpPr>
+    <dsp:grpSpPr/>
+    <dsp:sp modelId="{0DD3ADC9-4176-7542-A1A2-7C2609B87A8B}">
+      <dsp:nvSpPr>
+        <dsp:cNvPr id="0" name=""/>
+        <dsp:cNvSpPr/>
+      </dsp:nvSpPr>
+      <dsp:spPr>
+        <a:xfrm>
+          <a:off x="7414" y="1154909"/>
+          <a:ext cx="5464608" cy="642895"/>
+        </a:xfrm>
+        <a:prstGeom prst="rect">
+          <a:avLst/>
+        </a:prstGeom>
+        <a:solidFill>
+          <a:schemeClr val="accent1">
+            <a:hueOff val="0"/>
+            <a:satOff val="0"/>
+            <a:lumOff val="0"/>
+            <a:alphaOff val="0"/>
+          </a:schemeClr>
+        </a:solidFill>
+        <a:ln w="12700" cap="flat" cmpd="sng" algn="ctr">
+          <a:solidFill>
+            <a:schemeClr val="accent1">
+              <a:hueOff val="0"/>
+              <a:satOff val="0"/>
+              <a:lumOff val="0"/>
+              <a:alphaOff val="0"/>
+            </a:schemeClr>
+          </a:solidFill>
+          <a:prstDash val="solid"/>
+          <a:miter lim="800000"/>
+        </a:ln>
+        <a:effectLst/>
+      </dsp:spPr>
+      <dsp:style>
+        <a:lnRef idx="2">
+          <a:scrgbClr r="0" g="0" b="0"/>
+        </a:lnRef>
+        <a:fillRef idx="1">
+          <a:scrgbClr r="0" g="0" b="0"/>
+        </a:fillRef>
+        <a:effectRef idx="0">
+          <a:scrgbClr r="0" g="0" b="0"/>
+        </a:effectRef>
+        <a:fontRef idx="minor">
+          <a:schemeClr val="lt1"/>
+        </a:fontRef>
+      </dsp:style>
+    </dsp:sp>
+    <dsp:sp modelId="{ABDD2A06-52CF-B14D-8699-8262F38928C4}">
+      <dsp:nvSpPr>
+        <dsp:cNvPr id="0" name=""/>
+        <dsp:cNvSpPr/>
+      </dsp:nvSpPr>
+      <dsp:spPr>
+        <a:xfrm>
+          <a:off x="7414" y="1396355"/>
+          <a:ext cx="401449" cy="401449"/>
+        </a:xfrm>
+        <a:prstGeom prst="rect">
+          <a:avLst/>
+        </a:prstGeom>
+        <a:solidFill>
+          <a:schemeClr val="lt1">
+            <a:alpha val="90000"/>
+            <a:hueOff val="0"/>
+            <a:satOff val="0"/>
+            <a:lumOff val="0"/>
+            <a:alphaOff val="0"/>
+          </a:schemeClr>
+        </a:solidFill>
+        <a:ln w="12700" cap="flat" cmpd="sng" algn="ctr">
+          <a:solidFill>
+            <a:schemeClr val="accent1">
+              <a:hueOff val="0"/>
+              <a:satOff val="0"/>
+              <a:lumOff val="0"/>
+              <a:alphaOff val="0"/>
+            </a:schemeClr>
+          </a:solidFill>
+          <a:prstDash val="solid"/>
+          <a:miter lim="800000"/>
+        </a:ln>
+        <a:effectLst/>
+      </dsp:spPr>
+      <dsp:style>
+        <a:lnRef idx="2">
+          <a:scrgbClr r="0" g="0" b="0"/>
+        </a:lnRef>
+        <a:fillRef idx="1">
+          <a:scrgbClr r="0" g="0" b="0"/>
+        </a:fillRef>
+        <a:effectRef idx="0">
+          <a:scrgbClr r="0" g="0" b="0"/>
+        </a:effectRef>
+        <a:fontRef idx="minor"/>
+      </dsp:style>
+    </dsp:sp>
+    <dsp:sp modelId="{903AB7C0-D32E-6242-AEFA-499D44F56768}">
+      <dsp:nvSpPr>
+        <dsp:cNvPr id="0" name=""/>
+        <dsp:cNvSpPr/>
+      </dsp:nvSpPr>
+      <dsp:spPr>
+        <a:xfrm>
+          <a:off x="7414" y="0"/>
+          <a:ext cx="5464608" cy="1154909"/>
+        </a:xfrm>
+        <a:prstGeom prst="rect">
+          <a:avLst/>
+        </a:prstGeom>
+        <a:noFill/>
+        <a:ln>
+          <a:noFill/>
+        </a:ln>
+        <a:effectLst/>
+      </dsp:spPr>
+      <dsp:style>
+        <a:lnRef idx="0">
+          <a:scrgbClr r="0" g="0" b="0"/>
+        </a:lnRef>
+        <a:fillRef idx="0">
+          <a:scrgbClr r="0" g="0" b="0"/>
+        </a:fillRef>
+        <a:effectRef idx="0">
+          <a:scrgbClr r="0" g="0" b="0"/>
+        </a:effectRef>
+        <a:fontRef idx="minor"/>
+      </dsp:style>
+      <dsp:txBody>
+        <a:bodyPr spcFirstLastPara="0" vert="horz" wrap="square" lIns="123825" tIns="82550" rIns="123825" bIns="82550" numCol="1" spcCol="1270" anchor="ctr" anchorCtr="0">
+          <a:noAutofit/>
+        </a:bodyPr>
+        <a:lstStyle/>
+        <a:p>
+          <a:pPr marL="0" lvl="0" indent="0" algn="l" defTabSz="2889250">
+            <a:lnSpc>
+              <a:spcPct val="90000"/>
+            </a:lnSpc>
+            <a:spcBef>
+              <a:spcPct val="0"/>
+            </a:spcBef>
+            <a:spcAft>
+              <a:spcPct val="35000"/>
+            </a:spcAft>
+            <a:buNone/>
+          </a:pPr>
+          <a:r>
+            <a:rPr lang="pl-PL" sz="6500" kern="1200" dirty="0"/>
+            <a:t>Rastrowa</a:t>
+          </a:r>
+        </a:p>
+      </dsp:txBody>
+      <dsp:txXfrm>
+        <a:off x="7414" y="0"/>
+        <a:ext cx="5464608" cy="1154909"/>
+      </dsp:txXfrm>
+    </dsp:sp>
+    <dsp:sp modelId="{95572EE3-EC41-BB47-80DC-0C29B4A7D495}">
+      <dsp:nvSpPr>
+        <dsp:cNvPr id="0" name=""/>
+        <dsp:cNvSpPr/>
+      </dsp:nvSpPr>
+      <dsp:spPr>
+        <a:xfrm>
+          <a:off x="7414" y="2332122"/>
+          <a:ext cx="401439" cy="401439"/>
+        </a:xfrm>
+        <a:prstGeom prst="rect">
+          <a:avLst/>
+        </a:prstGeom>
+        <a:solidFill>
+          <a:schemeClr val="lt1">
+            <a:hueOff val="0"/>
+            <a:satOff val="0"/>
+            <a:lumOff val="0"/>
+            <a:alphaOff val="0"/>
+          </a:schemeClr>
+        </a:solidFill>
+        <a:ln w="12700" cap="flat" cmpd="sng" algn="ctr">
+          <a:solidFill>
+            <a:schemeClr val="accent1">
+              <a:hueOff val="0"/>
+              <a:satOff val="0"/>
+              <a:lumOff val="0"/>
+              <a:alphaOff val="0"/>
+            </a:schemeClr>
+          </a:solidFill>
+          <a:prstDash val="solid"/>
+          <a:miter lim="800000"/>
+        </a:ln>
+        <a:effectLst/>
+      </dsp:spPr>
+      <dsp:style>
+        <a:lnRef idx="2">
+          <a:scrgbClr r="0" g="0" b="0"/>
+        </a:lnRef>
+        <a:fillRef idx="1">
+          <a:scrgbClr r="0" g="0" b="0"/>
+        </a:fillRef>
+        <a:effectRef idx="0">
+          <a:scrgbClr r="0" g="0" b="0"/>
+        </a:effectRef>
+        <a:fontRef idx="minor"/>
+      </dsp:style>
+    </dsp:sp>
+    <dsp:sp modelId="{AD3013C4-83AD-8441-B664-0C73CD8D801E}">
+      <dsp:nvSpPr>
+        <dsp:cNvPr id="0" name=""/>
+        <dsp:cNvSpPr/>
+      </dsp:nvSpPr>
+      <dsp:spPr>
+        <a:xfrm>
+          <a:off x="389936" y="2064963"/>
+          <a:ext cx="5082085" cy="935757"/>
+        </a:xfrm>
+        <a:prstGeom prst="rect">
+          <a:avLst/>
+        </a:prstGeom>
+        <a:noFill/>
+        <a:ln>
+          <a:noFill/>
+        </a:ln>
+        <a:effectLst/>
+      </dsp:spPr>
+      <dsp:style>
+        <a:lnRef idx="0">
+          <a:scrgbClr r="0" g="0" b="0"/>
+        </a:lnRef>
+        <a:fillRef idx="0">
+          <a:scrgbClr r="0" g="0" b="0"/>
+        </a:fillRef>
+        <a:effectRef idx="0">
+          <a:scrgbClr r="0" g="0" b="0"/>
+        </a:effectRef>
+        <a:fontRef idx="minor"/>
+      </dsp:style>
+      <dsp:txBody>
+        <a:bodyPr spcFirstLastPara="0" vert="horz" wrap="square" lIns="234696" tIns="234696" rIns="234696" bIns="234696" numCol="1" spcCol="1270" anchor="ctr" anchorCtr="0">
+          <a:noAutofit/>
+        </a:bodyPr>
+        <a:lstStyle/>
+        <a:p>
+          <a:pPr marL="0" lvl="0" indent="0" algn="l" defTabSz="1466850">
+            <a:lnSpc>
+              <a:spcPct val="90000"/>
+            </a:lnSpc>
+            <a:spcBef>
+              <a:spcPct val="0"/>
+            </a:spcBef>
+            <a:spcAft>
+              <a:spcPct val="35000"/>
+            </a:spcAft>
+            <a:buNone/>
+          </a:pPr>
+          <a:r>
+            <a:rPr lang="pl-PL" sz="3300" kern="1200" dirty="0"/>
+            <a:t>Opisuje piksele</a:t>
+          </a:r>
+        </a:p>
+      </dsp:txBody>
+      <dsp:txXfrm>
+        <a:off x="389936" y="2064963"/>
+        <a:ext cx="5082085" cy="935757"/>
+      </dsp:txXfrm>
+    </dsp:sp>
+    <dsp:sp modelId="{F3B89C7B-26C6-A241-A2DF-E19A6A4D0793}">
+      <dsp:nvSpPr>
+        <dsp:cNvPr id="0" name=""/>
+        <dsp:cNvSpPr/>
+      </dsp:nvSpPr>
+      <dsp:spPr>
+        <a:xfrm>
+          <a:off x="7414" y="3267880"/>
+          <a:ext cx="401439" cy="401439"/>
+        </a:xfrm>
+        <a:prstGeom prst="rect">
+          <a:avLst/>
+        </a:prstGeom>
+        <a:solidFill>
+          <a:schemeClr val="lt1">
+            <a:hueOff val="0"/>
+            <a:satOff val="0"/>
+            <a:lumOff val="0"/>
+            <a:alphaOff val="0"/>
+          </a:schemeClr>
+        </a:solidFill>
+        <a:ln w="12700" cap="flat" cmpd="sng" algn="ctr">
+          <a:solidFill>
+            <a:schemeClr val="accent1">
+              <a:hueOff val="0"/>
+              <a:satOff val="0"/>
+              <a:lumOff val="0"/>
+              <a:alphaOff val="0"/>
+            </a:schemeClr>
+          </a:solidFill>
+          <a:prstDash val="solid"/>
+          <a:miter lim="800000"/>
+        </a:ln>
+        <a:effectLst/>
+      </dsp:spPr>
+      <dsp:style>
+        <a:lnRef idx="2">
+          <a:scrgbClr r="0" g="0" b="0"/>
+        </a:lnRef>
+        <a:fillRef idx="1">
+          <a:scrgbClr r="0" g="0" b="0"/>
+        </a:fillRef>
+        <a:effectRef idx="0">
+          <a:scrgbClr r="0" g="0" b="0"/>
+        </a:effectRef>
+        <a:fontRef idx="minor"/>
+      </dsp:style>
+    </dsp:sp>
+    <dsp:sp modelId="{51645EC2-E61A-BA41-8595-D42ADBB4FCF7}">
+      <dsp:nvSpPr>
+        <dsp:cNvPr id="0" name=""/>
+        <dsp:cNvSpPr/>
+      </dsp:nvSpPr>
+      <dsp:spPr>
+        <a:xfrm>
+          <a:off x="389936" y="3000721"/>
+          <a:ext cx="5082085" cy="935757"/>
+        </a:xfrm>
+        <a:prstGeom prst="rect">
+          <a:avLst/>
+        </a:prstGeom>
+        <a:noFill/>
+        <a:ln>
+          <a:noFill/>
+        </a:ln>
+        <a:effectLst/>
+      </dsp:spPr>
+      <dsp:style>
+        <a:lnRef idx="0">
+          <a:scrgbClr r="0" g="0" b="0"/>
+        </a:lnRef>
+        <a:fillRef idx="0">
+          <a:scrgbClr r="0" g="0" b="0"/>
+        </a:fillRef>
+        <a:effectRef idx="0">
+          <a:scrgbClr r="0" g="0" b="0"/>
+        </a:effectRef>
+        <a:fontRef idx="minor"/>
+      </dsp:style>
+      <dsp:txBody>
+        <a:bodyPr spcFirstLastPara="0" vert="horz" wrap="square" lIns="234696" tIns="234696" rIns="234696" bIns="234696" numCol="1" spcCol="1270" anchor="ctr" anchorCtr="0">
+          <a:noAutofit/>
+        </a:bodyPr>
+        <a:lstStyle/>
+        <a:p>
+          <a:pPr marL="0" lvl="0" indent="0" algn="l" defTabSz="1466850">
+            <a:lnSpc>
+              <a:spcPct val="90000"/>
+            </a:lnSpc>
+            <a:spcBef>
+              <a:spcPct val="0"/>
+            </a:spcBef>
+            <a:spcAft>
+              <a:spcPct val="35000"/>
+            </a:spcAft>
+            <a:buNone/>
+          </a:pPr>
+          <a:r>
+            <a:rPr lang="pl-PL" sz="3300" kern="1200" dirty="0"/>
+            <a:t>Stratne skalowanie</a:t>
+          </a:r>
+        </a:p>
+      </dsp:txBody>
+      <dsp:txXfrm>
+        <a:off x="389936" y="3000721"/>
+        <a:ext cx="5082085" cy="935757"/>
+      </dsp:txXfrm>
+    </dsp:sp>
+    <dsp:sp modelId="{14BA295F-5277-6841-8E2F-D41D20978828}">
+      <dsp:nvSpPr>
+        <dsp:cNvPr id="0" name=""/>
+        <dsp:cNvSpPr/>
+      </dsp:nvSpPr>
+      <dsp:spPr>
+        <a:xfrm>
+          <a:off x="7414" y="4203637"/>
+          <a:ext cx="401439" cy="401439"/>
+        </a:xfrm>
+        <a:prstGeom prst="rect">
+          <a:avLst/>
+        </a:prstGeom>
+        <a:solidFill>
+          <a:schemeClr val="lt1">
+            <a:hueOff val="0"/>
+            <a:satOff val="0"/>
+            <a:lumOff val="0"/>
+            <a:alphaOff val="0"/>
+          </a:schemeClr>
+        </a:solidFill>
+        <a:ln w="12700" cap="flat" cmpd="sng" algn="ctr">
+          <a:solidFill>
+            <a:schemeClr val="accent1">
+              <a:hueOff val="0"/>
+              <a:satOff val="0"/>
+              <a:lumOff val="0"/>
+              <a:alphaOff val="0"/>
+            </a:schemeClr>
+          </a:solidFill>
+          <a:prstDash val="solid"/>
+          <a:miter lim="800000"/>
+        </a:ln>
+        <a:effectLst/>
+      </dsp:spPr>
+      <dsp:style>
+        <a:lnRef idx="2">
+          <a:scrgbClr r="0" g="0" b="0"/>
+        </a:lnRef>
+        <a:fillRef idx="1">
+          <a:scrgbClr r="0" g="0" b="0"/>
+        </a:fillRef>
+        <a:effectRef idx="0">
+          <a:scrgbClr r="0" g="0" b="0"/>
+        </a:effectRef>
+        <a:fontRef idx="minor"/>
+      </dsp:style>
+    </dsp:sp>
+    <dsp:sp modelId="{342BDED5-B9DB-9F4B-8F98-70673DC6B30A}">
+      <dsp:nvSpPr>
+        <dsp:cNvPr id="0" name=""/>
+        <dsp:cNvSpPr/>
+      </dsp:nvSpPr>
+      <dsp:spPr>
+        <a:xfrm>
+          <a:off x="389936" y="3936478"/>
+          <a:ext cx="5082085" cy="935757"/>
+        </a:xfrm>
+        <a:prstGeom prst="rect">
+          <a:avLst/>
+        </a:prstGeom>
+        <a:noFill/>
+        <a:ln>
+          <a:noFill/>
+        </a:ln>
+        <a:effectLst/>
+      </dsp:spPr>
+      <dsp:style>
+        <a:lnRef idx="0">
+          <a:scrgbClr r="0" g="0" b="0"/>
+        </a:lnRef>
+        <a:fillRef idx="0">
+          <a:scrgbClr r="0" g="0" b="0"/>
+        </a:fillRef>
+        <a:effectRef idx="0">
+          <a:scrgbClr r="0" g="0" b="0"/>
+        </a:effectRef>
+        <a:fontRef idx="minor"/>
+      </dsp:style>
+      <dsp:txBody>
+        <a:bodyPr spcFirstLastPara="0" vert="horz" wrap="square" lIns="234696" tIns="234696" rIns="234696" bIns="234696" numCol="1" spcCol="1270" anchor="ctr" anchorCtr="0">
+          <a:noAutofit/>
+        </a:bodyPr>
+        <a:lstStyle/>
+        <a:p>
+          <a:pPr marL="0" lvl="0" indent="0" algn="l" defTabSz="1466850">
+            <a:lnSpc>
+              <a:spcPct val="90000"/>
+            </a:lnSpc>
+            <a:spcBef>
+              <a:spcPct val="0"/>
+            </a:spcBef>
+            <a:spcAft>
+              <a:spcPct val="35000"/>
+            </a:spcAft>
+            <a:buNone/>
+          </a:pPr>
+          <a:r>
+            <a:rPr lang="pl-PL" sz="3300" kern="1200" dirty="0"/>
+            <a:t>Aparat cyfrowy, skaner…</a:t>
+          </a:r>
+        </a:p>
+      </dsp:txBody>
+      <dsp:txXfrm>
+        <a:off x="389936" y="3936478"/>
+        <a:ext cx="5082085" cy="935757"/>
+      </dsp:txXfrm>
+    </dsp:sp>
+    <dsp:sp modelId="{9798419D-0137-C048-9106-812761FD8CB7}">
+      <dsp:nvSpPr>
+        <dsp:cNvPr id="0" name=""/>
+        <dsp:cNvSpPr/>
+      </dsp:nvSpPr>
+      <dsp:spPr>
+        <a:xfrm>
+          <a:off x="5745252" y="1154909"/>
+          <a:ext cx="5464608" cy="642895"/>
+        </a:xfrm>
+        <a:prstGeom prst="rect">
+          <a:avLst/>
+        </a:prstGeom>
+        <a:solidFill>
+          <a:schemeClr val="accent1">
+            <a:hueOff val="0"/>
+            <a:satOff val="0"/>
+            <a:lumOff val="0"/>
+            <a:alphaOff val="0"/>
+          </a:schemeClr>
+        </a:solidFill>
+        <a:ln w="12700" cap="flat" cmpd="sng" algn="ctr">
+          <a:solidFill>
+            <a:schemeClr val="accent1">
+              <a:hueOff val="0"/>
+              <a:satOff val="0"/>
+              <a:lumOff val="0"/>
+              <a:alphaOff val="0"/>
+            </a:schemeClr>
+          </a:solidFill>
+          <a:prstDash val="solid"/>
+          <a:miter lim="800000"/>
+        </a:ln>
+        <a:effectLst/>
+      </dsp:spPr>
+      <dsp:style>
+        <a:lnRef idx="2">
+          <a:scrgbClr r="0" g="0" b="0"/>
+        </a:lnRef>
+        <a:fillRef idx="1">
+          <a:scrgbClr r="0" g="0" b="0"/>
+        </a:fillRef>
+        <a:effectRef idx="0">
+          <a:scrgbClr r="0" g="0" b="0"/>
+        </a:effectRef>
+        <a:fontRef idx="minor">
+          <a:schemeClr val="lt1"/>
+        </a:fontRef>
+      </dsp:style>
+    </dsp:sp>
+    <dsp:sp modelId="{80FEB888-F431-0740-A1DE-620E8EC9D0F1}">
+      <dsp:nvSpPr>
+        <dsp:cNvPr id="0" name=""/>
+        <dsp:cNvSpPr/>
+      </dsp:nvSpPr>
+      <dsp:spPr>
+        <a:xfrm>
+          <a:off x="5745252" y="1396355"/>
+          <a:ext cx="401449" cy="401449"/>
+        </a:xfrm>
+        <a:prstGeom prst="rect">
+          <a:avLst/>
+        </a:prstGeom>
+        <a:solidFill>
+          <a:schemeClr val="lt1">
+            <a:alpha val="90000"/>
+            <a:hueOff val="0"/>
+            <a:satOff val="0"/>
+            <a:lumOff val="0"/>
+            <a:alphaOff val="0"/>
+          </a:schemeClr>
+        </a:solidFill>
+        <a:ln w="12700" cap="flat" cmpd="sng" algn="ctr">
+          <a:solidFill>
+            <a:schemeClr val="accent1">
+              <a:hueOff val="0"/>
+              <a:satOff val="0"/>
+              <a:lumOff val="0"/>
+              <a:alphaOff val="0"/>
+            </a:schemeClr>
+          </a:solidFill>
+          <a:prstDash val="solid"/>
+          <a:miter lim="800000"/>
+        </a:ln>
+        <a:effectLst/>
+      </dsp:spPr>
+      <dsp:style>
+        <a:lnRef idx="2">
+          <a:scrgbClr r="0" g="0" b="0"/>
+        </a:lnRef>
+        <a:fillRef idx="1">
+          <a:scrgbClr r="0" g="0" b="0"/>
+        </a:fillRef>
+        <a:effectRef idx="0">
+          <a:scrgbClr r="0" g="0" b="0"/>
+        </a:effectRef>
+        <a:fontRef idx="minor"/>
+      </dsp:style>
+    </dsp:sp>
+    <dsp:sp modelId="{5778DE17-C2A6-2542-8FC6-3D5C8E81AEA0}">
+      <dsp:nvSpPr>
+        <dsp:cNvPr id="0" name=""/>
+        <dsp:cNvSpPr/>
+      </dsp:nvSpPr>
+      <dsp:spPr>
+        <a:xfrm>
+          <a:off x="5745252" y="0"/>
+          <a:ext cx="5464608" cy="1154909"/>
+        </a:xfrm>
+        <a:prstGeom prst="rect">
+          <a:avLst/>
+        </a:prstGeom>
+        <a:noFill/>
+        <a:ln>
+          <a:noFill/>
+        </a:ln>
+        <a:effectLst/>
+      </dsp:spPr>
+      <dsp:style>
+        <a:lnRef idx="0">
+          <a:scrgbClr r="0" g="0" b="0"/>
+        </a:lnRef>
+        <a:fillRef idx="0">
+          <a:scrgbClr r="0" g="0" b="0"/>
+        </a:fillRef>
+        <a:effectRef idx="0">
+          <a:scrgbClr r="0" g="0" b="0"/>
+        </a:effectRef>
+        <a:fontRef idx="minor"/>
+      </dsp:style>
+      <dsp:txBody>
+        <a:bodyPr spcFirstLastPara="0" vert="horz" wrap="square" lIns="123825" tIns="82550" rIns="123825" bIns="82550" numCol="1" spcCol="1270" anchor="ctr" anchorCtr="0">
+          <a:noAutofit/>
+        </a:bodyPr>
+        <a:lstStyle/>
+        <a:p>
+          <a:pPr marL="0" lvl="0" indent="0" algn="l" defTabSz="2889250">
+            <a:lnSpc>
+              <a:spcPct val="90000"/>
+            </a:lnSpc>
+            <a:spcBef>
+              <a:spcPct val="0"/>
+            </a:spcBef>
+            <a:spcAft>
+              <a:spcPct val="35000"/>
+            </a:spcAft>
+            <a:buNone/>
+          </a:pPr>
+          <a:r>
+            <a:rPr lang="pl-PL" sz="6500" kern="1200" dirty="0"/>
+            <a:t>Wektorowa</a:t>
+          </a:r>
+        </a:p>
+      </dsp:txBody>
+      <dsp:txXfrm>
+        <a:off x="5745252" y="0"/>
+        <a:ext cx="5464608" cy="1154909"/>
+      </dsp:txXfrm>
+    </dsp:sp>
+    <dsp:sp modelId="{7DE27504-6B35-1C4C-8555-1675A4D4E0F4}">
+      <dsp:nvSpPr>
+        <dsp:cNvPr id="0" name=""/>
+        <dsp:cNvSpPr/>
+      </dsp:nvSpPr>
+      <dsp:spPr>
+        <a:xfrm>
+          <a:off x="5745252" y="2332122"/>
+          <a:ext cx="401439" cy="401439"/>
+        </a:xfrm>
+        <a:prstGeom prst="rect">
+          <a:avLst/>
+        </a:prstGeom>
+        <a:solidFill>
+          <a:schemeClr val="lt1">
+            <a:hueOff val="0"/>
+            <a:satOff val="0"/>
+            <a:lumOff val="0"/>
+            <a:alphaOff val="0"/>
+          </a:schemeClr>
+        </a:solidFill>
+        <a:ln w="12700" cap="flat" cmpd="sng" algn="ctr">
+          <a:solidFill>
+            <a:schemeClr val="accent1">
+              <a:hueOff val="0"/>
+              <a:satOff val="0"/>
+              <a:lumOff val="0"/>
+              <a:alphaOff val="0"/>
+            </a:schemeClr>
+          </a:solidFill>
+          <a:prstDash val="solid"/>
+          <a:miter lim="800000"/>
+        </a:ln>
+        <a:effectLst/>
+      </dsp:spPr>
+      <dsp:style>
+        <a:lnRef idx="2">
+          <a:scrgbClr r="0" g="0" b="0"/>
+        </a:lnRef>
+        <a:fillRef idx="1">
+          <a:scrgbClr r="0" g="0" b="0"/>
+        </a:fillRef>
+        <a:effectRef idx="0">
+          <a:scrgbClr r="0" g="0" b="0"/>
+        </a:effectRef>
+        <a:fontRef idx="minor"/>
+      </dsp:style>
+    </dsp:sp>
+    <dsp:sp modelId="{1E80D503-12F3-3B4A-ACBB-652C2DFE75F3}">
+      <dsp:nvSpPr>
+        <dsp:cNvPr id="0" name=""/>
+        <dsp:cNvSpPr/>
+      </dsp:nvSpPr>
+      <dsp:spPr>
+        <a:xfrm>
+          <a:off x="6127775" y="2064963"/>
+          <a:ext cx="5082085" cy="935757"/>
+        </a:xfrm>
+        <a:prstGeom prst="rect">
+          <a:avLst/>
+        </a:prstGeom>
+        <a:noFill/>
+        <a:ln>
+          <a:noFill/>
+        </a:ln>
+        <a:effectLst/>
+      </dsp:spPr>
+      <dsp:style>
+        <a:lnRef idx="0">
+          <a:scrgbClr r="0" g="0" b="0"/>
+        </a:lnRef>
+        <a:fillRef idx="0">
+          <a:scrgbClr r="0" g="0" b="0"/>
+        </a:fillRef>
+        <a:effectRef idx="0">
+          <a:scrgbClr r="0" g="0" b="0"/>
+        </a:effectRef>
+        <a:fontRef idx="minor"/>
+      </dsp:style>
+      <dsp:txBody>
+        <a:bodyPr spcFirstLastPara="0" vert="horz" wrap="square" lIns="234696" tIns="234696" rIns="234696" bIns="234696" numCol="1" spcCol="1270" anchor="ctr" anchorCtr="0">
+          <a:noAutofit/>
+        </a:bodyPr>
+        <a:lstStyle/>
+        <a:p>
+          <a:pPr marL="0" lvl="0" indent="0" algn="l" defTabSz="1466850">
+            <a:lnSpc>
+              <a:spcPct val="90000"/>
+            </a:lnSpc>
+            <a:spcBef>
+              <a:spcPct val="0"/>
+            </a:spcBef>
+            <a:spcAft>
+              <a:spcPct val="35000"/>
+            </a:spcAft>
+            <a:buNone/>
+          </a:pPr>
+          <a:r>
+            <a:rPr lang="pl-PL" sz="3300" kern="1200" dirty="0"/>
+            <a:t>Opisuje kształty</a:t>
+          </a:r>
+        </a:p>
+      </dsp:txBody>
+      <dsp:txXfrm>
+        <a:off x="6127775" y="2064963"/>
+        <a:ext cx="5082085" cy="935757"/>
+      </dsp:txXfrm>
+    </dsp:sp>
+    <dsp:sp modelId="{7E69614A-B6D8-4D46-A2FD-AB2D97465549}">
+      <dsp:nvSpPr>
+        <dsp:cNvPr id="0" name=""/>
+        <dsp:cNvSpPr/>
+      </dsp:nvSpPr>
+      <dsp:spPr>
+        <a:xfrm>
+          <a:off x="5745252" y="3267880"/>
+          <a:ext cx="401439" cy="401439"/>
+        </a:xfrm>
+        <a:prstGeom prst="rect">
+          <a:avLst/>
+        </a:prstGeom>
+        <a:solidFill>
+          <a:schemeClr val="lt1">
+            <a:hueOff val="0"/>
+            <a:satOff val="0"/>
+            <a:lumOff val="0"/>
+            <a:alphaOff val="0"/>
+          </a:schemeClr>
+        </a:solidFill>
+        <a:ln w="12700" cap="flat" cmpd="sng" algn="ctr">
+          <a:solidFill>
+            <a:schemeClr val="accent1">
+              <a:hueOff val="0"/>
+              <a:satOff val="0"/>
+              <a:lumOff val="0"/>
+              <a:alphaOff val="0"/>
+            </a:schemeClr>
+          </a:solidFill>
+          <a:prstDash val="solid"/>
+          <a:miter lim="800000"/>
+        </a:ln>
+        <a:effectLst/>
+      </dsp:spPr>
+      <dsp:style>
+        <a:lnRef idx="2">
+          <a:scrgbClr r="0" g="0" b="0"/>
+        </a:lnRef>
+        <a:fillRef idx="1">
+          <a:scrgbClr r="0" g="0" b="0"/>
+        </a:fillRef>
+        <a:effectRef idx="0">
+          <a:scrgbClr r="0" g="0" b="0"/>
+        </a:effectRef>
+        <a:fontRef idx="minor"/>
+      </dsp:style>
+    </dsp:sp>
+    <dsp:sp modelId="{0D4D51A7-8C4B-4A47-A34F-67EDA071FF85}">
+      <dsp:nvSpPr>
+        <dsp:cNvPr id="0" name=""/>
+        <dsp:cNvSpPr/>
+      </dsp:nvSpPr>
+      <dsp:spPr>
+        <a:xfrm>
+          <a:off x="6127775" y="3000721"/>
+          <a:ext cx="5082085" cy="935757"/>
+        </a:xfrm>
+        <a:prstGeom prst="rect">
+          <a:avLst/>
+        </a:prstGeom>
+        <a:noFill/>
+        <a:ln>
+          <a:noFill/>
+        </a:ln>
+        <a:effectLst/>
+      </dsp:spPr>
+      <dsp:style>
+        <a:lnRef idx="0">
+          <a:scrgbClr r="0" g="0" b="0"/>
+        </a:lnRef>
+        <a:fillRef idx="0">
+          <a:scrgbClr r="0" g="0" b="0"/>
+        </a:fillRef>
+        <a:effectRef idx="0">
+          <a:scrgbClr r="0" g="0" b="0"/>
+        </a:effectRef>
+        <a:fontRef idx="minor"/>
+      </dsp:style>
+      <dsp:txBody>
+        <a:bodyPr spcFirstLastPara="0" vert="horz" wrap="square" lIns="234696" tIns="234696" rIns="234696" bIns="234696" numCol="1" spcCol="1270" anchor="ctr" anchorCtr="0">
+          <a:noAutofit/>
+        </a:bodyPr>
+        <a:lstStyle/>
+        <a:p>
+          <a:pPr marL="0" lvl="0" indent="0" algn="l" defTabSz="1466850">
+            <a:lnSpc>
+              <a:spcPct val="90000"/>
+            </a:lnSpc>
+            <a:spcBef>
+              <a:spcPct val="0"/>
+            </a:spcBef>
+            <a:spcAft>
+              <a:spcPct val="35000"/>
+            </a:spcAft>
+            <a:buNone/>
+          </a:pPr>
+          <a:r>
+            <a:rPr lang="pl-PL" sz="3300" kern="1200" dirty="0"/>
+            <a:t>Bezstratne skalowanie</a:t>
+          </a:r>
+        </a:p>
+      </dsp:txBody>
+      <dsp:txXfrm>
+        <a:off x="6127775" y="3000721"/>
+        <a:ext cx="5082085" cy="935757"/>
+      </dsp:txXfrm>
+    </dsp:sp>
+    <dsp:sp modelId="{BEC48CC0-AA37-1746-8756-A1110E632311}">
+      <dsp:nvSpPr>
+        <dsp:cNvPr id="0" name=""/>
+        <dsp:cNvSpPr/>
+      </dsp:nvSpPr>
+      <dsp:spPr>
+        <a:xfrm>
+          <a:off x="5745252" y="4203637"/>
+          <a:ext cx="401439" cy="401439"/>
+        </a:xfrm>
+        <a:prstGeom prst="rect">
+          <a:avLst/>
+        </a:prstGeom>
+        <a:solidFill>
+          <a:schemeClr val="lt1">
+            <a:hueOff val="0"/>
+            <a:satOff val="0"/>
+            <a:lumOff val="0"/>
+            <a:alphaOff val="0"/>
+          </a:schemeClr>
+        </a:solidFill>
+        <a:ln w="12700" cap="flat" cmpd="sng" algn="ctr">
+          <a:solidFill>
+            <a:schemeClr val="accent1">
+              <a:hueOff val="0"/>
+              <a:satOff val="0"/>
+              <a:lumOff val="0"/>
+              <a:alphaOff val="0"/>
+            </a:schemeClr>
+          </a:solidFill>
+          <a:prstDash val="solid"/>
+          <a:miter lim="800000"/>
+        </a:ln>
+        <a:effectLst/>
+      </dsp:spPr>
+      <dsp:style>
+        <a:lnRef idx="2">
+          <a:scrgbClr r="0" g="0" b="0"/>
+        </a:lnRef>
+        <a:fillRef idx="1">
+          <a:scrgbClr r="0" g="0" b="0"/>
+        </a:fillRef>
+        <a:effectRef idx="0">
+          <a:scrgbClr r="0" g="0" b="0"/>
+        </a:effectRef>
+        <a:fontRef idx="minor"/>
+      </dsp:style>
+    </dsp:sp>
+    <dsp:sp modelId="{FE3539F2-352E-2647-AADF-F4CB600BD9BC}">
+      <dsp:nvSpPr>
+        <dsp:cNvPr id="0" name=""/>
+        <dsp:cNvSpPr/>
+      </dsp:nvSpPr>
+      <dsp:spPr>
+        <a:xfrm>
+          <a:off x="6127775" y="3936478"/>
+          <a:ext cx="5082085" cy="935757"/>
+        </a:xfrm>
+        <a:prstGeom prst="rect">
+          <a:avLst/>
+        </a:prstGeom>
+        <a:noFill/>
+        <a:ln>
+          <a:noFill/>
+        </a:ln>
+        <a:effectLst/>
+      </dsp:spPr>
+      <dsp:style>
+        <a:lnRef idx="0">
+          <a:scrgbClr r="0" g="0" b="0"/>
+        </a:lnRef>
+        <a:fillRef idx="0">
+          <a:scrgbClr r="0" g="0" b="0"/>
+        </a:fillRef>
+        <a:effectRef idx="0">
+          <a:scrgbClr r="0" g="0" b="0"/>
+        </a:effectRef>
+        <a:fontRef idx="minor"/>
+      </dsp:style>
+      <dsp:txBody>
+        <a:bodyPr spcFirstLastPara="0" vert="horz" wrap="square" lIns="234696" tIns="234696" rIns="234696" bIns="234696" numCol="1" spcCol="1270" anchor="ctr" anchorCtr="0">
+          <a:noAutofit/>
+        </a:bodyPr>
+        <a:lstStyle/>
+        <a:p>
+          <a:pPr marL="0" lvl="0" indent="0" algn="l" defTabSz="1466850">
+            <a:lnSpc>
+              <a:spcPct val="90000"/>
+            </a:lnSpc>
+            <a:spcBef>
+              <a:spcPct val="0"/>
+            </a:spcBef>
+            <a:spcAft>
+              <a:spcPct val="35000"/>
+            </a:spcAft>
+            <a:buNone/>
+          </a:pPr>
+          <a:r>
+            <a:rPr lang="pl-PL" sz="3300" kern="1200" dirty="0"/>
+            <a:t>Programy graficzne</a:t>
+          </a:r>
+        </a:p>
+      </dsp:txBody>
+      <dsp:txXfrm>
+        <a:off x="6127775" y="3936478"/>
+        <a:ext cx="5082085" cy="935757"/>
+      </dsp:txXfrm>
+    </dsp:sp>
+  </dsp:spTree>
+</dsp:drawing>
+</file>
+
+<file path=ppt/diagrams/layout1.xml><?xml version="1.0" encoding="utf-8"?>
+<dgm:layoutDef xmlns:dgm="http://schemas.openxmlformats.org/drawingml/2006/diagram" xmlns:a="http://schemas.openxmlformats.org/drawingml/2006/main" uniqueId="urn:microsoft.com/office/officeart/2008/layout/SquareAccentList">
+  <dgm:title val=""/>
+  <dgm:desc val=""/>
+  <dgm:catLst>
+    <dgm:cat type="list" pri="5500"/>
+  </dgm:catLst>
+  <dgm:sampData>
+    <dgm:dataModel>
+      <dgm:ptLst>
+        <dgm:pt modelId="0" type="doc"/>
+        <dgm:pt modelId="10">
+          <dgm:prSet phldr="1"/>
+        </dgm:pt>
+        <dgm:pt modelId="11">
+          <dgm:prSet phldr="1"/>
+        </dgm:pt>
+        <dgm:pt modelId="12">
+          <dgm:prSet phldr="1"/>
+        </dgm:pt>
+        <dgm:pt modelId="13">
+          <dgm:prSet phldr="1"/>
+        </dgm:pt>
+        <dgm:pt modelId="20">
+          <dgm:prSet phldr="1"/>
+        </dgm:pt>
+        <dgm:pt modelId="21">
+          <dgm:prSet phldr="1"/>
+        </dgm:pt>
+        <dgm:pt modelId="22">
+          <dgm:prSet phldr="1"/>
+        </dgm:pt>
+        <dgm:pt modelId="23">
+          <dgm:prSet phldr="1"/>
+        </dgm:pt>
+      </dgm:ptLst>
+      <dgm:cxnLst>
+        <dgm:cxn modelId="1" srcId="0" destId="10" srcOrd="0" destOrd="0"/>
+        <dgm:cxn modelId="2" srcId="10" destId="11" srcOrd="0" destOrd="0"/>
+        <dgm:cxn modelId="3" srcId="10" destId="12" srcOrd="1" destOrd="0"/>
+        <dgm:cxn modelId="4" srcId="10" destId="13" srcOrd="2" destOrd="0"/>
+        <dgm:cxn modelId="5" srcId="0" destId="20" srcOrd="0" destOrd="0"/>
+        <dgm:cxn modelId="6" srcId="20" destId="21" srcOrd="0" destOrd="0"/>
+        <dgm:cxn modelId="7" srcId="20" destId="22" srcOrd="1" destOrd="0"/>
+        <dgm:cxn modelId="8" srcId="20" destId="23" srcOrd="2" destOrd="0"/>
+      </dgm:cxnLst>
+      <dgm:bg/>
+      <dgm:whole/>
+    </dgm:dataModel>
+  </dgm:sampData>
+  <dgm:styleData>
+    <dgm:dataModel>
+      <dgm:ptLst>
+        <dgm:pt modelId="0" type="doc"/>
+        <dgm:pt modelId="10">
+          <dgm:prSet phldr="1"/>
+        </dgm:pt>
+        <dgm:pt modelId="11">
+          <dgm:prSet phldr="1"/>
+        </dgm:pt>
+        <dgm:pt modelId="12">
+          <dgm:prSet phldr="1"/>
+        </dgm:pt>
+        <dgm:pt modelId="13">
+          <dgm:prSet phldr="1"/>
+        </dgm:pt>
+        <dgm:pt modelId="20">
+          <dgm:prSet phldr="1"/>
+        </dgm:pt>
+        <dgm:pt modelId="21">
+          <dgm:prSet phldr="1"/>
+        </dgm:pt>
+        <dgm:pt modelId="22">
+          <dgm:prSet phldr="1"/>
+        </dgm:pt>
+        <dgm:pt modelId="23">
+          <dgm:prSet phldr="1"/>
+        </dgm:pt>
+      </dgm:ptLst>
+      <dgm:cxnLst>
+        <dgm:cxn modelId="1" srcId="0" destId="10" srcOrd="0" destOrd="0"/>
+        <dgm:cxn modelId="2" srcId="10" destId="11" srcOrd="0" destOrd="0"/>
+        <dgm:cxn modelId="3" srcId="10" destId="12" srcOrd="1" destOrd="0"/>
+        <dgm:cxn modelId="4" srcId="10" destId="13" srcOrd="2" destOrd="0"/>
+        <dgm:cxn modelId="5" srcId="0" destId="20" srcOrd="0" destOrd="0"/>
+        <dgm:cxn modelId="6" srcId="20" destId="21" srcOrd="0" destOrd="0"/>
+        <dgm:cxn modelId="7" srcId="20" destId="22" srcOrd="1" destOrd="0"/>
+        <dgm:cxn modelId="8" srcId="20" destId="23" srcOrd="2" destOrd="0"/>
+      </dgm:cxnLst>
+      <dgm:bg/>
+      <dgm:whole/>
+    </dgm:dataModel>
+  </dgm:styleData>
+  <dgm:clrData>
+    <dgm:dataModel>
+      <dgm:ptLst>
+        <dgm:pt modelId="0" type="doc"/>
+        <dgm:pt modelId="10">
+          <dgm:prSet phldr="1"/>
+        </dgm:pt>
+        <dgm:pt modelId="11">
+          <dgm:prSet phldr="1"/>
+        </dgm:pt>
+        <dgm:pt modelId="12">
+          <dgm:prSet phldr="1"/>
+        </dgm:pt>
+        <dgm:pt modelId="13">
+          <dgm:prSet phldr="1"/>
+        </dgm:pt>
+        <dgm:pt modelId="20">
+          <dgm:prSet phldr="1"/>
+        </dgm:pt>
+        <dgm:pt modelId="21">
+          <dgm:prSet phldr="1"/>
+        </dgm:pt>
+        <dgm:pt modelId="22">
+          <dgm:prSet phldr="1"/>
+        </dgm:pt>
+        <dgm:pt modelId="23">
+          <dgm:prSet phldr="1"/>
+        </dgm:pt>
+      </dgm:ptLst>
+      <dgm:cxnLst>
+        <dgm:cxn modelId="1" srcId="0" destId="10" srcOrd="0" destOrd="0"/>
+        <dgm:cxn modelId="2" srcId="10" destId="11" srcOrd="0" destOrd="0"/>
+        <dgm:cxn modelId="3" srcId="10" destId="12" srcOrd="1" destOrd="0"/>
+        <dgm:cxn modelId="4" srcId="10" destId="13" srcOrd="2" destOrd="0"/>
+        <dgm:cxn modelId="5" srcId="0" destId="20" srcOrd="0" destOrd="0"/>
+        <dgm:cxn modelId="6" srcId="20" destId="21" srcOrd="0" destOrd="0"/>
+        <dgm:cxn modelId="7" srcId="20" destId="22" srcOrd="1" destOrd="0"/>
+        <dgm:cxn modelId="8" srcId="20" destId="23" srcOrd="2" destOrd="0"/>
+      </dgm:cxnLst>
+      <dgm:bg/>
+      <dgm:whole/>
+    </dgm:dataModel>
+  </dgm:clrData>
+  <dgm:layoutNode name="layout">
+    <dgm:varLst>
+      <dgm:chMax/>
+      <dgm:chPref/>
+      <dgm:dir/>
+      <dgm:resizeHandles/>
+    </dgm:varLst>
+    <dgm:choose name="Name0">
+      <dgm:if name="Name1" func="var" arg="dir" op="equ" val="norm">
+        <dgm:alg type="hierChild">
+          <dgm:param type="linDir" val="fromL"/>
+          <dgm:param type="vertAlign" val="t"/>
+          <dgm:param type="nodeVertAlign" val="t"/>
+          <dgm:param type="horzAlign" val="ctr"/>
+          <dgm:param type="fallback" val="1D"/>
+        </dgm:alg>
+      </dgm:if>
+      <dgm:else name="Name2">
+        <dgm:alg type="hierChild">
+          <dgm:param type="linDir" val="fromR"/>
+          <dgm:param type="vertAlign" val="t"/>
+          <dgm:param type="nodeVertAlign" val="t"/>
+          <dgm:param type="horzAlign" val="ctr"/>
+          <dgm:param type="fallback" val="1D"/>
+        </dgm:alg>
+      </dgm:else>
+    </dgm:choose>
+    <dgm:shape xmlns:r="http://schemas.openxmlformats.org/officeDocument/2006/relationships" r:blip="">
+      <dgm:adjLst/>
+    </dgm:shape>
+    <dgm:presOf/>
+    <dgm:constrLst>
+      <dgm:constr type="primFontSz" for="des" forName="Parent" op="equ" val="65"/>
+      <dgm:constr type="primFontSz" for="des" forName="Child" op="equ" val="65"/>
+      <dgm:constr type="primFontSz" for="des" forName="Child" refType="primFontSz" refFor="des" refForName="Parent" op="lte"/>
+      <dgm:constr type="w" for="des" forName="rootComposite" refType="h" refFor="des" refForName="rootComposite" fact="3.0396"/>
+      <dgm:constr type="h" for="des" forName="rootComposite" refType="h"/>
+      <dgm:constr type="w" for="des" forName="childComposite" refType="w" refFor="des" refForName="rootComposite"/>
+      <dgm:constr type="h" for="des" forName="childComposite" refType="h" refFor="des" refForName="rootComposite" fact="0.5205"/>
+      <dgm:constr type="sibSp" refType="w" refFor="des" refForName="rootComposite" fact="0.05"/>
+      <dgm:constr type="sp" for="des" forName="root" refType="h" refFor="des" refForName="childComposite" fact="0.2855"/>
+    </dgm:constrLst>
+    <dgm:ruleLst/>
+    <dgm:forEach name="Name3" axis="ch">
+      <dgm:forEach name="Name4" axis="self" ptType="node" cnt="1">
+        <dgm:layoutNode name="root">
+          <dgm:varLst>
+            <dgm:chMax/>
+            <dgm:chPref/>
+          </dgm:varLst>
+          <dgm:alg type="hierRoot">
+            <dgm:param type="hierAlign" val="tL"/>
+          </dgm:alg>
+          <dgm:shape xmlns:r="http://schemas.openxmlformats.org/officeDocument/2006/relationships" r:blip="">
+            <dgm:adjLst/>
+          </dgm:shape>
+          <dgm:presOf/>
+          <dgm:constrLst/>
+          <dgm:ruleLst/>
+          <dgm:layoutNode name="rootComposite">
+            <dgm:varLst/>
+            <dgm:alg type="composite"/>
+            <dgm:shape xmlns:r="http://schemas.openxmlformats.org/officeDocument/2006/relationships" r:blip="">
+              <dgm:adjLst/>
+            </dgm:shape>
+            <dgm:presOf axis="self" ptType="node" cnt="1"/>
+            <dgm:choose name="Name5">
+              <dgm:if name="Name6" func="var" arg="dir" op="equ" val="norm">
+                <dgm:constrLst>
+                  <dgm:constr type="l" for="ch" forName="Parent" refType="w" fact="0"/>
+                  <dgm:constr type="t" for="ch" forName="Parent" refType="h" fact="0"/>
+                  <dgm:constr type="w" for="ch" forName="Parent" refType="w"/>
+                  <dgm:constr type="h" for="ch" forName="Parent" refType="h" fact="0.6424"/>
+                  <dgm:constr type="l" for="ch" forName="ParentAccent" refType="w" fact="0"/>
+                  <dgm:constr type="b" for="ch" forName="ParentAccent" refType="h"/>
+                  <dgm:constr type="w" for="ch" forName="ParentAccent" refType="w"/>
+                  <dgm:constr type="h" for="ch" forName="ParentAccent" refType="h" fact="0.3576"/>
+                  <dgm:constr type="l" for="ch" forName="ParentSmallAccent" refType="w" fact="0"/>
+                  <dgm:constr type="b" for="ch" forName="ParentSmallAccent" refType="h"/>
+                  <dgm:constr type="w" for="ch" forName="ParentSmallAccent" refType="h" fact="0.2233"/>
+                  <dgm:constr type="h" for="ch" forName="ParentSmallAccent" refType="h" fact="0.2233"/>
+                </dgm:constrLst>
+              </dgm:if>
+              <dgm:else name="Name7">
+                <dgm:constrLst>
+                  <dgm:constr type="l" for="ch" forName="Parent" refType="w" fact="0"/>
+                  <dgm:constr type="t" for="ch" forName="Parent" refType="h" fact="0"/>
+                  <dgm:constr type="w" for="ch" forName="Parent" refType="w"/>
+                  <dgm:constr type="h" for="ch" forName="Parent" refType="h" fact="0.6424"/>
+                  <dgm:constr type="l" for="ch" forName="ParentAccent" refType="w" fact="0"/>
+                  <dgm:constr type="b" for="ch" forName="ParentAccent" refType="h"/>
+                  <dgm:constr type="w" for="ch" forName="ParentAccent" refType="w"/>
+                  <dgm:constr type="h" for="ch" forName="ParentAccent" refType="h" fact="0.3576"/>
+                  <dgm:constr type="r" for="ch" forName="ParentSmallAccent" refType="w"/>
+                  <dgm:constr type="b" for="ch" forName="ParentSmallAccent" refType="h"/>
+                  <dgm:constr type="w" for="ch" forName="ParentSmallAccent" refType="h" fact="0.2233"/>
+                  <dgm:constr type="h" for="ch" forName="ParentSmallAccent" refType="h" fact="0.2233"/>
+                </dgm:constrLst>
+              </dgm:else>
+            </dgm:choose>
+            <dgm:ruleLst/>
+            <dgm:layoutNode name="ParentAccent" styleLbl="alignNode1">
+              <dgm:alg type="sp"/>
+              <dgm:shape xmlns:r="http://schemas.openxmlformats.org/officeDocument/2006/relationships" type="rect" r:blip="">
+                <dgm:adjLst/>
+              </dgm:shape>
+              <dgm:presOf/>
+            </dgm:layoutNode>
+            <dgm:layoutNode name="ParentSmallAccent" styleLbl="fgAcc1">
+              <dgm:alg type="sp"/>
+              <dgm:shape xmlns:r="http://schemas.openxmlformats.org/officeDocument/2006/relationships" type="rect" r:blip="">
+                <dgm:adjLst/>
+              </dgm:shape>
+              <dgm:presOf/>
+            </dgm:layoutNode>
+            <dgm:layoutNode name="Parent" styleLbl="revTx">
+              <dgm:varLst>
+                <dgm:chMax/>
+                <dgm:chPref val="4"/>
+                <dgm:bulletEnabled val="1"/>
+              </dgm:varLst>
+              <dgm:choose name="Name8">
+                <dgm:if name="Name9" func="var" arg="dir" op="equ" val="norm">
+                  <dgm:alg type="tx">
+                    <dgm:param type="txAnchorVertCh" val="mid"/>
+                    <dgm:param type="parTxLTRAlign" val="l"/>
+                  </dgm:alg>
+                </dgm:if>
+                <dgm:else name="Name10">
+                  <dgm:alg type="tx">
+                    <dgm:param type="txAnchorVertCh" val="mid"/>
+                    <dgm:param type="parTxLTRAlign" val="r"/>
+                  </dgm:alg>
+                </dgm:else>
+              </dgm:choose>
+              <dgm:shape xmlns:r="http://schemas.openxmlformats.org/officeDocument/2006/relationships" type="rect" r:blip="">
+                <dgm:adjLst/>
+              </dgm:shape>
+              <dgm:presOf axis="self" ptType="node"/>
+              <dgm:constrLst>
+                <dgm:constr type="tMarg" refType="primFontSz" fact="0.1"/>
+                <dgm:constr type="bMarg" refType="primFontSz" fact="0.1"/>
+                <dgm:constr type="lMarg" refType="primFontSz" fact="0.15"/>
+                <dgm:constr type="rMarg" refType="primFontSz" fact="0.15"/>
+              </dgm:constrLst>
+              <dgm:ruleLst>
+                <dgm:rule type="primFontSz" val="5" fact="NaN" max="NaN"/>
+                <dgm:rule type="primFontSz" val="65" fact="NaN" max="NaN"/>
+              </dgm:ruleLst>
+            </dgm:layoutNode>
+          </dgm:layoutNode>
+          <dgm:layoutNode name="childShape">
+            <dgm:varLst>
+              <dgm:chMax val="0"/>
+              <dgm:chPref val="0"/>
+            </dgm:varLst>
+            <dgm:alg type="hierChild">
+              <dgm:param type="chAlign" val="r"/>
+              <dgm:param type="linDir" val="fromT"/>
+              <dgm:param type="fallback" val="2D"/>
+            </dgm:alg>
+            <dgm:shape xmlns:r="http://schemas.openxmlformats.org/officeDocument/2006/relationships" r:blip="">
+              <dgm:adjLst/>
+            </dgm:shape>
+            <dgm:presOf/>
+            <dgm:constrLst/>
+            <dgm:ruleLst/>
+            <dgm:forEach name="Name11" axis="ch">
+              <dgm:forEach name="Name12" axis="self" ptType="node">
+                <dgm:layoutNode name="childComposite">
+                  <dgm:varLst>
+                    <dgm:chMax val="0"/>
+                    <dgm:chPref val="0"/>
+                  </dgm:varLst>
+                  <dgm:alg type="composite"/>
+                  <dgm:shape xmlns:r="http://schemas.openxmlformats.org/officeDocument/2006/relationships" r:blip="">
+                    <dgm:adjLst/>
+                  </dgm:shape>
+                  <dgm:presOf/>
+                  <dgm:choose name="Name13">
+                    <dgm:if name="Name14" func="var" arg="dir" op="equ" val="norm">
+                      <dgm:constrLst>
+                        <dgm:constr type="w" for="ch" forName="ChildAccent" refType="h" fact="0.429"/>
+                        <dgm:constr type="h" for="ch" forName="ChildAccent" refType="h" fact="0.429"/>
+                        <dgm:constr type="l" for="ch" forName="ChildAccent" refType="w" fact="0"/>
+                        <dgm:constr type="t" for="ch" forName="ChildAccent" refType="h" fact="0.2855"/>
+                        <dgm:constr type="w" for="ch" forName="Child" refType="w" fact="0.93"/>
+                        <dgm:constr type="h" for="ch" forName="Child" refType="h"/>
+                        <dgm:constr type="l" for="ch" forName="Child" refType="w" fact="0.07"/>
+                        <dgm:constr type="t" for="ch" forName="Child" refType="h" fact="0"/>
+                      </dgm:constrLst>
+                    </dgm:if>
+                    <dgm:else name="Name15">
+                      <dgm:constrLst>
+                        <dgm:constr type="w" for="ch" forName="ChildAccent" refType="h" fact="0.429"/>
+                        <dgm:constr type="h" for="ch" forName="ChildAccent" refType="h" fact="0.429"/>
+                        <dgm:constr type="r" for="ch" forName="ChildAccent" refType="w"/>
+                        <dgm:constr type="t" for="ch" forName="ChildAccent" refType="h" fact="0.2855"/>
+                        <dgm:constr type="w" for="ch" forName="Child" refType="w" fact="0.93"/>
+                        <dgm:constr type="h" for="ch" forName="Child" refType="h"/>
+                        <dgm:constr type="r" for="ch" forName="Child" refType="w" fact="0.93"/>
+                        <dgm:constr type="t" for="ch" forName="Child" refType="h" fact="0"/>
+                      </dgm:constrLst>
+                    </dgm:else>
+                  </dgm:choose>
+                  <dgm:ruleLst/>
+                  <dgm:layoutNode name="ChildAccent" styleLbl="solidFgAcc1">
+                    <dgm:alg type="sp"/>
+                    <dgm:shape xmlns:r="http://schemas.openxmlformats.org/officeDocument/2006/relationships" type="rect" r:blip="">
+                      <dgm:adjLst/>
+                    </dgm:shape>
+                    <dgm:presOf/>
+                  </dgm:layoutNode>
+                  <dgm:layoutNode name="Child" styleLbl="revTx">
+                    <dgm:varLst>
+                      <dgm:chMax val="0"/>
+                      <dgm:chPref val="0"/>
+                      <dgm:bulletEnabled val="1"/>
+                    </dgm:varLst>
+                    <dgm:choose name="Name16">
+                      <dgm:if name="Name17" func="var" arg="dir" op="equ" val="norm">
+                        <dgm:alg type="tx">
+                          <dgm:param type="txAnchorVertCh" val="mid"/>
+                          <dgm:param type="parTxLTRAlign" val="l"/>
+                        </dgm:alg>
+                      </dgm:if>
+                      <dgm:else name="Name18">
+                        <dgm:alg type="tx">
+                          <dgm:param type="txAnchorVertCh" val="mid"/>
+                          <dgm:param type="parTxLTRAlign" val="r"/>
+                        </dgm:alg>
+                      </dgm:else>
+                    </dgm:choose>
+                    <dgm:shape xmlns:r="http://schemas.openxmlformats.org/officeDocument/2006/relationships" type="rect" r:blip="">
+                      <dgm:adjLst/>
+                    </dgm:shape>
+                    <dgm:presOf axis="desOrSelf" ptType="node node"/>
+                    <dgm:ruleLst>
+                      <dgm:rule type="primFontSz" val="5" fact="NaN" max="NaN"/>
+                    </dgm:ruleLst>
+                  </dgm:layoutNode>
+                </dgm:layoutNode>
+              </dgm:forEach>
+            </dgm:forEach>
+          </dgm:layoutNode>
+        </dgm:layoutNode>
+      </dgm:forEach>
+    </dgm:forEach>
+  </dgm:layoutNode>
+</dgm:layoutDef>
+</file>
+
+<file path=ppt/diagrams/quickStyle1.xml><?xml version="1.0" encoding="utf-8"?>
+<dgm:styleDef xmlns:dgm="http://schemas.openxmlformats.org/drawingml/2006/diagram" xmlns:a="http://schemas.openxmlformats.org/drawingml/2006/main" uniqueId="urn:microsoft.com/office/officeart/2005/8/quickstyle/simple1">
+  <dgm:title val=""/>
+  <dgm:desc val=""/>
+  <dgm:catLst>
+    <dgm:cat type="simple" pri="10100"/>
+  </dgm:catLst>
+  <dgm:scene3d>
+    <a:camera prst="orthographicFront"/>
+    <a:lightRig rig="threePt" dir="t"/>
+  </dgm:scene3d>
+  <dgm:styleLbl name="node0">
+    <dgm:scene3d>
+      <a:camera prst="orthographicFront"/>
+      <a:lightRig rig="threePt" dir="t"/>
+    </dgm:scene3d>
+    <dgm:sp3d/>
+    <dgm:txPr/>
+    <dgm:style>
+      <a:lnRef idx="2">
+        <a:scrgbClr r="0" g="0" b="0"/>
+      </a:lnRef>
+      <a:fillRef idx="1">
+        <a:scrgbClr r="0" g="0" b="0"/>
+      </a:fillRef>
+      <a:effectRef idx="0">
+        <a:scrgbClr r="0" g="0" b="0"/>
+      </a:effectRef>
+      <a:fontRef idx="minor">
+        <a:schemeClr val="lt1"/>
+      </a:fontRef>
+    </dgm:style>
+  </dgm:styleLbl>
+  <dgm:styleLbl name="lnNode1">
+    <dgm:scene3d>
+      <a:camera prst="orthographicFront"/>
+      <a:lightRig rig="threePt" dir="t"/>
+    </dgm:scene3d>
+    <dgm:sp3d/>
+    <dgm:txPr/>
+    <dgm:style>
+      <a:lnRef idx="2">
+        <a:scrgbClr r="0" g="0" b="0"/>
+      </a:lnRef>
+      <a:fillRef idx="1">
+        <a:scrgbClr r="0" g="0" b="0"/>
+      </a:fillRef>
+      <a:effectRef idx="0">
+        <a:scrgbClr r="0" g="0" b="0"/>
+      </a:effectRef>
+      <a:fontRef idx="minor">
+        <a:schemeClr val="lt1"/>
+      </a:fontRef>
+    </dgm:style>
+  </dgm:styleLbl>
+  <dgm:styleLbl name="vennNode1">
+    <dgm:scene3d>
+      <a:camera prst="orthographicFront"/>
+      <a:lightRig rig="threePt" dir="t"/>
+    </dgm:scene3d>
+    <dgm:sp3d/>
+    <dgm:txPr/>
+    <dgm:style>
+      <a:lnRef idx="2">
+        <a:scrgbClr r="0" g="0" b="0"/>
+      </a:lnRef>
+      <a:fillRef idx="1">
+        <a:scrgbClr r="0" g="0" b="0"/>
+      </a:fillRef>
+      <a:effectRef idx="0">
+        <a:scrgbClr r="0" g="0" b="0"/>
+      </a:effectRef>
+      <a:fontRef idx="minor">
+        <a:schemeClr val="tx1"/>
+      </a:fontRef>
+    </dgm:style>
+  </dgm:styleLbl>
+  <dgm:styleLbl name="alignNode1">
+    <dgm:scene3d>
+      <a:camera prst="orthographicFront"/>
+      <a:lightRig rig="threePt" dir="t"/>
+    </dgm:scene3d>
+    <dgm:sp3d/>
+    <dgm:txPr/>
+    <dgm:style>
+      <a:lnRef idx="2">
+        <a:scrgbClr r="0" g="0" b="0"/>
+      </a:lnRef>
+      <a:fillRef idx="1">
+        <a:scrgbClr r="0" g="0" b="0"/>
+      </a:fillRef>
+      <a:effectRef idx="0">
+        <a:scrgbClr r="0" g="0" b="0"/>
+      </a:effectRef>
+      <a:fontRef idx="minor">
+        <a:schemeClr val="lt1"/>
+      </a:fontRef>
+    </dgm:style>
+  </dgm:styleLbl>
+  <dgm:styleLbl name="node1">
+    <dgm:scene3d>
+      <a:camera prst="orthographicFront"/>
+      <a:lightRig rig="threePt" dir="t"/>
+    </dgm:scene3d>
+    <dgm:sp3d/>
+    <dgm:txPr/>
+    <dgm:style>
+      <a:lnRef idx="2">
+        <a:scrgbClr r="0" g="0" b="0"/>
+      </a:lnRef>
+      <a:fillRef idx="1">
+        <a:scrgbClr r="0" g="0" b="0"/>
+      </a:fillRef>
+      <a:effectRef idx="0">
+        <a:scrgbClr r="0" g="0" b="0"/>
+      </a:effectRef>
+      <a:fontRef idx="minor">
+        <a:schemeClr val="lt1"/>
+      </a:fontRef>
+    </dgm:style>
+  </dgm:styleLbl>
+  <dgm:styleLbl name="node2">
+    <dgm:scene3d>
+      <a:camera prst="orthographicFront"/>
+      <a:lightRig rig="threePt" dir="t"/>
+    </dgm:scene3d>
+    <dgm:sp3d/>
+    <dgm:txPr/>
+    <dgm:style>
+      <a:lnRef idx="2">
+        <a:scrgbClr r="0" g="0" b="0"/>
+      </a:lnRef>
+      <a:fillRef idx="1">
+        <a:scrgbClr r="0" g="0" b="0"/>
+      </a:fillRef>
+      <a:effectRef idx="0">
+        <a:scrgbClr r="0" g="0" b="0"/>
+      </a:effectRef>
+      <a:fontRef idx="minor">
+        <a:schemeClr val="lt1"/>
+      </a:fontRef>
+    </dgm:style>
+  </dgm:styleLbl>
+  <dgm:styleLbl name="node3">
+    <dgm:scene3d>
+      <a:camera prst="orthographicFront"/>
+      <a:lightRig rig="threePt" dir="t"/>
+    </dgm:scene3d>
+    <dgm:sp3d/>
+    <dgm:txPr/>
+    <dgm:style>
+      <a:lnRef idx="2">
+        <a:scrgbClr r="0" g="0" b="0"/>
+      </a:lnRef>
+      <a:fillRef idx="1">
+        <a:scrgbClr r="0" g="0" b="0"/>
+      </a:fillRef>
+      <a:effectRef idx="0">
+        <a:scrgbClr r="0" g="0" b="0"/>
+      </a:effectRef>
+      <a:fontRef idx="minor">
+        <a:schemeClr val="lt1"/>
+      </a:fontRef>
+    </dgm:style>
+  </dgm:styleLbl>
+  <dgm:styleLbl name="node4">
+    <dgm:scene3d>
+      <a:camera prst="orthographicFront"/>
+      <a:lightRig rig="threePt" dir="t"/>
+    </dgm:scene3d>
+    <dgm:sp3d/>
+    <dgm:txPr/>
+    <dgm:style>
+      <a:lnRef idx="2">
+        <a:scrgbClr r="0" g="0" b="0"/>
+      </a:lnRef>
+      <a:fillRef idx="1">
+        <a:scrgbClr r="0" g="0" b="0"/>
+      </a:fillRef>
+      <a:effectRef idx="0">
+        <a:scrgbClr r="0" g="0" b="0"/>
+      </a:effectRef>
+      <a:fontRef idx="minor">
+        <a:schemeClr val="lt1"/>
+      </a:fontRef>
+    </dgm:style>
+  </dgm:styleLbl>
+  <dgm:styleLbl name="fgImgPlace1">
+    <dgm:scene3d>
+      <a:camera prst="orthographicFront"/>
+      <a:lightRig rig="threePt" dir="t"/>
+    </dgm:scene3d>
+    <dgm:sp3d/>
+    <dgm:txPr/>
+    <dgm:style>
+      <a:lnRef idx="2">
+        <a:scrgbClr r="0" g="0" b="0"/>
+      </a:lnRef>
+      <a:fillRef idx="1">
+        <a:scrgbClr r="0" g="0" b="0"/>
+      </a:fillRef>
+      <a:effectRef idx="0">
+        <a:scrgbClr r="0" g="0" b="0"/>
+      </a:effectRef>
+      <a:fontRef idx="minor"/>
+    </dgm:style>
+  </dgm:styleLbl>
+  <dgm:styleLbl name="alignImgPlace1">
+    <dgm:scene3d>
+      <a:camera prst="orthographicFront"/>
+      <a:lightRig rig="threePt" dir="t"/>
+    </dgm:scene3d>
+    <dgm:sp3d/>
+    <dgm:txPr/>
+    <dgm:style>
+      <a:lnRef idx="2">
+        <a:scrgbClr r="0" g="0" b="0"/>
+      </a:lnRef>
+      <a:fillRef idx="1">
+        <a:scrgbClr r="0" g="0" b="0"/>
+      </a:fillRef>
+      <a:effectRef idx="0">
+        <a:scrgbClr r="0" g="0" b="0"/>
+      </a:effectRef>
+      <a:fontRef idx="minor"/>
+    </dgm:style>
+  </dgm:styleLbl>
+  <dgm:styleLbl name="bgImgPlace1">
+    <dgm:scene3d>
+      <a:camera prst="orthographicFront"/>
+      <a:lightRig rig="threePt" dir="t"/>
+    </dgm:scene3d>
+    <dgm:sp3d/>
+    <dgm:txPr/>
+    <dgm:style>
+      <a:lnRef idx="2">
+        <a:scrgbClr r="0" g="0" b="0"/>
+      </a:lnRef>
+      <a:fillRef idx="1">
+        <a:scrgbClr r="0" g="0" b="0"/>
+      </a:fillRef>
+      <a:effectRef idx="0">
+        <a:scrgbClr r="0" g="0" b="0"/>
+      </a:effectRef>
+      <a:fontRef idx="minor"/>
+    </dgm:style>
+  </dgm:styleLbl>
+  <dgm:styleLbl name="sibTrans2D1">
+    <dgm:scene3d>
+      <a:camera prst="orthographicFront"/>
+      <a:lightRig rig="threePt" dir="t"/>
+    </dgm:scene3d>
+    <dgm:sp3d/>
+    <dgm:txPr/>
+    <dgm:style>
+      <a:lnRef idx="0">
+        <a:scrgbClr r="0" g="0" b="0"/>
+      </a:lnRef>
+      <a:fillRef idx="1">
+        <a:scrgbClr r="0" g="0" b="0"/>
+      </a:fillRef>
+      <a:effectRef idx="0">
+        <a:scrgbClr r="0" g="0" b="0"/>
+      </a:effectRef>
+      <a:fontRef idx="minor">
+        <a:schemeClr val="lt1"/>
+      </a:fontRef>
+    </dgm:style>
+  </dgm:styleLbl>
+  <dgm:styleLbl name="fgSibTrans2D1">
+    <dgm:scene3d>
+      <a:camera prst="orthographicFront"/>
+      <a:lightRig rig="threePt" dir="t"/>
+    </dgm:scene3d>
+    <dgm:sp3d/>
+    <dgm:txPr/>
+    <dgm:style>
+      <a:lnRef idx="0">
+        <a:scrgbClr r="0" g="0" b="0"/>
+      </a:lnRef>
+      <a:fillRef idx="1">
+        <a:scrgbClr r="0" g="0" b="0"/>
+      </a:fillRef>
+      <a:effectRef idx="0">
+        <a:scrgbClr r="0" g="0" b="0"/>
+      </a:effectRef>
+      <a:fontRef idx="minor">
+        <a:schemeClr val="lt1"/>
+      </a:fontRef>
+    </dgm:style>
+  </dgm:styleLbl>
+  <dgm:styleLbl name="bgSibTrans2D1">
+    <dgm:scene3d>
+      <a:camera prst="orthographicFront"/>
+      <a:lightRig rig="threePt" dir="t"/>
+    </dgm:scene3d>
+    <dgm:sp3d/>
+    <dgm:txPr/>
+    <dgm:style>
+      <a:lnRef idx="0">
+        <a:scrgbClr r="0" g="0" b="0"/>
+      </a:lnRef>
+      <a:fillRef idx="1">
+        <a:scrgbClr r="0" g="0" b="0"/>
+      </a:fillRef>
+      <a:effectRef idx="0">
+        <a:scrgbClr r="0" g="0" b="0"/>
+      </a:effectRef>
+      <a:fontRef idx="minor">
+        <a:schemeClr val="lt1"/>
+      </a:fontRef>
+    </dgm:style>
+  </dgm:styleLbl>
+  <dgm:styleLbl name="sibTrans1D1">
+    <dgm:scene3d>
+      <a:camera prst="orthographicFront"/>
+      <a:lightRig rig="threePt" dir="t"/>
+    </dgm:scene3d>
+    <dgm:sp3d/>
+    <dgm:txPr/>
+    <dgm:style>
+      <a:lnRef idx="1">
+        <a:scrgbClr r="0" g="0" b="0"/>
+      </a:lnRef>
+      <a:fillRef idx="0">
+        <a:scrgbClr r="0" g="0" b="0"/>
+      </a:fillRef>
+      <a:effectRef idx="0">
+        <a:scrgbClr r="0" g="0" b="0"/>
+      </a:effectRef>
+      <a:fontRef idx="minor"/>
+    </dgm:style>
+  </dgm:styleLbl>
+  <dgm:styleLbl name="callout">
+    <dgm:scene3d>
+      <a:camera prst="orthographicFront"/>
+      <a:lightRig rig="threePt" dir="t"/>
+    </dgm:scene3d>
+    <dgm:sp3d/>
+    <dgm:txPr/>
+    <dgm:style>
+      <a:lnRef idx="2">
+        <a:scrgbClr r="0" g="0" b="0"/>
+      </a:lnRef>
+      <a:fillRef idx="1">
+        <a:scrgbClr r="0" g="0" b="0"/>
+      </a:fillRef>
+      <a:effectRef idx="0">
+        <a:scrgbClr r="0" g="0" b="0"/>
+      </a:effectRef>
+      <a:fontRef idx="minor"/>
+    </dgm:style>
+  </dgm:styleLbl>
+  <dgm:styleLbl name="asst0">
+    <dgm:scene3d>
+      <a:camera prst="orthographicFront"/>
+      <a:lightRig rig="threePt" dir="t"/>
+    </dgm:scene3d>
+    <dgm:sp3d/>
+    <dgm:txPr/>
+    <dgm:style>
+      <a:lnRef idx="2">
+        <a:scrgbClr r="0" g="0" b="0"/>
+      </a:lnRef>
+      <a:fillRef idx="1">
+        <a:scrgbClr r="0" g="0" b="0"/>
+      </a:fillRef>
+      <a:effectRef idx="0">
+        <a:scrgbClr r="0" g="0" b="0"/>
+      </a:effectRef>
+      <a:fontRef idx="minor">
+        <a:schemeClr val="lt1"/>
+      </a:fontRef>
+    </dgm:style>
+  </dgm:styleLbl>
+  <dgm:styleLbl name="asst1">
+    <dgm:scene3d>
+      <a:camera prst="orthographicFront"/>
+      <a:lightRig rig="threePt" dir="t"/>
+    </dgm:scene3d>
+    <dgm:sp3d/>
+    <dgm:txPr/>
+    <dgm:style>
+      <a:lnRef idx="2">
+        <a:scrgbClr r="0" g="0" b="0"/>
+      </a:lnRef>
+      <a:fillRef idx="1">
+        <a:scrgbClr r="0" g="0" b="0"/>
+      </a:fillRef>
+      <a:effectRef idx="0">
+        <a:scrgbClr r="0" g="0" b="0"/>
+      </a:effectRef>
+      <a:fontRef idx="minor">
+        <a:schemeClr val="lt1"/>
+      </a:fontRef>
+    </dgm:style>
+  </dgm:styleLbl>
+  <dgm:styleLbl name="asst2">
+    <dgm:scene3d>
+      <a:camera prst="orthographicFront"/>
+      <a:lightRig rig="threePt" dir="t"/>
+    </dgm:scene3d>
+    <dgm:sp3d/>
+    <dgm:txPr/>
+    <dgm:style>
+      <a:lnRef idx="2">
+        <a:scrgbClr r="0" g="0" b="0"/>
+      </a:lnRef>
+      <a:fillRef idx="1">
+        <a:scrgbClr r="0" g="0" b="0"/>
+      </a:fillRef>
+      <a:effectRef idx="0">
+        <a:scrgbClr r="0" g="0" b="0"/>
+      </a:effectRef>
+      <a:fontRef idx="minor">
+        <a:schemeClr val="lt1"/>
+      </a:fontRef>
+    </dgm:style>
+  </dgm:styleLbl>
+  <dgm:styleLbl name="asst3">
+    <dgm:scene3d>
+      <a:camera prst="orthographicFront"/>
+      <a:lightRig rig="threePt" dir="t"/>
+    </dgm:scene3d>
+    <dgm:sp3d/>
+    <dgm:txPr/>
+    <dgm:style>
+      <a:lnRef idx="2">
+        <a:scrgbClr r="0" g="0" b="0"/>
+      </a:lnRef>
+      <a:fillRef idx="1">
+        <a:scrgbClr r="0" g="0" b="0"/>
+      </a:fillRef>
+      <a:effectRef idx="0">
+        <a:scrgbClr r="0" g="0" b="0"/>
+      </a:effectRef>
+      <a:fontRef idx="minor">
+        <a:schemeClr val="lt1"/>
+      </a:fontRef>
+    </dgm:style>
+  </dgm:styleLbl>
+  <dgm:styleLbl name="asst4">
+    <dgm:scene3d>
+      <a:camera prst="orthographicFront"/>
+      <a:lightRig rig="threePt" dir="t"/>
+    </dgm:scene3d>
+    <dgm:sp3d/>
+    <dgm:txPr/>
+    <dgm:style>
+      <a:lnRef idx="2">
+        <a:scrgbClr r="0" g="0" b="0"/>
+      </a:lnRef>
+      <a:fillRef idx="1">
+        <a:scrgbClr r="0" g="0" b="0"/>
+      </a:fillRef>
+      <a:effectRef idx="0">
+        <a:scrgbClr r="0" g="0" b="0"/>
+      </a:effectRef>
+      <a:fontRef idx="minor">
+        <a:schemeClr val="lt1"/>
+      </a:fontRef>
+    </dgm:style>
+  </dgm:styleLbl>
+  <dgm:styleLbl name="parChTrans2D1">
+    <dgm:scene3d>
+      <a:camera prst="orthographicFront"/>
+      <a:lightRig rig="threePt" dir="t"/>
+    </dgm:scene3d>
+    <dgm:sp3d/>
+    <dgm:txPr/>
+    <dgm:style>
+      <a:lnRef idx="2">
+        <a:scrgbClr r="0" g="0" b="0"/>
+      </a:lnRef>
+      <a:fillRef idx="1">
+        <a:scrgbClr r="0" g="0" b="0"/>
+      </a:fillRef>
+      <a:effectRef idx="0">
+        <a:scrgbClr r="0" g="0" b="0"/>
+      </a:effectRef>
+      <a:fontRef idx="minor">
+        <a:schemeClr val="lt1"/>
+      </a:fontRef>
+    </dgm:style>
+  </dgm:styleLbl>
+  <dgm:styleLbl name="parChTrans2D2">
+    <dgm:scene3d>
+      <a:camera prst="orthographicFront"/>
+      <a:lightRig rig="threePt" dir="t"/>
+    </dgm:scene3d>
+    <dgm:sp3d/>
+    <dgm:txPr/>
+    <dgm:style>
+      <a:lnRef idx="2">
+        <a:scrgbClr r="0" g="0" b="0"/>
+      </a:lnRef>
+      <a:fillRef idx="1">
+        <a:scrgbClr r="0" g="0" b="0"/>
+      </a:fillRef>
+      <a:effectRef idx="0">
+        <a:scrgbClr r="0" g="0" b="0"/>
+      </a:effectRef>
+      <a:fontRef idx="minor">
+        <a:schemeClr val="lt1"/>
+      </a:fontRef>
+    </dgm:style>
+  </dgm:styleLbl>
+  <dgm:styleLbl name="parChTrans2D3">
+    <dgm:scene3d>
+      <a:camera prst="orthographicFront"/>
+      <a:lightRig rig="threePt" dir="t"/>
+    </dgm:scene3d>
+    <dgm:sp3d/>
+    <dgm:txPr/>
+    <dgm:style>
+      <a:lnRef idx="2">
+        <a:scrgbClr r="0" g="0" b="0"/>
+      </a:lnRef>
+      <a:fillRef idx="1">
+        <a:scrgbClr r="0" g="0" b="0"/>
+      </a:fillRef>
+      <a:effectRef idx="0">
+        <a:scrgbClr r="0" g="0" b="0"/>
+      </a:effectRef>
+      <a:fontRef idx="minor">
+        <a:schemeClr val="lt1"/>
+      </a:fontRef>
+    </dgm:style>
+  </dgm:styleLbl>
+  <dgm:styleLbl name="parChTrans2D4">
+    <dgm:scene3d>
+      <a:camera prst="orthographicFront"/>
+      <a:lightRig rig="threePt" dir="t"/>
+    </dgm:scene3d>
+    <dgm:sp3d/>
+    <dgm:txPr/>
+    <dgm:style>
+      <a:lnRef idx="2">
+        <a:scrgbClr r="0" g="0" b="0"/>
+      </a:lnRef>
+      <a:fillRef idx="1">
+        <a:scrgbClr r="0" g="0" b="0"/>
+      </a:fillRef>
+      <a:effectRef idx="0">
+        <a:scrgbClr r="0" g="0" b="0"/>
+      </a:effectRef>
+      <a:fontRef idx="minor">
+        <a:schemeClr val="lt1"/>
+      </a:fontRef>
+    </dgm:style>
+  </dgm:styleLbl>
+  <dgm:styleLbl name="parChTrans1D1">
+    <dgm:scene3d>
+      <a:camera prst="orthographicFront"/>
+      <a:lightRig rig="threePt" dir="t"/>
+    </dgm:scene3d>
+    <dgm:sp3d/>
+    <dgm:txPr/>
+    <dgm:style>
+      <a:lnRef idx="2">
+        <a:scrgbClr r="0" g="0" b="0"/>
+      </a:lnRef>
+      <a:fillRef idx="0">
+        <a:scrgbClr r="0" g="0" b="0"/>
+      </a:fillRef>
+      <a:effectRef idx="0">
+        <a:scrgbClr r="0" g="0" b="0"/>
+      </a:effectRef>
+      <a:fontRef idx="minor"/>
+    </dgm:style>
+  </dgm:styleLbl>
+  <dgm:styleLbl name="parChTrans1D2">
+    <dgm:scene3d>
+      <a:camera prst="orthographicFront"/>
+      <a:lightRig rig="threePt" dir="t"/>
+    </dgm:scene3d>
+    <dgm:sp3d/>
+    <dgm:txPr/>
+    <dgm:style>
+      <a:lnRef idx="2">
+        <a:scrgbClr r="0" g="0" b="0"/>
+      </a:lnRef>
+      <a:fillRef idx="0">
+        <a:scrgbClr r="0" g="0" b="0"/>
+      </a:fillRef>
+      <a:effectRef idx="0">
+        <a:scrgbClr r="0" g="0" b="0"/>
+      </a:effectRef>
+      <a:fontRef idx="minor"/>
+    </dgm:style>
+  </dgm:styleLbl>
+  <dgm:styleLbl name="parChTrans1D3">
+    <dgm:scene3d>
+      <a:camera prst="orthographicFront"/>
+      <a:lightRig rig="threePt" dir="t"/>
+    </dgm:scene3d>
+    <dgm:sp3d/>
+    <dgm:txPr/>
+    <dgm:style>
+      <a:lnRef idx="2">
+        <a:scrgbClr r="0" g="0" b="0"/>
+      </a:lnRef>
+      <a:fillRef idx="0">
+        <a:scrgbClr r="0" g="0" b="0"/>
+      </a:fillRef>
+      <a:effectRef idx="0">
+        <a:scrgbClr r="0" g="0" b="0"/>
+      </a:effectRef>
+      <a:fontRef idx="minor"/>
+    </dgm:style>
+  </dgm:styleLbl>
+  <dgm:styleLbl name="parChTrans1D4">
+    <dgm:scene3d>
+      <a:camera prst="orthographicFront"/>
+      <a:lightRig rig="threePt" dir="t"/>
+    </dgm:scene3d>
+    <dgm:sp3d/>
+    <dgm:txPr/>
+    <dgm:style>
+      <a:lnRef idx="2">
+        <a:scrgbClr r="0" g="0" b="0"/>
+      </a:lnRef>
+      <a:fillRef idx="0">
+        <a:scrgbClr r="0" g="0" b="0"/>
+      </a:fillRef>
+      <a:effectRef idx="0">
+        <a:scrgbClr r="0" g="0" b="0"/>
+      </a:effectRef>
+      <a:fontRef idx="minor"/>
+    </dgm:style>
+  </dgm:styleLbl>
+  <dgm:styleLbl name="fgAcc1">
+    <dgm:scene3d>
+      <a:camera prst="orthographicFront"/>
+      <a:lightRig rig="threePt" dir="t"/>
+    </dgm:scene3d>
+    <dgm:sp3d/>
+    <dgm:txPr/>
+    <dgm:style>
+      <a:lnRef idx="2">
+        <a:scrgbClr r="0" g="0" b="0"/>
+      </a:lnRef>
+      <a:fillRef idx="1">
+        <a:scrgbClr r="0" g="0" b="0"/>
+      </a:fillRef>
+      <a:effectRef idx="0">
+        <a:scrgbClr r="0" g="0" b="0"/>
+      </a:effectRef>
+      <a:fontRef idx="minor"/>
+    </dgm:style>
+  </dgm:styleLbl>
+  <dgm:styleLbl name="conFgAcc1">
+    <dgm:scene3d>
+      <a:camera prst="orthographicFront"/>
+      <a:lightRig rig="threePt" dir="t"/>
+    </dgm:scene3d>
+    <dgm:sp3d/>
+    <dgm:txPr/>
+    <dgm:style>
+      <a:lnRef idx="2">
+        <a:scrgbClr r="0" g="0" b="0"/>
+      </a:lnRef>
+      <a:fillRef idx="1">
+        <a:scrgbClr r="0" g="0" b="0"/>
+      </a:fillRef>
+      <a:effectRef idx="0">
+        <a:scrgbClr r="0" g="0" b="0"/>
+      </a:effectRef>
+      <a:fontRef idx="minor"/>
+    </dgm:style>
+  </dgm:styleLbl>
+  <dgm:styleLbl name="alignAcc1">
+    <dgm:scene3d>
+      <a:camera prst="orthographicFront"/>
+      <a:lightRig rig="threePt" dir="t"/>
+    </dgm:scene3d>
+    <dgm:sp3d/>
+    <dgm:txPr/>
+    <dgm:style>
+      <a:lnRef idx="2">
+        <a:scrgbClr r="0" g="0" b="0"/>
+      </a:lnRef>
+      <a:fillRef idx="1">
+        <a:scrgbClr r="0" g="0" b="0"/>
+      </a:fillRef>
+      <a:effectRef idx="0">
+        <a:scrgbClr r="0" g="0" b="0"/>
+      </a:effectRef>
+      <a:fontRef idx="minor"/>
+    </dgm:style>
+  </dgm:styleLbl>
+  <dgm:styleLbl name="trAlignAcc1">
+    <dgm:scene3d>
+      <a:camera prst="orthographicFront"/>
+      <a:lightRig rig="threePt" dir="t"/>
+    </dgm:scene3d>
+    <dgm:sp3d/>
+    <dgm:txPr/>
+    <dgm:style>
+      <a:lnRef idx="1">
+        <a:scrgbClr r="0" g="0" b="0"/>
+      </a:lnRef>
+      <a:fillRef idx="1">
+        <a:scrgbClr r="0" g="0" b="0"/>
+      </a:fillRef>
+      <a:effectRef idx="0">
+        <a:scrgbClr r="0" g="0" b="0"/>
+      </a:effectRef>
+      <a:fontRef idx="minor"/>
+    </dgm:style>
+  </dgm:styleLbl>
+  <dgm:styleLbl name="bgAcc1">
+    <dgm:scene3d>
+      <a:camera prst="orthographicFront"/>
+      <a:lightRig rig="threePt" dir="t"/>
+    </dgm:scene3d>
+    <dgm:sp3d/>
+    <dgm:txPr/>
+    <dgm:style>
+      <a:lnRef idx="2">
+        <a:scrgbClr r="0" g="0" b="0"/>
+      </a:lnRef>
+      <a:fillRef idx="1">
+        <a:scrgbClr r="0" g="0" b="0"/>
+      </a:fillRef>
+      <a:effectRef idx="0">
+        <a:scrgbClr r="0" g="0" b="0"/>
+      </a:effectRef>
+      <a:fontRef idx="minor"/>
+    </dgm:style>
+  </dgm:styleLbl>
+  <dgm:styleLbl name="solidFgAcc1">
+    <dgm:scene3d>
+      <a:camera prst="orthographicFront"/>
+      <a:lightRig rig="threePt" dir="t"/>
+    </dgm:scene3d>
+    <dgm:sp3d/>
+    <dgm:txPr/>
+    <dgm:style>
+      <a:lnRef idx="2">
+        <a:scrgbClr r="0" g="0" b="0"/>
+      </a:lnRef>
+      <a:fillRef idx="1">
+        <a:scrgbClr r="0" g="0" b="0"/>
+      </a:fillRef>
+      <a:effectRef idx="0">
+        <a:scrgbClr r="0" g="0" b="0"/>
+      </a:effectRef>
+      <a:fontRef idx="minor"/>
+    </dgm:style>
+  </dgm:styleLbl>
+  <dgm:styleLbl name="solidAlignAcc1">
+    <dgm:scene3d>
+      <a:camera prst="orthographicFront"/>
+      <a:lightRig rig="threePt" dir="t"/>
+    </dgm:scene3d>
+    <dgm:sp3d/>
+    <dgm:txPr/>
+    <dgm:style>
+      <a:lnRef idx="2">
+        <a:scrgbClr r="0" g="0" b="0"/>
+      </a:lnRef>
+      <a:fillRef idx="1">
+        <a:scrgbClr r="0" g="0" b="0"/>
+      </a:fillRef>
+      <a:effectRef idx="0">
+        <a:scrgbClr r="0" g="0" b="0"/>
+      </a:effectRef>
+      <a:fontRef idx="minor"/>
+    </dgm:style>
+  </dgm:styleLbl>
+  <dgm:styleLbl name="solidBgAcc1">
+    <dgm:scene3d>
+      <a:camera prst="orthographicFront"/>
+      <a:lightRig rig="threePt" dir="t"/>
+    </dgm:scene3d>
+    <dgm:sp3d/>
+    <dgm:txPr/>
+    <dgm:style>
+      <a:lnRef idx="2">
+        <a:scrgbClr r="0" g="0" b="0"/>
+      </a:lnRef>
+      <a:fillRef idx="1">
+        <a:scrgbClr r="0" g="0" b="0"/>
+      </a:fillRef>
+      <a:effectRef idx="0">
+        <a:scrgbClr r="0" g="0" b="0"/>
+      </a:effectRef>
+      <a:fontRef idx="minor"/>
+    </dgm:style>
+  </dgm:styleLbl>
+  <dgm:styleLbl name="fgAccFollowNode1">
+    <dgm:scene3d>
+      <a:camera prst="orthographicFront"/>
+      <a:lightRig rig="threePt" dir="t"/>
+    </dgm:scene3d>
+    <dgm:sp3d/>
+    <dgm:txPr/>
+    <dgm:style>
+      <a:lnRef idx="2">
+        <a:scrgbClr r="0" g="0" b="0"/>
+      </a:lnRef>
+      <a:fillRef idx="1">
+        <a:scrgbClr r="0" g="0" b="0"/>
+      </a:fillRef>
+      <a:effectRef idx="0">
+        <a:scrgbClr r="0" g="0" b="0"/>
+      </a:effectRef>
+      <a:fontRef idx="minor"/>
+    </dgm:style>
+  </dgm:styleLbl>
+  <dgm:styleLbl name="alignAccFollowNode1">
+    <dgm:scene3d>
+      <a:camera prst="orthographicFront"/>
+      <a:lightRig rig="threePt" dir="t"/>
+    </dgm:scene3d>
+    <dgm:sp3d/>
+    <dgm:txPr/>
+    <dgm:style>
+      <a:lnRef idx="2">
+        <a:scrgbClr r="0" g="0" b="0"/>
+      </a:lnRef>
+      <a:fillRef idx="1">
+        <a:scrgbClr r="0" g="0" b="0"/>
+      </a:fillRef>
+      <a:effectRef idx="0">
+        <a:scrgbClr r="0" g="0" b="0"/>
+      </a:effectRef>
+      <a:fontRef idx="minor"/>
+    </dgm:style>
+  </dgm:styleLbl>
+  <dgm:styleLbl name="bgAccFollowNode1">
+    <dgm:scene3d>
+      <a:camera prst="orthographicFront"/>
+      <a:lightRig rig="threePt" dir="t"/>
+    </dgm:scene3d>
+    <dgm:sp3d/>
+    <dgm:txPr/>
+    <dgm:style>
+      <a:lnRef idx="2">
+        <a:scrgbClr r="0" g="0" b="0"/>
+      </a:lnRef>
+      <a:fillRef idx="1">
+        <a:scrgbClr r="0" g="0" b="0"/>
+      </a:fillRef>
+      <a:effectRef idx="0">
+        <a:scrgbClr r="0" g="0" b="0"/>
+      </a:effectRef>
+      <a:fontRef idx="minor"/>
+    </dgm:style>
+  </dgm:styleLbl>
+  <dgm:styleLbl name="fgAcc0">
+    <dgm:scene3d>
+      <a:camera prst="orthographicFront"/>
+      <a:lightRig rig="threePt" dir="t"/>
+    </dgm:scene3d>
+    <dgm:sp3d/>
+    <dgm:txPr/>
+    <dgm:style>
+      <a:lnRef idx="2">
+        <a:scrgbClr r="0" g="0" b="0"/>
+      </a:lnRef>
+      <a:fillRef idx="1">
+        <a:scrgbClr r="0" g="0" b="0"/>
+      </a:fillRef>
+      <a:effectRef idx="0">
+        <a:scrgbClr r="0" g="0" b="0"/>
+      </a:effectRef>
+      <a:fontRef idx="minor"/>
+    </dgm:style>
+  </dgm:styleLbl>
+  <dgm:styleLbl name="fgAcc2">
+    <dgm:scene3d>
+      <a:camera prst="orthographicFront"/>
+      <a:lightRig rig="threePt" dir="t"/>
+    </dgm:scene3d>
+    <dgm:sp3d/>
+    <dgm:txPr/>
+    <dgm:style>
+      <a:lnRef idx="2">
+        <a:scrgbClr r="0" g="0" b="0"/>
+      </a:lnRef>
+      <a:fillRef idx="1">
+        <a:scrgbClr r="0" g="0" b="0"/>
+      </a:fillRef>
+      <a:effectRef idx="0">
+        <a:scrgbClr r="0" g="0" b="0"/>
+      </a:effectRef>
+      <a:fontRef idx="minor"/>
+    </dgm:style>
+  </dgm:styleLbl>
+  <dgm:styleLbl name="fgAcc3">
+    <dgm:scene3d>
+      <a:camera prst="orthographicFront"/>
+      <a:lightRig rig="threePt" dir="t"/>
+    </dgm:scene3d>
+    <dgm:sp3d/>
+    <dgm:txPr/>
+    <dgm:style>
+      <a:lnRef idx="2">
+        <a:scrgbClr r="0" g="0" b="0"/>
+      </a:lnRef>
+      <a:fillRef idx="1">
+        <a:scrgbClr r="0" g="0" b="0"/>
+      </a:fillRef>
+      <a:effectRef idx="0">
+        <a:scrgbClr r="0" g="0" b="0"/>
+      </a:effectRef>
+      <a:fontRef idx="minor"/>
+    </dgm:style>
+  </dgm:styleLbl>
+  <dgm:styleLbl name="fgAcc4">
+    <dgm:scene3d>
+      <a:camera prst="orthographicFront"/>
+      <a:lightRig rig="threePt" dir="t"/>
+    </dgm:scene3d>
+    <dgm:sp3d/>
+    <dgm:txPr/>
+    <dgm:style>
+      <a:lnRef idx="2">
+        <a:scrgbClr r="0" g="0" b="0"/>
+      </a:lnRef>
+      <a:fillRef idx="1">
+        <a:scrgbClr r="0" g="0" b="0"/>
+      </a:fillRef>
+      <a:effectRef idx="0">
+        <a:scrgbClr r="0" g="0" b="0"/>
+      </a:effectRef>
+      <a:fontRef idx="minor"/>
+    </dgm:style>
+  </dgm:styleLbl>
+  <dgm:styleLbl name="bgShp">
+    <dgm:scene3d>
+      <a:camera prst="orthographicFront"/>
+      <a:lightRig rig="threePt" dir="t"/>
+    </dgm:scene3d>
+    <dgm:sp3d/>
+    <dgm:txPr/>
+    <dgm:style>
+      <a:lnRef idx="0">
+        <a:scrgbClr r="0" g="0" b="0"/>
+      </a:lnRef>
+      <a:fillRef idx="1">
+        <a:scrgbClr r="0" g="0" b="0"/>
+      </a:fillRef>
+      <a:effectRef idx="0">
+        <a:scrgbClr r="0" g="0" b="0"/>
+      </a:effectRef>
+      <a:fontRef idx="minor"/>
+    </dgm:style>
+  </dgm:styleLbl>
+  <dgm:styleLbl name="dkBgShp">
+    <dgm:scene3d>
+      <a:camera prst="orthographicFront"/>
+      <a:lightRig rig="threePt" dir="t"/>
+    </dgm:scene3d>
+    <dgm:sp3d/>
+    <dgm:txPr/>
+    <dgm:style>
+      <a:lnRef idx="0">
+        <a:scrgbClr r="0" g="0" b="0"/>
+      </a:lnRef>
+      <a:fillRef idx="1">
+        <a:scrgbClr r="0" g="0" b="0"/>
+      </a:fillRef>
+      <a:effectRef idx="0">
+        <a:scrgbClr r="0" g="0" b="0"/>
+      </a:effectRef>
+      <a:fontRef idx="minor"/>
+    </dgm:style>
+  </dgm:styleLbl>
+  <dgm:styleLbl name="trBgShp">
+    <dgm:scene3d>
+      <a:camera prst="orthographicFront"/>
+      <a:lightRig rig="threePt" dir="t"/>
+    </dgm:scene3d>
+    <dgm:sp3d/>
+    <dgm:txPr/>
+    <dgm:style>
+      <a:lnRef idx="0">
+        <a:scrgbClr r="0" g="0" b="0"/>
+      </a:lnRef>
+      <a:fillRef idx="1">
+        <a:scrgbClr r="0" g="0" b="0"/>
+      </a:fillRef>
+      <a:effectRef idx="0">
+        <a:scrgbClr r="0" g="0" b="0"/>
+      </a:effectRef>
+      <a:fontRef idx="minor"/>
+    </dgm:style>
+  </dgm:styleLbl>
+  <dgm:styleLbl name="fgShp">
+    <dgm:scene3d>
+      <a:camera prst="orthographicFront"/>
+      <a:lightRig rig="threePt" dir="t"/>
+    </dgm:scene3d>
+    <dgm:sp3d/>
+    <dgm:txPr/>
+    <dgm:style>
+      <a:lnRef idx="2">
+        <a:scrgbClr r="0" g="0" b="0"/>
+      </a:lnRef>
+      <a:fillRef idx="1">
+        <a:scrgbClr r="0" g="0" b="0"/>
+      </a:fillRef>
+      <a:effectRef idx="0">
+        <a:scrgbClr r="0" g="0" b="0"/>
+      </a:effectRef>
+      <a:fontRef idx="minor"/>
+    </dgm:style>
+  </dgm:styleLbl>
+  <dgm:styleLbl name="revTx">
+    <dgm:scene3d>
+      <a:camera prst="orthographicFront"/>
+      <a:lightRig rig="threePt" dir="t"/>
+    </dgm:scene3d>
+    <dgm:sp3d/>
+    <dgm:txPr/>
+    <dgm:style>
+      <a:lnRef idx="0">
+        <a:scrgbClr r="0" g="0" b="0"/>
+      </a:lnRef>
+      <a:fillRef idx="0">
+        <a:scrgbClr r="0" g="0" b="0"/>
+      </a:fillRef>
+      <a:effectRef idx="0">
+        <a:scrgbClr r="0" g="0" b="0"/>
+      </a:effectRef>
+      <a:fontRef idx="minor"/>
+    </dgm:style>
+  </dgm:styleLbl>
+</dgm:styleDef>
+</file>
+
 <file path=ppt/notesMasters/notesMaster1.xml><?xml version="1.0" encoding="utf-8"?>
 <p:notesMaster xmlns:a="http://schemas.openxmlformats.org/drawingml/2006/main" xmlns:r="http://schemas.openxmlformats.org/officeDocument/2006/relationships" xmlns:p="http://schemas.openxmlformats.org/presentationml/2006/main">
   <p:cSld>
@@ -650,7 +4396,7 @@
           <a:p>
             <a:fld id="{C3B3FCEF-2765-2145-8DFD-713D627F0236}" type="datetimeFigureOut">
               <a:rPr lang="pl-PL" smtClean="0"/>
-              <a:t>29.08.2018</a:t>
+              <a:t>07.09.2018</a:t>
             </a:fld>
             <a:endParaRPr lang="pl-PL"/>
           </a:p>
@@ -823,7 +4569,7 @@
           <a:p>
             <a:fld id="{C3B3FCEF-2765-2145-8DFD-713D627F0236}" type="datetimeFigureOut">
               <a:rPr lang="pl-PL" smtClean="0"/>
-              <a:t>29.08.2018</a:t>
+              <a:t>07.09.2018</a:t>
             </a:fld>
             <a:endParaRPr lang="pl-PL"/>
           </a:p>
@@ -1006,7 +4752,7 @@
           <a:p>
             <a:fld id="{C3B3FCEF-2765-2145-8DFD-713D627F0236}" type="datetimeFigureOut">
               <a:rPr lang="pl-PL" smtClean="0"/>
-              <a:t>29.08.2018</a:t>
+              <a:t>07.09.2018</a:t>
             </a:fld>
             <a:endParaRPr lang="pl-PL"/>
           </a:p>
@@ -1179,7 +4925,7 @@
           <a:p>
             <a:fld id="{C3B3FCEF-2765-2145-8DFD-713D627F0236}" type="datetimeFigureOut">
               <a:rPr lang="pl-PL" smtClean="0"/>
-              <a:t>29.08.2018</a:t>
+              <a:t>07.09.2018</a:t>
             </a:fld>
             <a:endParaRPr lang="pl-PL"/>
           </a:p>
@@ -1457,7 +5203,7 @@
           <a:p>
             <a:fld id="{C3B3FCEF-2765-2145-8DFD-713D627F0236}" type="datetimeFigureOut">
               <a:rPr lang="pl-PL" smtClean="0"/>
-              <a:t>29.08.2018</a:t>
+              <a:t>07.09.2018</a:t>
             </a:fld>
             <a:endParaRPr lang="pl-PL"/>
           </a:p>
@@ -1672,7 +5418,7 @@
           <a:p>
             <a:fld id="{C3B3FCEF-2765-2145-8DFD-713D627F0236}" type="datetimeFigureOut">
               <a:rPr lang="pl-PL" smtClean="0"/>
-              <a:t>29.08.2018</a:t>
+              <a:t>07.09.2018</a:t>
             </a:fld>
             <a:endParaRPr lang="pl-PL"/>
           </a:p>
@@ -2040,7 +5786,7 @@
           <a:p>
             <a:fld id="{C3B3FCEF-2765-2145-8DFD-713D627F0236}" type="datetimeFigureOut">
               <a:rPr lang="pl-PL" smtClean="0"/>
-              <a:t>29.08.2018</a:t>
+              <a:t>07.09.2018</a:t>
             </a:fld>
             <a:endParaRPr lang="pl-PL"/>
           </a:p>
@@ -2181,7 +5927,7 @@
           <a:p>
             <a:fld id="{C3B3FCEF-2765-2145-8DFD-713D627F0236}" type="datetimeFigureOut">
               <a:rPr lang="pl-PL" smtClean="0"/>
-              <a:t>29.08.2018</a:t>
+              <a:t>07.09.2018</a:t>
             </a:fld>
             <a:endParaRPr lang="pl-PL"/>
           </a:p>
@@ -2294,7 +6040,7 @@
           <a:p>
             <a:fld id="{C3B3FCEF-2765-2145-8DFD-713D627F0236}" type="datetimeFigureOut">
               <a:rPr lang="pl-PL" smtClean="0"/>
-              <a:t>29.08.2018</a:t>
+              <a:t>07.09.2018</a:t>
             </a:fld>
             <a:endParaRPr lang="pl-PL"/>
           </a:p>
@@ -2583,7 +6329,7 @@
           <a:p>
             <a:fld id="{C3B3FCEF-2765-2145-8DFD-713D627F0236}" type="datetimeFigureOut">
               <a:rPr lang="pl-PL" smtClean="0"/>
-              <a:t>29.08.2018</a:t>
+              <a:t>07.09.2018</a:t>
             </a:fld>
             <a:endParaRPr lang="pl-PL"/>
           </a:p>
@@ -2874,7 +6620,7 @@
           <a:p>
             <a:fld id="{C3B3FCEF-2765-2145-8DFD-713D627F0236}" type="datetimeFigureOut">
               <a:rPr lang="pl-PL" smtClean="0"/>
-              <a:t>29.08.2018</a:t>
+              <a:t>07.09.2018</a:t>
             </a:fld>
             <a:endParaRPr lang="pl-PL"/>
           </a:p>
@@ -3090,7 +6836,7 @@
           <a:p>
             <a:fld id="{C3B3FCEF-2765-2145-8DFD-713D627F0236}" type="datetimeFigureOut">
               <a:rPr lang="pl-PL" smtClean="0"/>
-              <a:t>29.08.2018</a:t>
+              <a:t>07.09.2018</a:t>
             </a:fld>
             <a:endParaRPr lang="pl-PL"/>
           </a:p>
@@ -3530,7 +7276,7 @@
           <a:p>
             <a:r>
               <a:rPr lang="pl-PL" dirty="0"/>
-              <a:t>Grafika rastrowa i wektorowa</a:t>
+              <a:t>Grafika komputerowa</a:t>
             </a:r>
           </a:p>
         </p:txBody>
@@ -3613,51 +7359,42 @@
           <a:p>
             <a:r>
               <a:rPr lang="pl-PL" dirty="0"/>
-              <a:t>Grafika rastrowa</a:t>
+              <a:t>Rodzaje zapisu grafiki</a:t>
             </a:r>
           </a:p>
         </p:txBody>
       </p:sp>
-      <p:sp>
-        <p:nvSpPr>
-          <p:cNvPr id="3" name="Symbol zastępczy zawartości 2">
+      <p:graphicFrame>
+        <p:nvGraphicFramePr>
+          <p:cNvPr id="6" name="Symbol zastępczy zawartości 5">
             <a:extLst>
               <a:ext uri="{FF2B5EF4-FFF2-40B4-BE49-F238E27FC236}">
-                <a16:creationId xmlns:a16="http://schemas.microsoft.com/office/drawing/2014/main" id="{DE600135-8890-AD48-92DE-B744A2D09BA1}"/>
+                <a16:creationId xmlns:a16="http://schemas.microsoft.com/office/drawing/2014/main" id="{1CDFA344-3A73-2344-9DA4-D869EE955396}"/>
               </a:ext>
             </a:extLst>
           </p:cNvPr>
-          <p:cNvSpPr>
-            <a:spLocks noGrp="1"/>
-          </p:cNvSpPr>
+          <p:cNvGraphicFramePr>
+            <a:graphicFrameLocks noGrp="1"/>
+          </p:cNvGraphicFramePr>
           <p:nvPr>
             <p:ph idx="1"/>
+            <p:extLst>
+              <p:ext uri="{D42A27DB-BD31-4B8C-83A1-F6EECF244321}">
+                <p14:modId xmlns:p14="http://schemas.microsoft.com/office/powerpoint/2010/main" val="3806314783"/>
+              </p:ext>
+            </p:extLst>
           </p:nvPr>
-        </p:nvSpPr>
-        <p:spPr/>
-        <p:txBody>
-          <a:bodyPr/>
-          <a:lstStyle/>
-          <a:p>
-            <a:r>
-              <a:rPr lang="pl-PL" dirty="0"/>
-              <a:t>Opisuje kolory i położenie poszczególnych pikseli</a:t>
-            </a:r>
-          </a:p>
-          <a:p>
-            <a:r>
-              <a:rPr lang="pl-PL" dirty="0"/>
-              <a:t>Utrata jakości przy skalowaniu</a:t>
-            </a:r>
-          </a:p>
-          <a:p>
-            <a:r>
-              <a:rPr lang="pl-PL" dirty="0"/>
-              <a:t>PNG, JPG, BMP</a:t>
-            </a:r>
-          </a:p>
-        </p:txBody>
-      </p:sp>
+        </p:nvGraphicFramePr>
+        <p:xfrm>
+          <a:off x="893763" y="2597150"/>
+          <a:ext cx="11217275" cy="6188075"/>
+        </p:xfrm>
+        <a:graphic>
+          <a:graphicData uri="http://schemas.openxmlformats.org/drawingml/2006/diagram">
+            <dgm:relIds xmlns:dgm="http://schemas.openxmlformats.org/drawingml/2006/diagram" xmlns:r="http://schemas.openxmlformats.org/officeDocument/2006/relationships" r:dm="rId2" r:lo="rId3" r:qs="rId4" r:cs="rId5"/>
+          </a:graphicData>
+        </a:graphic>
+      </p:graphicFrame>
     </p:spTree>
     <p:extLst>
       <p:ext uri="{BB962C8B-B14F-4D97-AF65-F5344CB8AC3E}">
@@ -3693,7 +7430,197 @@
           <p:cNvPr id="2" name="Tytuł 1">
             <a:extLst>
               <a:ext uri="{FF2B5EF4-FFF2-40B4-BE49-F238E27FC236}">
-                <a16:creationId xmlns:a16="http://schemas.microsoft.com/office/drawing/2014/main" id="{50E5BF49-9749-DD46-BF8C-74C9D6ADB15B}"/>
+                <a16:creationId xmlns:a16="http://schemas.microsoft.com/office/drawing/2014/main" id="{B85705F0-2971-CB4A-8237-AC4A41E44706}"/>
+              </a:ext>
+            </a:extLst>
+          </p:cNvPr>
+          <p:cNvSpPr>
+            <a:spLocks noGrp="1"/>
+          </p:cNvSpPr>
+          <p:nvPr>
+            <p:ph type="title"/>
+          </p:nvPr>
+        </p:nvSpPr>
+        <p:spPr>
+          <a:xfrm>
+            <a:off x="894080" y="519290"/>
+            <a:ext cx="11216640" cy="1885245"/>
+          </a:xfrm>
+        </p:spPr>
+        <p:txBody>
+          <a:bodyPr/>
+          <a:lstStyle/>
+          <a:p>
+            <a:r>
+              <a:rPr lang="pl-PL"/>
+              <a:t>Rozdzielczość obrazu</a:t>
+            </a:r>
+            <a:endParaRPr lang="pl-PL" dirty="0"/>
+          </a:p>
+        </p:txBody>
+      </p:sp>
+      <p:sp>
+        <p:nvSpPr>
+          <p:cNvPr id="3" name="Symbol zastępczy zawartości 2">
+            <a:extLst>
+              <a:ext uri="{FF2B5EF4-FFF2-40B4-BE49-F238E27FC236}">
+                <a16:creationId xmlns:a16="http://schemas.microsoft.com/office/drawing/2014/main" id="{2041A9FA-BCE3-F445-81FD-F7BB02B6B371}"/>
+              </a:ext>
+            </a:extLst>
+          </p:cNvPr>
+          <p:cNvSpPr>
+            <a:spLocks noGrp="1"/>
+          </p:cNvSpPr>
+          <p:nvPr>
+            <p:ph idx="1"/>
+          </p:nvPr>
+        </p:nvSpPr>
+        <p:spPr>
+          <a:xfrm>
+            <a:off x="894080" y="2596444"/>
+            <a:ext cx="11216640" cy="6188570"/>
+          </a:xfrm>
+        </p:spPr>
+        <p:txBody>
+          <a:bodyPr/>
+          <a:lstStyle/>
+          <a:p>
+            <a:r>
+              <a:rPr lang="pl-PL" dirty="0"/>
+              <a:t>Wymiary podane w pikselach, np. 1440x900</a:t>
+            </a:r>
+          </a:p>
+          <a:p>
+            <a:r>
+              <a:rPr lang="pl-PL" dirty="0" err="1"/>
+              <a:t>dpi</a:t>
+            </a:r>
+            <a:r>
+              <a:rPr lang="pl-PL" dirty="0"/>
+              <a:t> – liczba punktów obrazu przypadająca na 1 cal</a:t>
+            </a:r>
+          </a:p>
+          <a:p>
+            <a:r>
+              <a:rPr lang="pl-PL" dirty="0" err="1"/>
+              <a:t>ppi</a:t>
+            </a:r>
+            <a:r>
+              <a:rPr lang="pl-PL" dirty="0"/>
+              <a:t> – liczba pikseli przypadająca na 1 cal</a:t>
+            </a:r>
+          </a:p>
+          <a:p>
+            <a:r>
+              <a:rPr lang="pl-PL" dirty="0" err="1"/>
+              <a:t>Mpx</a:t>
+            </a:r>
+            <a:r>
+              <a:rPr lang="pl-PL" dirty="0"/>
+              <a:t> – megapiksele – 1 </a:t>
+            </a:r>
+            <a:r>
+              <a:rPr lang="pl-PL" dirty="0" err="1"/>
+              <a:t>Mpx</a:t>
+            </a:r>
+            <a:r>
+              <a:rPr lang="pl-PL" dirty="0"/>
+              <a:t> = 1.000.000 pikseli</a:t>
+            </a:r>
+          </a:p>
+          <a:p>
+            <a:r>
+              <a:rPr lang="pl-PL" dirty="0"/>
+              <a:t>2048x1536 = 3,15 </a:t>
+            </a:r>
+            <a:r>
+              <a:rPr lang="pl-PL" dirty="0" err="1"/>
+              <a:t>Mpx</a:t>
+            </a:r>
+            <a:endParaRPr lang="pl-PL" dirty="0"/>
+          </a:p>
+          <a:p>
+            <a:r>
+              <a:rPr lang="pl-PL" dirty="0"/>
+              <a:t>2272x1704 = 3,87 </a:t>
+            </a:r>
+            <a:r>
+              <a:rPr lang="pl-PL" dirty="0" err="1"/>
+              <a:t>Mpx</a:t>
+            </a:r>
+            <a:endParaRPr lang="pl-PL" dirty="0"/>
+          </a:p>
+          <a:p>
+            <a:endParaRPr lang="pl-PL" dirty="0"/>
+          </a:p>
+        </p:txBody>
+      </p:sp>
+      <p:pic>
+        <p:nvPicPr>
+          <p:cNvPr id="4" name="Obraz 3">
+            <a:extLst>
+              <a:ext uri="{FF2B5EF4-FFF2-40B4-BE49-F238E27FC236}">
+                <a16:creationId xmlns:a16="http://schemas.microsoft.com/office/drawing/2014/main" id="{586F127F-901A-9B46-9BC7-FF99376D39EF}"/>
+              </a:ext>
+            </a:extLst>
+          </p:cNvPr>
+          <p:cNvPicPr>
+            <a:picLocks noChangeAspect="1"/>
+          </p:cNvPicPr>
+          <p:nvPr/>
+        </p:nvPicPr>
+        <p:blipFill>
+          <a:blip r:embed="rId2"/>
+          <a:stretch>
+            <a:fillRect/>
+          </a:stretch>
+        </p:blipFill>
+        <p:spPr>
+          <a:xfrm>
+            <a:off x="1752600" y="6880014"/>
+            <a:ext cx="9499600" cy="1905000"/>
+          </a:xfrm>
+          <a:prstGeom prst="rect">
+            <a:avLst/>
+          </a:prstGeom>
+        </p:spPr>
+      </p:pic>
+    </p:spTree>
+    <p:extLst>
+      <p:ext uri="{BB962C8B-B14F-4D97-AF65-F5344CB8AC3E}">
+        <p14:creationId xmlns:p14="http://schemas.microsoft.com/office/powerpoint/2010/main" val="3140807592"/>
+      </p:ext>
+    </p:extLst>
+  </p:cSld>
+  <p:clrMapOvr>
+    <a:masterClrMapping/>
+  </p:clrMapOvr>
+</p:sld>
+</file>
+
+<file path=ppt/slides/slide4.xml><?xml version="1.0" encoding="utf-8"?>
+<p:sld xmlns:a="http://schemas.openxmlformats.org/drawingml/2006/main" xmlns:r="http://schemas.openxmlformats.org/officeDocument/2006/relationships" xmlns:p="http://schemas.openxmlformats.org/presentationml/2006/main">
+  <p:cSld>
+    <p:spTree>
+      <p:nvGrpSpPr>
+        <p:cNvPr id="1" name=""/>
+        <p:cNvGrpSpPr/>
+        <p:nvPr/>
+      </p:nvGrpSpPr>
+      <p:grpSpPr>
+        <a:xfrm>
+          <a:off x="0" y="0"/>
+          <a:ext cx="0" cy="0"/>
+          <a:chOff x="0" y="0"/>
+          <a:chExt cx="0" cy="0"/>
+        </a:xfrm>
+      </p:grpSpPr>
+      <p:sp>
+        <p:nvSpPr>
+          <p:cNvPr id="2" name="Tytuł 1">
+            <a:extLst>
+              <a:ext uri="{FF2B5EF4-FFF2-40B4-BE49-F238E27FC236}">
+                <a16:creationId xmlns:a16="http://schemas.microsoft.com/office/drawing/2014/main" id="{6E1A7680-26AA-A941-86E2-07E11FE71E36}"/>
               </a:ext>
             </a:extLst>
           </p:cNvPr>
@@ -3711,7 +7638,7 @@
           <a:p>
             <a:r>
               <a:rPr lang="pl-PL" dirty="0"/>
-              <a:t>Grafika wektorowa</a:t>
+              <a:t>Formaty graficzne - rastrowe</a:t>
             </a:r>
           </a:p>
         </p:txBody>
@@ -3721,7 +7648,328 @@
           <p:cNvPr id="3" name="Symbol zastępczy zawartości 2">
             <a:extLst>
               <a:ext uri="{FF2B5EF4-FFF2-40B4-BE49-F238E27FC236}">
-                <a16:creationId xmlns:a16="http://schemas.microsoft.com/office/drawing/2014/main" id="{ED02F706-F612-3B45-AFF4-1DACD3CEF855}"/>
+                <a16:creationId xmlns:a16="http://schemas.microsoft.com/office/drawing/2014/main" id="{7C133273-F77B-7B41-B375-74921152937A}"/>
+              </a:ext>
+            </a:extLst>
+          </p:cNvPr>
+          <p:cNvSpPr>
+            <a:spLocks noGrp="1"/>
+          </p:cNvSpPr>
+          <p:nvPr>
+            <p:ph idx="1"/>
+          </p:nvPr>
+        </p:nvSpPr>
+        <p:spPr/>
+        <p:txBody>
+          <a:bodyPr>
+            <a:normAutofit/>
+          </a:bodyPr>
+          <a:lstStyle/>
+          <a:p>
+            <a:pPr marL="0" indent="0">
+              <a:buNone/>
+            </a:pPr>
+            <a:r>
+              <a:rPr lang="pl-PL" sz="3600" b="1" dirty="0"/>
+              <a:t>BMP</a:t>
+            </a:r>
+            <a:endParaRPr lang="pl-PL" b="1" dirty="0"/>
+          </a:p>
+          <a:p>
+            <a:pPr lvl="1"/>
+            <a:r>
+              <a:rPr lang="pl-PL" sz="3200" dirty="0"/>
+              <a:t>Bitmapa</a:t>
+            </a:r>
+          </a:p>
+          <a:p>
+            <a:pPr lvl="1"/>
+            <a:r>
+              <a:rPr lang="pl-PL" sz="3200" dirty="0"/>
+              <a:t>Paint</a:t>
+            </a:r>
+          </a:p>
+          <a:p>
+            <a:pPr lvl="1"/>
+            <a:r>
+              <a:rPr lang="pl-PL" sz="3200" dirty="0"/>
+              <a:t>Zapis bezstratny</a:t>
+            </a:r>
+          </a:p>
+          <a:p>
+            <a:pPr lvl="1"/>
+            <a:endParaRPr lang="pl-PL" dirty="0"/>
+          </a:p>
+          <a:p>
+            <a:pPr marL="487695" lvl="1" indent="0">
+              <a:buNone/>
+            </a:pPr>
+            <a:endParaRPr lang="pl-PL" dirty="0"/>
+          </a:p>
+          <a:p>
+            <a:pPr marL="0" indent="0">
+              <a:buNone/>
+            </a:pPr>
+            <a:r>
+              <a:rPr lang="pl-PL" sz="3600" b="1" dirty="0"/>
+              <a:t>GIF</a:t>
+            </a:r>
+          </a:p>
+          <a:p>
+            <a:pPr lvl="1"/>
+            <a:r>
+              <a:rPr lang="pl-PL" sz="3200" dirty="0"/>
+              <a:t>Kompresja bezstratna</a:t>
+            </a:r>
+          </a:p>
+          <a:p>
+            <a:pPr lvl="1"/>
+            <a:r>
+              <a:rPr lang="pl-PL" sz="3200" dirty="0"/>
+              <a:t>256 kolorów</a:t>
+            </a:r>
+          </a:p>
+          <a:p>
+            <a:pPr lvl="1"/>
+            <a:r>
+              <a:rPr lang="pl-PL" sz="3200" dirty="0"/>
+              <a:t>Animacje</a:t>
+            </a:r>
+          </a:p>
+        </p:txBody>
+      </p:sp>
+    </p:spTree>
+    <p:extLst>
+      <p:ext uri="{BB962C8B-B14F-4D97-AF65-F5344CB8AC3E}">
+        <p14:creationId xmlns:p14="http://schemas.microsoft.com/office/powerpoint/2010/main" val="1516911215"/>
+      </p:ext>
+    </p:extLst>
+  </p:cSld>
+  <p:clrMapOvr>
+    <a:masterClrMapping/>
+  </p:clrMapOvr>
+</p:sld>
+</file>
+
+<file path=ppt/slides/slide5.xml><?xml version="1.0" encoding="utf-8"?>
+<p:sld xmlns:a="http://schemas.openxmlformats.org/drawingml/2006/main" xmlns:r="http://schemas.openxmlformats.org/officeDocument/2006/relationships" xmlns:p="http://schemas.openxmlformats.org/presentationml/2006/main">
+  <p:cSld>
+    <p:spTree>
+      <p:nvGrpSpPr>
+        <p:cNvPr id="1" name=""/>
+        <p:cNvGrpSpPr/>
+        <p:nvPr/>
+      </p:nvGrpSpPr>
+      <p:grpSpPr>
+        <a:xfrm>
+          <a:off x="0" y="0"/>
+          <a:ext cx="0" cy="0"/>
+          <a:chOff x="0" y="0"/>
+          <a:chExt cx="0" cy="0"/>
+        </a:xfrm>
+      </p:grpSpPr>
+      <p:sp>
+        <p:nvSpPr>
+          <p:cNvPr id="2" name="Tytuł 1">
+            <a:extLst>
+              <a:ext uri="{FF2B5EF4-FFF2-40B4-BE49-F238E27FC236}">
+                <a16:creationId xmlns:a16="http://schemas.microsoft.com/office/drawing/2014/main" id="{6E1A7680-26AA-A941-86E2-07E11FE71E36}"/>
+              </a:ext>
+            </a:extLst>
+          </p:cNvPr>
+          <p:cNvSpPr>
+            <a:spLocks noGrp="1"/>
+          </p:cNvSpPr>
+          <p:nvPr>
+            <p:ph type="title"/>
+          </p:nvPr>
+        </p:nvSpPr>
+        <p:spPr/>
+        <p:txBody>
+          <a:bodyPr/>
+          <a:lstStyle/>
+          <a:p>
+            <a:r>
+              <a:rPr lang="pl-PL" dirty="0"/>
+              <a:t>Formaty graficzne - rastrowe</a:t>
+            </a:r>
+          </a:p>
+        </p:txBody>
+      </p:sp>
+      <p:sp>
+        <p:nvSpPr>
+          <p:cNvPr id="3" name="Symbol zastępczy zawartości 2">
+            <a:extLst>
+              <a:ext uri="{FF2B5EF4-FFF2-40B4-BE49-F238E27FC236}">
+                <a16:creationId xmlns:a16="http://schemas.microsoft.com/office/drawing/2014/main" id="{7C133273-F77B-7B41-B375-74921152937A}"/>
+              </a:ext>
+            </a:extLst>
+          </p:cNvPr>
+          <p:cNvSpPr>
+            <a:spLocks noGrp="1"/>
+          </p:cNvSpPr>
+          <p:nvPr>
+            <p:ph idx="1"/>
+          </p:nvPr>
+        </p:nvSpPr>
+        <p:spPr/>
+        <p:txBody>
+          <a:bodyPr>
+            <a:normAutofit lnSpcReduction="10000"/>
+          </a:bodyPr>
+          <a:lstStyle/>
+          <a:p>
+            <a:pPr marL="0" indent="0">
+              <a:buNone/>
+            </a:pPr>
+            <a:r>
+              <a:rPr lang="pl-PL" sz="3600" b="1" dirty="0"/>
+              <a:t>JPG</a:t>
+            </a:r>
+            <a:endParaRPr lang="pl-PL" b="1" dirty="0"/>
+          </a:p>
+          <a:p>
+            <a:pPr lvl="1"/>
+            <a:r>
+              <a:rPr lang="pl-PL" sz="3200" dirty="0"/>
+              <a:t>Kompresja stratna</a:t>
+            </a:r>
+          </a:p>
+          <a:p>
+            <a:pPr lvl="1"/>
+            <a:r>
+              <a:rPr lang="pl-PL" sz="3200" dirty="0"/>
+              <a:t>Wykorzystuje właściwości ludzkiego wzroku do kompresji</a:t>
+            </a:r>
+          </a:p>
+          <a:p>
+            <a:pPr lvl="1"/>
+            <a:r>
+              <a:rPr lang="pl-PL" sz="3200" dirty="0"/>
+              <a:t>Popularny w sieci</a:t>
+            </a:r>
+          </a:p>
+          <a:p>
+            <a:pPr lvl="1"/>
+            <a:endParaRPr lang="pl-PL" sz="3200" dirty="0"/>
+          </a:p>
+          <a:p>
+            <a:pPr marL="0" indent="0">
+              <a:buNone/>
+            </a:pPr>
+            <a:r>
+              <a:rPr lang="pl-PL" sz="3600" b="1" dirty="0"/>
+              <a:t>PNG</a:t>
+            </a:r>
+            <a:endParaRPr lang="pl-PL" b="1" dirty="0"/>
+          </a:p>
+          <a:p>
+            <a:pPr lvl="1"/>
+            <a:r>
+              <a:rPr lang="pl-PL" sz="3200" dirty="0"/>
+              <a:t>Kompresja bezstratna</a:t>
+            </a:r>
+          </a:p>
+          <a:p>
+            <a:pPr lvl="1"/>
+            <a:r>
+              <a:rPr lang="pl-PL" sz="3200" dirty="0"/>
+              <a:t>Zawiera przezroczystość</a:t>
+            </a:r>
+          </a:p>
+          <a:p>
+            <a:pPr lvl="1"/>
+            <a:endParaRPr lang="pl-PL" sz="3200" dirty="0"/>
+          </a:p>
+          <a:p>
+            <a:pPr marL="0" indent="0">
+              <a:buNone/>
+            </a:pPr>
+            <a:r>
+              <a:rPr lang="pl-PL" sz="3600" b="1" dirty="0"/>
+              <a:t>XCF</a:t>
+            </a:r>
+          </a:p>
+          <a:p>
+            <a:pPr lvl="1"/>
+            <a:r>
+              <a:rPr lang="pl-PL" sz="3200" dirty="0"/>
+              <a:t>GIMP</a:t>
+            </a:r>
+          </a:p>
+          <a:p>
+            <a:pPr lvl="1"/>
+            <a:r>
+              <a:rPr lang="pl-PL" sz="3200" dirty="0"/>
+              <a:t>Bezstratny</a:t>
+            </a:r>
+          </a:p>
+        </p:txBody>
+      </p:sp>
+    </p:spTree>
+    <p:extLst>
+      <p:ext uri="{BB962C8B-B14F-4D97-AF65-F5344CB8AC3E}">
+        <p14:creationId xmlns:p14="http://schemas.microsoft.com/office/powerpoint/2010/main" val="416971224"/>
+      </p:ext>
+    </p:extLst>
+  </p:cSld>
+  <p:clrMapOvr>
+    <a:masterClrMapping/>
+  </p:clrMapOvr>
+</p:sld>
+</file>
+
+<file path=ppt/slides/slide6.xml><?xml version="1.0" encoding="utf-8"?>
+<p:sld xmlns:a="http://schemas.openxmlformats.org/drawingml/2006/main" xmlns:r="http://schemas.openxmlformats.org/officeDocument/2006/relationships" xmlns:p="http://schemas.openxmlformats.org/presentationml/2006/main">
+  <p:cSld>
+    <p:spTree>
+      <p:nvGrpSpPr>
+        <p:cNvPr id="1" name=""/>
+        <p:cNvGrpSpPr/>
+        <p:nvPr/>
+      </p:nvGrpSpPr>
+      <p:grpSpPr>
+        <a:xfrm>
+          <a:off x="0" y="0"/>
+          <a:ext cx="0" cy="0"/>
+          <a:chOff x="0" y="0"/>
+          <a:chExt cx="0" cy="0"/>
+        </a:xfrm>
+      </p:grpSpPr>
+      <p:sp>
+        <p:nvSpPr>
+          <p:cNvPr id="2" name="Tytuł 1">
+            <a:extLst>
+              <a:ext uri="{FF2B5EF4-FFF2-40B4-BE49-F238E27FC236}">
+                <a16:creationId xmlns:a16="http://schemas.microsoft.com/office/drawing/2014/main" id="{F2000851-2F90-1F45-95F5-D6DE598F2838}"/>
+              </a:ext>
+            </a:extLst>
+          </p:cNvPr>
+          <p:cNvSpPr>
+            <a:spLocks noGrp="1"/>
+          </p:cNvSpPr>
+          <p:nvPr>
+            <p:ph type="title"/>
+          </p:nvPr>
+        </p:nvSpPr>
+        <p:spPr/>
+        <p:txBody>
+          <a:bodyPr/>
+          <a:lstStyle/>
+          <a:p>
+            <a:r>
+              <a:rPr lang="pl-PL" dirty="0"/>
+              <a:t>Formaty graficzne - wektorowe</a:t>
+            </a:r>
+          </a:p>
+        </p:txBody>
+      </p:sp>
+      <p:sp>
+        <p:nvSpPr>
+          <p:cNvPr id="3" name="Symbol zastępczy zawartości 2">
+            <a:extLst>
+              <a:ext uri="{FF2B5EF4-FFF2-40B4-BE49-F238E27FC236}">
+                <a16:creationId xmlns:a16="http://schemas.microsoft.com/office/drawing/2014/main" id="{DA88FFA4-A42F-0740-97A5-091B4DC27BD1}"/>
               </a:ext>
             </a:extLst>
           </p:cNvPr>
@@ -3739,25 +7987,23 @@
           <a:p>
             <a:r>
               <a:rPr lang="pl-PL" dirty="0"/>
-              <a:t>Opisuje kształty ,ich wzajemne położenie i kolory</a:t>
+              <a:t>Nie ma jednego, ogólnie przyjętego formatu grafiki wektorowej.</a:t>
             </a:r>
           </a:p>
           <a:p>
             <a:r>
               <a:rPr lang="pl-PL" dirty="0"/>
-              <a:t>Obrazy wyliczane matematycznie</a:t>
+              <a:t>Praktycznie każdy program używa własnego formatu.</a:t>
             </a:r>
           </a:p>
           <a:p>
             <a:r>
               <a:rPr lang="pl-PL" dirty="0"/>
-              <a:t>Brak utraty jakości przy skalowaniu</a:t>
+              <a:t>Najpopularniejszy (w kontekście webowym) jest obecnie </a:t>
             </a:r>
-          </a:p>
-          <a:p>
             <a:r>
-              <a:rPr lang="pl-PL"/>
-              <a:t>SVG</a:t>
+              <a:rPr lang="pl-PL" dirty="0" err="1"/>
+              <a:t>svg</a:t>
             </a:r>
             <a:endParaRPr lang="pl-PL" dirty="0"/>
           </a:p>
@@ -3766,7 +8012,132 @@
     </p:spTree>
     <p:extLst>
       <p:ext uri="{BB962C8B-B14F-4D97-AF65-F5344CB8AC3E}">
-        <p14:creationId xmlns:p14="http://schemas.microsoft.com/office/powerpoint/2010/main" val="524990722"/>
+        <p14:creationId xmlns:p14="http://schemas.microsoft.com/office/powerpoint/2010/main" val="2982496015"/>
+      </p:ext>
+    </p:extLst>
+  </p:cSld>
+  <p:clrMapOvr>
+    <a:masterClrMapping/>
+  </p:clrMapOvr>
+</p:sld>
+</file>
+
+<file path=ppt/slides/slide7.xml><?xml version="1.0" encoding="utf-8"?>
+<p:sld xmlns:a="http://schemas.openxmlformats.org/drawingml/2006/main" xmlns:r="http://schemas.openxmlformats.org/officeDocument/2006/relationships" xmlns:p="http://schemas.openxmlformats.org/presentationml/2006/main">
+  <p:cSld>
+    <p:spTree>
+      <p:nvGrpSpPr>
+        <p:cNvPr id="1" name=""/>
+        <p:cNvGrpSpPr/>
+        <p:nvPr/>
+      </p:nvGrpSpPr>
+      <p:grpSpPr>
+        <a:xfrm>
+          <a:off x="0" y="0"/>
+          <a:ext cx="0" cy="0"/>
+          <a:chOff x="0" y="0"/>
+          <a:chExt cx="0" cy="0"/>
+        </a:xfrm>
+      </p:grpSpPr>
+      <p:sp>
+        <p:nvSpPr>
+          <p:cNvPr id="2" name="Tytuł 1">
+            <a:extLst>
+              <a:ext uri="{FF2B5EF4-FFF2-40B4-BE49-F238E27FC236}">
+                <a16:creationId xmlns:a16="http://schemas.microsoft.com/office/drawing/2014/main" id="{A99E8137-4C5A-7344-8915-837D78E57A41}"/>
+              </a:ext>
+            </a:extLst>
+          </p:cNvPr>
+          <p:cNvSpPr>
+            <a:spLocks noGrp="1"/>
+          </p:cNvSpPr>
+          <p:nvPr>
+            <p:ph type="title"/>
+          </p:nvPr>
+        </p:nvSpPr>
+        <p:spPr/>
+        <p:txBody>
+          <a:bodyPr/>
+          <a:lstStyle/>
+          <a:p>
+            <a:r>
+              <a:rPr lang="pl-PL" dirty="0"/>
+              <a:t>Źródła</a:t>
+            </a:r>
+          </a:p>
+        </p:txBody>
+      </p:sp>
+      <p:sp>
+        <p:nvSpPr>
+          <p:cNvPr id="3" name="Symbol zastępczy zawartości 2">
+            <a:extLst>
+              <a:ext uri="{FF2B5EF4-FFF2-40B4-BE49-F238E27FC236}">
+                <a16:creationId xmlns:a16="http://schemas.microsoft.com/office/drawing/2014/main" id="{F6499669-018C-C848-9F14-D040B4EA11B7}"/>
+              </a:ext>
+            </a:extLst>
+          </p:cNvPr>
+          <p:cNvSpPr>
+            <a:spLocks noGrp="1"/>
+          </p:cNvSpPr>
+          <p:nvPr>
+            <p:ph idx="1"/>
+          </p:nvPr>
+        </p:nvSpPr>
+        <p:spPr/>
+        <p:txBody>
+          <a:bodyPr/>
+          <a:lstStyle/>
+          <a:p>
+            <a:r>
+              <a:rPr lang="pl-PL" dirty="0">
+                <a:hlinkClick r:id="rId2"/>
+              </a:rPr>
+              <a:t>https://upload.wikimedia.org/wikipedia/commons/d/dc/Wikipixel.png</a:t>
+            </a:r>
+            <a:endParaRPr lang="pl-PL" dirty="0"/>
+          </a:p>
+          <a:p>
+            <a:r>
+              <a:rPr lang="pl-PL" dirty="0">
+                <a:hlinkClick r:id="rId3"/>
+              </a:rPr>
+              <a:t>https://it-szkola.edu.pl/kkurs,kurs,15,prezentacja</a:t>
+            </a:r>
+            <a:endParaRPr lang="pl-PL" dirty="0"/>
+          </a:p>
+          <a:p>
+            <a:r>
+              <a:rPr lang="pl-PL" dirty="0">
+                <a:hlinkClick r:id="rId4"/>
+              </a:rPr>
+              <a:t>https://www.scantips.com/mpixels.html</a:t>
+            </a:r>
+            <a:endParaRPr lang="pl-PL" dirty="0"/>
+          </a:p>
+          <a:p>
+            <a:r>
+              <a:rPr lang="pl-PL" dirty="0">
+                <a:hlinkClick r:id="rId5"/>
+              </a:rPr>
+              <a:t>https://svgporn.com/</a:t>
+            </a:r>
+            <a:endParaRPr lang="pl-PL" dirty="0"/>
+          </a:p>
+          <a:p>
+            <a:endParaRPr lang="pl-PL" dirty="0"/>
+          </a:p>
+          <a:p>
+            <a:endParaRPr lang="pl-PL" dirty="0"/>
+          </a:p>
+          <a:p>
+            <a:endParaRPr lang="pl-PL" dirty="0"/>
+          </a:p>
+        </p:txBody>
+      </p:sp>
+    </p:spTree>
+    <p:extLst>
+      <p:ext uri="{BB962C8B-B14F-4D97-AF65-F5344CB8AC3E}">
+        <p14:creationId xmlns:p14="http://schemas.microsoft.com/office/powerpoint/2010/main" val="2600463014"/>
       </p:ext>
     </p:extLst>
   </p:cSld>

</xml_diff>